<commit_message>
began adding text to slides
</commit_message>
<xml_diff>
--- a/baroc_wv_diag_draft.pptx
+++ b/baroc_wv_diag_draft.pptx
@@ -11,8 +11,10 @@
     <p:sldId id="261" r:id="rId5"/>
     <p:sldId id="258" r:id="rId6"/>
     <p:sldId id="263" r:id="rId7"/>
-    <p:sldId id="259" r:id="rId8"/>
-    <p:sldId id="264" r:id="rId9"/>
+    <p:sldId id="265" r:id="rId8"/>
+    <p:sldId id="266" r:id="rId9"/>
+    <p:sldId id="259" r:id="rId10"/>
+    <p:sldId id="264" r:id="rId11"/>
   </p:sldIdLst>
   <p:sldSz cx="9144000" cy="6858000" type="screen4x3"/>
   <p:notesSz cx="6858000" cy="9144000"/>
@@ -295,7 +297,8 @@
           <a:p>
             <a:fld id="{DA584CC5-6B92-4E90-A501-052394C1965A}" type="datetimeFigureOut">
               <a:rPr lang="en-US" smtClean="0"/>
-              <a:t>7/2/2025</a:t>
+              <a:pPr/>
+              <a:t>7/3/2025</a:t>
             </a:fld>
             <a:endParaRPr lang="en-US"/>
           </a:p>
@@ -337,6 +340,7 @@
           <a:p>
             <a:fld id="{2FBD9FBA-E540-4D8F-97D2-506A094E5AAE}" type="slidenum">
               <a:rPr lang="en-US" smtClean="0"/>
+              <a:pPr/>
               <a:t>‹#›</a:t>
             </a:fld>
             <a:endParaRPr lang="en-US"/>
@@ -460,7 +464,8 @@
           <a:p>
             <a:fld id="{DA584CC5-6B92-4E90-A501-052394C1965A}" type="datetimeFigureOut">
               <a:rPr lang="en-US" smtClean="0"/>
-              <a:t>7/2/2025</a:t>
+              <a:pPr/>
+              <a:t>7/3/2025</a:t>
             </a:fld>
             <a:endParaRPr lang="en-US"/>
           </a:p>
@@ -502,6 +507,7 @@
           <a:p>
             <a:fld id="{2FBD9FBA-E540-4D8F-97D2-506A094E5AAE}" type="slidenum">
               <a:rPr lang="en-US" smtClean="0"/>
+              <a:pPr/>
               <a:t>‹#›</a:t>
             </a:fld>
             <a:endParaRPr lang="en-US"/>
@@ -635,7 +641,8 @@
           <a:p>
             <a:fld id="{DA584CC5-6B92-4E90-A501-052394C1965A}" type="datetimeFigureOut">
               <a:rPr lang="en-US" smtClean="0"/>
-              <a:t>7/2/2025</a:t>
+              <a:pPr/>
+              <a:t>7/3/2025</a:t>
             </a:fld>
             <a:endParaRPr lang="en-US"/>
           </a:p>
@@ -677,6 +684,7 @@
           <a:p>
             <a:fld id="{2FBD9FBA-E540-4D8F-97D2-506A094E5AAE}" type="slidenum">
               <a:rPr lang="en-US" smtClean="0"/>
+              <a:pPr/>
               <a:t>‹#›</a:t>
             </a:fld>
             <a:endParaRPr lang="en-US"/>
@@ -800,7 +808,8 @@
           <a:p>
             <a:fld id="{DA584CC5-6B92-4E90-A501-052394C1965A}" type="datetimeFigureOut">
               <a:rPr lang="en-US" smtClean="0"/>
-              <a:t>7/2/2025</a:t>
+              <a:pPr/>
+              <a:t>7/3/2025</a:t>
             </a:fld>
             <a:endParaRPr lang="en-US"/>
           </a:p>
@@ -842,6 +851,7 @@
           <a:p>
             <a:fld id="{2FBD9FBA-E540-4D8F-97D2-506A094E5AAE}" type="slidenum">
               <a:rPr lang="en-US" smtClean="0"/>
+              <a:pPr/>
               <a:t>‹#›</a:t>
             </a:fld>
             <a:endParaRPr lang="en-US"/>
@@ -1041,7 +1051,8 @@
           <a:p>
             <a:fld id="{DA584CC5-6B92-4E90-A501-052394C1965A}" type="datetimeFigureOut">
               <a:rPr lang="en-US" smtClean="0"/>
-              <a:t>7/2/2025</a:t>
+              <a:pPr/>
+              <a:t>7/3/2025</a:t>
             </a:fld>
             <a:endParaRPr lang="en-US"/>
           </a:p>
@@ -1083,6 +1094,7 @@
           <a:p>
             <a:fld id="{2FBD9FBA-E540-4D8F-97D2-506A094E5AAE}" type="slidenum">
               <a:rPr lang="en-US" smtClean="0"/>
+              <a:pPr/>
               <a:t>‹#›</a:t>
             </a:fld>
             <a:endParaRPr lang="en-US"/>
@@ -1324,7 +1336,8 @@
           <a:p>
             <a:fld id="{DA584CC5-6B92-4E90-A501-052394C1965A}" type="datetimeFigureOut">
               <a:rPr lang="en-US" smtClean="0"/>
-              <a:t>7/2/2025</a:t>
+              <a:pPr/>
+              <a:t>7/3/2025</a:t>
             </a:fld>
             <a:endParaRPr lang="en-US"/>
           </a:p>
@@ -1366,6 +1379,7 @@
           <a:p>
             <a:fld id="{2FBD9FBA-E540-4D8F-97D2-506A094E5AAE}" type="slidenum">
               <a:rPr lang="en-US" smtClean="0"/>
+              <a:pPr/>
               <a:t>‹#›</a:t>
             </a:fld>
             <a:endParaRPr lang="en-US"/>
@@ -1741,7 +1755,8 @@
           <a:p>
             <a:fld id="{DA584CC5-6B92-4E90-A501-052394C1965A}" type="datetimeFigureOut">
               <a:rPr lang="en-US" smtClean="0"/>
-              <a:t>7/2/2025</a:t>
+              <a:pPr/>
+              <a:t>7/3/2025</a:t>
             </a:fld>
             <a:endParaRPr lang="en-US"/>
           </a:p>
@@ -1783,6 +1798,7 @@
           <a:p>
             <a:fld id="{2FBD9FBA-E540-4D8F-97D2-506A094E5AAE}" type="slidenum">
               <a:rPr lang="en-US" smtClean="0"/>
+              <a:pPr/>
               <a:t>‹#›</a:t>
             </a:fld>
             <a:endParaRPr lang="en-US"/>
@@ -1854,7 +1870,8 @@
           <a:p>
             <a:fld id="{DA584CC5-6B92-4E90-A501-052394C1965A}" type="datetimeFigureOut">
               <a:rPr lang="en-US" smtClean="0"/>
-              <a:t>7/2/2025</a:t>
+              <a:pPr/>
+              <a:t>7/3/2025</a:t>
             </a:fld>
             <a:endParaRPr lang="en-US"/>
           </a:p>
@@ -1896,6 +1913,7 @@
           <a:p>
             <a:fld id="{2FBD9FBA-E540-4D8F-97D2-506A094E5AAE}" type="slidenum">
               <a:rPr lang="en-US" smtClean="0"/>
+              <a:pPr/>
               <a:t>‹#›</a:t>
             </a:fld>
             <a:endParaRPr lang="en-US"/>
@@ -1944,7 +1962,8 @@
           <a:p>
             <a:fld id="{DA584CC5-6B92-4E90-A501-052394C1965A}" type="datetimeFigureOut">
               <a:rPr lang="en-US" smtClean="0"/>
-              <a:t>7/2/2025</a:t>
+              <a:pPr/>
+              <a:t>7/3/2025</a:t>
             </a:fld>
             <a:endParaRPr lang="en-US"/>
           </a:p>
@@ -1986,6 +2005,7 @@
           <a:p>
             <a:fld id="{2FBD9FBA-E540-4D8F-97D2-506A094E5AAE}" type="slidenum">
               <a:rPr lang="en-US" smtClean="0"/>
+              <a:pPr/>
               <a:t>‹#›</a:t>
             </a:fld>
             <a:endParaRPr lang="en-US"/>
@@ -2216,7 +2236,8 @@
           <a:p>
             <a:fld id="{DA584CC5-6B92-4E90-A501-052394C1965A}" type="datetimeFigureOut">
               <a:rPr lang="en-US" smtClean="0"/>
-              <a:t>7/2/2025</a:t>
+              <a:pPr/>
+              <a:t>7/3/2025</a:t>
             </a:fld>
             <a:endParaRPr lang="en-US"/>
           </a:p>
@@ -2258,6 +2279,7 @@
           <a:p>
             <a:fld id="{2FBD9FBA-E540-4D8F-97D2-506A094E5AAE}" type="slidenum">
               <a:rPr lang="en-US" smtClean="0"/>
+              <a:pPr/>
               <a:t>‹#›</a:t>
             </a:fld>
             <a:endParaRPr lang="en-US"/>
@@ -2464,7 +2486,8 @@
           <a:p>
             <a:fld id="{DA584CC5-6B92-4E90-A501-052394C1965A}" type="datetimeFigureOut">
               <a:rPr lang="en-US" smtClean="0"/>
-              <a:t>7/2/2025</a:t>
+              <a:pPr/>
+              <a:t>7/3/2025</a:t>
             </a:fld>
             <a:endParaRPr lang="en-US"/>
           </a:p>
@@ -2506,6 +2529,7 @@
           <a:p>
             <a:fld id="{2FBD9FBA-E540-4D8F-97D2-506A094E5AAE}" type="slidenum">
               <a:rPr lang="en-US" smtClean="0"/>
+              <a:pPr/>
               <a:t>‹#›</a:t>
             </a:fld>
             <a:endParaRPr lang="en-US"/>
@@ -2672,7 +2696,8 @@
           <a:p>
             <a:fld id="{DA584CC5-6B92-4E90-A501-052394C1965A}" type="datetimeFigureOut">
               <a:rPr lang="en-US" smtClean="0"/>
-              <a:t>7/2/2025</a:t>
+              <a:pPr/>
+              <a:t>7/3/2025</a:t>
             </a:fld>
             <a:endParaRPr lang="en-US"/>
           </a:p>
@@ -2750,6 +2775,7 @@
           <a:p>
             <a:fld id="{2FBD9FBA-E540-4D8F-97D2-506A094E5AAE}" type="slidenum">
               <a:rPr lang="en-US" smtClean="0"/>
+              <a:pPr/>
               <a:t>‹#›</a:t>
             </a:fld>
             <a:endParaRPr lang="en-US"/>
@@ -3095,6 +3121,154 @@
 </p:sld>
 </file>
 
+<file path=ppt/slides/slide10.xml><?xml version="1.0" encoding="utf-8"?>
+<p:sld xmlns:a="http://schemas.openxmlformats.org/drawingml/2006/main" xmlns:r="http://schemas.openxmlformats.org/officeDocument/2006/relationships" xmlns:p="http://schemas.openxmlformats.org/presentationml/2006/main">
+  <p:cSld>
+    <p:spTree>
+      <p:nvGrpSpPr>
+        <p:cNvPr id="1" name=""/>
+        <p:cNvGrpSpPr/>
+        <p:nvPr/>
+      </p:nvGrpSpPr>
+      <p:grpSpPr>
+        <a:xfrm>
+          <a:off x="0" y="0"/>
+          <a:ext cx="0" cy="0"/>
+          <a:chOff x="0" y="0"/>
+          <a:chExt cx="0" cy="0"/>
+        </a:xfrm>
+      </p:grpSpPr>
+      <p:sp>
+        <p:nvSpPr>
+          <p:cNvPr id="2" name="Title 1"/>
+          <p:cNvSpPr>
+            <a:spLocks noGrp="1"/>
+          </p:cNvSpPr>
+          <p:nvPr>
+            <p:ph type="title"/>
+          </p:nvPr>
+        </p:nvSpPr>
+        <p:spPr/>
+        <p:txBody>
+          <a:bodyPr/>
+          <a:lstStyle/>
+          <a:p>
+            <a:endParaRPr lang="en-US"/>
+          </a:p>
+        </p:txBody>
+      </p:sp>
+      <p:sp>
+        <p:nvSpPr>
+          <p:cNvPr id="3" name="Content Placeholder 2"/>
+          <p:cNvSpPr>
+            <a:spLocks noGrp="1"/>
+          </p:cNvSpPr>
+          <p:nvPr>
+            <p:ph idx="1"/>
+          </p:nvPr>
+        </p:nvSpPr>
+        <p:spPr/>
+        <p:txBody>
+          <a:bodyPr/>
+          <a:lstStyle/>
+          <a:p>
+            <a:endParaRPr lang="en-US"/>
+          </a:p>
+        </p:txBody>
+      </p:sp>
+      <p:pic>
+        <p:nvPicPr>
+          <p:cNvPr id="7171" name="Picture 3" descr="C:\Users\Joshua Pan\Desktop\PSUYr2_scratch\qg_baroc_wv\yp_QG_TA.png"/>
+          <p:cNvPicPr>
+            <a:picLocks noChangeAspect="1" noChangeArrowheads="1"/>
+          </p:cNvPicPr>
+          <p:nvPr/>
+        </p:nvPicPr>
+        <p:blipFill>
+          <a:blip r:embed="rId2" cstate="print"/>
+          <a:srcRect b="4428"/>
+          <a:stretch>
+            <a:fillRect/>
+          </a:stretch>
+        </p:blipFill>
+        <p:spPr bwMode="auto">
+          <a:xfrm>
+            <a:off x="0" y="152400"/>
+            <a:ext cx="4572000" cy="3124200"/>
+          </a:xfrm>
+          <a:prstGeom prst="rect">
+            <a:avLst/>
+          </a:prstGeom>
+          <a:noFill/>
+        </p:spPr>
+      </p:pic>
+      <p:pic>
+        <p:nvPicPr>
+          <p:cNvPr id="7173" name="Picture 5" descr="C:\Users\Joshua Pan\Desktop\PSUYr2_scratch\qg_baroc_wv\yp_QG_VA.png"/>
+          <p:cNvPicPr>
+            <a:picLocks noChangeAspect="1" noChangeArrowheads="1"/>
+          </p:cNvPicPr>
+          <p:nvPr/>
+        </p:nvPicPr>
+        <p:blipFill>
+          <a:blip r:embed="rId3" cstate="print"/>
+          <a:srcRect b="4428"/>
+          <a:stretch>
+            <a:fillRect/>
+          </a:stretch>
+        </p:blipFill>
+        <p:spPr bwMode="auto">
+          <a:xfrm>
+            <a:off x="4572000" y="152400"/>
+            <a:ext cx="4572000" cy="3124200"/>
+          </a:xfrm>
+          <a:prstGeom prst="rect">
+            <a:avLst/>
+          </a:prstGeom>
+          <a:noFill/>
+        </p:spPr>
+      </p:pic>
+      <p:pic>
+        <p:nvPicPr>
+          <p:cNvPr id="7175" name="Picture 7" descr="C:\Users\Joshua Pan\Desktop\PSUYr2_scratch\qg_baroc_wv\yp_QG.png"/>
+          <p:cNvPicPr>
+            <a:picLocks noChangeAspect="1" noChangeArrowheads="1"/>
+          </p:cNvPicPr>
+          <p:nvPr/>
+        </p:nvPicPr>
+        <p:blipFill>
+          <a:blip r:embed="rId4" cstate="print"/>
+          <a:srcRect/>
+          <a:stretch>
+            <a:fillRect/>
+          </a:stretch>
+        </p:blipFill>
+        <p:spPr bwMode="auto">
+          <a:xfrm>
+            <a:off x="2133600" y="3302000"/>
+            <a:ext cx="5334000" cy="3556000"/>
+          </a:xfrm>
+          <a:prstGeom prst="rect">
+            <a:avLst/>
+          </a:prstGeom>
+          <a:noFill/>
+        </p:spPr>
+      </p:pic>
+    </p:spTree>
+  </p:cSld>
+  <p:clrMapOvr>
+    <a:masterClrMapping/>
+  </p:clrMapOvr>
+  <p:timing>
+    <p:tnLst>
+      <p:par>
+        <p:cTn id="1" dur="indefinite" restart="never" nodeType="tmRoot"/>
+      </p:par>
+    </p:tnLst>
+  </p:timing>
+</p:sld>
+</file>
+
 <file path=ppt/slides/slide2.xml><?xml version="1.0" encoding="utf-8"?>
 <p:sld xmlns:a="http://schemas.openxmlformats.org/drawingml/2006/main" xmlns:r="http://schemas.openxmlformats.org/officeDocument/2006/relationships" xmlns:p="http://schemas.openxmlformats.org/presentationml/2006/main">
   <p:cSld>
@@ -3112,6 +3286,352 @@
           <a:chExt cx="0" cy="0"/>
         </a:xfrm>
       </p:grpSpPr>
+      <p:grpSp>
+        <p:nvGrpSpPr>
+          <p:cNvPr id="9" name="Group 8"/>
+          <p:cNvGrpSpPr/>
+          <p:nvPr/>
+        </p:nvGrpSpPr>
+        <p:grpSpPr>
+          <a:xfrm>
+            <a:off x="0" y="457200"/>
+            <a:ext cx="4495800" cy="2997200"/>
+            <a:chOff x="5791200" y="0"/>
+            <a:chExt cx="4495800" cy="2997200"/>
+          </a:xfrm>
+        </p:grpSpPr>
+        <p:pic>
+          <p:nvPicPr>
+            <p:cNvPr id="1027" name="Picture 3" descr="C:\Users\Joshua Pan\Desktop\PSUYr2_scratch\qg_baroc_wv\yp_bg.png"/>
+            <p:cNvPicPr>
+              <a:picLocks noChangeAspect="1" noChangeArrowheads="1"/>
+            </p:cNvPicPr>
+            <p:nvPr/>
+          </p:nvPicPr>
+          <p:blipFill>
+            <a:blip r:embed="rId2" cstate="print"/>
+            <a:srcRect/>
+            <a:stretch>
+              <a:fillRect/>
+            </a:stretch>
+          </p:blipFill>
+          <p:spPr bwMode="auto">
+            <a:xfrm>
+              <a:off x="5791200" y="0"/>
+              <a:ext cx="4495800" cy="2997200"/>
+            </a:xfrm>
+            <a:prstGeom prst="rect">
+              <a:avLst/>
+            </a:prstGeom>
+            <a:noFill/>
+          </p:spPr>
+        </p:pic>
+        <p:sp>
+          <p:nvSpPr>
+            <p:cNvPr id="7" name="TextBox 6"/>
+            <p:cNvSpPr txBox="1"/>
+            <p:nvPr/>
+          </p:nvSpPr>
+          <p:spPr>
+            <a:xfrm>
+              <a:off x="7696200" y="2209800"/>
+              <a:ext cx="990600" cy="369332"/>
+            </a:xfrm>
+            <a:prstGeom prst="rect">
+              <a:avLst/>
+            </a:prstGeom>
+            <a:noFill/>
+          </p:spPr>
+          <p:txBody>
+            <a:bodyPr wrap="square" rtlCol="0">
+              <a:spAutoFit/>
+            </a:bodyPr>
+            <a:lstStyle/>
+            <a:p>
+              <a:r>
+                <a:rPr lang="en-US" dirty="0" smtClean="0"/>
+                <a:t>North→</a:t>
+              </a:r>
+              <a:endParaRPr lang="en-US" dirty="0"/>
+            </a:p>
+          </p:txBody>
+        </p:sp>
+      </p:grpSp>
+      <p:grpSp>
+        <p:nvGrpSpPr>
+          <p:cNvPr id="10" name="Group 9"/>
+          <p:cNvGrpSpPr/>
+          <p:nvPr/>
+        </p:nvGrpSpPr>
+        <p:grpSpPr>
+          <a:xfrm>
+            <a:off x="4543235" y="381000"/>
+            <a:ext cx="4600765" cy="3429000"/>
+            <a:chOff x="0" y="0"/>
+            <a:chExt cx="4600765" cy="3429000"/>
+          </a:xfrm>
+        </p:grpSpPr>
+        <p:pic>
+          <p:nvPicPr>
+            <p:cNvPr id="4098" name="Picture 2" descr="C:\Users\Joshua Pan\Desktop\PSUYr2_scratch\qg_baroc_wv\xp_T_Z.png"/>
+            <p:cNvPicPr>
+              <a:picLocks noChangeAspect="1" noChangeArrowheads="1"/>
+            </p:cNvPicPr>
+            <p:nvPr/>
+          </p:nvPicPr>
+          <p:blipFill>
+            <a:blip r:embed="rId3" cstate="print"/>
+            <a:srcRect/>
+            <a:stretch>
+              <a:fillRect/>
+            </a:stretch>
+          </p:blipFill>
+          <p:spPr bwMode="auto">
+            <a:xfrm>
+              <a:off x="0" y="0"/>
+              <a:ext cx="4600765" cy="3429000"/>
+            </a:xfrm>
+            <a:prstGeom prst="rect">
+              <a:avLst/>
+            </a:prstGeom>
+            <a:noFill/>
+          </p:spPr>
+        </p:pic>
+        <p:sp>
+          <p:nvSpPr>
+            <p:cNvPr id="8" name="TextBox 7"/>
+            <p:cNvSpPr txBox="1"/>
+            <p:nvPr/>
+          </p:nvSpPr>
+          <p:spPr>
+            <a:xfrm>
+              <a:off x="2895600" y="2667000"/>
+              <a:ext cx="990600" cy="369332"/>
+            </a:xfrm>
+            <a:prstGeom prst="rect">
+              <a:avLst/>
+            </a:prstGeom>
+            <a:noFill/>
+          </p:spPr>
+          <p:txBody>
+            <a:bodyPr wrap="square" rtlCol="0">
+              <a:spAutoFit/>
+            </a:bodyPr>
+            <a:lstStyle/>
+            <a:p>
+              <a:r>
+                <a:rPr lang="en-US" dirty="0" smtClean="0"/>
+                <a:t>East→</a:t>
+              </a:r>
+              <a:endParaRPr lang="en-US" dirty="0"/>
+            </a:p>
+          </p:txBody>
+        </p:sp>
+      </p:grpSp>
+      <p:sp>
+        <p:nvSpPr>
+          <p:cNvPr id="3" name="Content Placeholder 2"/>
+          <p:cNvSpPr>
+            <a:spLocks noGrp="1"/>
+          </p:cNvSpPr>
+          <p:nvPr>
+            <p:ph idx="1"/>
+          </p:nvPr>
+        </p:nvSpPr>
+        <p:spPr>
+          <a:xfrm>
+            <a:off x="457200" y="3657600"/>
+            <a:ext cx="8229600" cy="3124200"/>
+          </a:xfrm>
+        </p:spPr>
+        <p:txBody>
+          <a:bodyPr>
+            <a:noAutofit/>
+          </a:bodyPr>
+          <a:lstStyle/>
+          <a:p>
+            <a:r>
+              <a:rPr lang="en-US" sz="1450" dirty="0" smtClean="0"/>
+              <a:t>Model </a:t>
+            </a:r>
+            <a:r>
+              <a:rPr lang="en-US" sz="1450" dirty="0" err="1" smtClean="0"/>
+              <a:t>config</a:t>
+            </a:r>
+            <a:r>
+              <a:rPr lang="en-US" sz="1450" dirty="0" smtClean="0"/>
+              <a:t>: QG </a:t>
+            </a:r>
+            <a:r>
+              <a:rPr lang="en-US" sz="1450" dirty="0" err="1" smtClean="0"/>
+              <a:t>Boussinesq</a:t>
+            </a:r>
+            <a:r>
+              <a:rPr lang="en-US" sz="1450" dirty="0" smtClean="0"/>
+              <a:t> fluid on an </a:t>
+            </a:r>
+            <a:r>
+              <a:rPr lang="en-US" sz="1450" i="1" dirty="0" smtClean="0"/>
+              <a:t>f</a:t>
+            </a:r>
+            <a:r>
+              <a:rPr lang="en-US" sz="1450" dirty="0" smtClean="0"/>
+              <a:t>-plane at 45°N</a:t>
+            </a:r>
+          </a:p>
+          <a:p>
+            <a:r>
+              <a:rPr lang="en-US" sz="1450" dirty="0" smtClean="0"/>
+              <a:t>All fields shown have been generated from analytical expressions/approximations</a:t>
+            </a:r>
+          </a:p>
+          <a:p>
+            <a:r>
+              <a:rPr lang="en-US" sz="1450" dirty="0" err="1" smtClean="0"/>
+              <a:t>Baroclinic</a:t>
+            </a:r>
+            <a:r>
+              <a:rPr lang="en-US" sz="1450" dirty="0" smtClean="0"/>
+              <a:t> zonal-mean b</a:t>
+            </a:r>
+            <a:r>
+              <a:rPr lang="en-US" sz="1450" dirty="0" smtClean="0"/>
+              <a:t>ackground state (not strictly necessary for eddy flux diagnostics in a zonal-mean framework)</a:t>
+            </a:r>
+          </a:p>
+          <a:p>
+            <a:pPr lvl="1"/>
+            <a:r>
+              <a:rPr lang="en-US" sz="1450" dirty="0" smtClean="0"/>
+              <a:t>Stratification consistent with constant buoyancy freq. squared (</a:t>
+            </a:r>
+            <a:r>
+              <a:rPr lang="en-US" sz="1450" i="1" dirty="0" smtClean="0"/>
+              <a:t>N</a:t>
+            </a:r>
+            <a:r>
+              <a:rPr lang="en-US" sz="1450" baseline="30000" dirty="0" smtClean="0"/>
+              <a:t>2</a:t>
+            </a:r>
+            <a:r>
+              <a:rPr lang="en-US" sz="1450" dirty="0" smtClean="0"/>
+              <a:t>)</a:t>
+            </a:r>
+          </a:p>
+          <a:p>
+            <a:pPr lvl="1"/>
+            <a:r>
+              <a:rPr lang="en-US" sz="1450" dirty="0" smtClean="0"/>
+              <a:t>Vertical shear consistent with thermal wind balance</a:t>
+            </a:r>
+          </a:p>
+          <a:p>
+            <a:pPr lvl="1"/>
+            <a:r>
+              <a:rPr lang="en-US" sz="1450" dirty="0" err="1" smtClean="0"/>
+              <a:t>Ageostrophic</a:t>
+            </a:r>
+            <a:r>
+              <a:rPr lang="en-US" sz="1450" dirty="0" smtClean="0"/>
+              <a:t> </a:t>
+            </a:r>
+            <a:r>
+              <a:rPr lang="en-US" sz="1450" dirty="0" err="1" smtClean="0"/>
+              <a:t>meridional</a:t>
+            </a:r>
+            <a:r>
+              <a:rPr lang="en-US" sz="1450" dirty="0" smtClean="0"/>
+              <a:t> circulation not prescribed (will be diagnosed)</a:t>
+            </a:r>
+          </a:p>
+          <a:p>
+            <a:r>
+              <a:rPr lang="en-US" sz="1450" dirty="0" err="1" smtClean="0"/>
+              <a:t>Baroclinically</a:t>
+            </a:r>
+            <a:r>
+              <a:rPr lang="en-US" sz="1450" dirty="0" smtClean="0"/>
+              <a:t> unstable eddies (</a:t>
+            </a:r>
+            <a:r>
+              <a:rPr lang="en-US" sz="1450" dirty="0" err="1" smtClean="0"/>
+              <a:t>zonally</a:t>
+            </a:r>
+            <a:r>
+              <a:rPr lang="en-US" sz="1450" dirty="0" smtClean="0"/>
+              <a:t> sinusoidal, covering the entire latitude circle)</a:t>
+            </a:r>
+          </a:p>
+          <a:p>
+            <a:pPr lvl="1"/>
+            <a:r>
+              <a:rPr lang="en-US" sz="1450" dirty="0" err="1" smtClean="0"/>
+              <a:t>Barotropic</a:t>
+            </a:r>
+            <a:r>
+              <a:rPr lang="en-US" sz="1450" dirty="0" smtClean="0"/>
+              <a:t> component (i.e., lower-boundary condition Z1000) in </a:t>
+            </a:r>
+            <a:r>
+              <a:rPr lang="en-US" sz="1450" dirty="0" err="1" smtClean="0"/>
+              <a:t>quadrature</a:t>
+            </a:r>
+            <a:r>
+              <a:rPr lang="en-US" sz="1450" dirty="0" smtClean="0"/>
+              <a:t> with temperature anomalies to maximize lower-</a:t>
+            </a:r>
+            <a:r>
+              <a:rPr lang="en-US" sz="1450" dirty="0" err="1" smtClean="0"/>
+              <a:t>tropospheric</a:t>
+            </a:r>
+            <a:r>
+              <a:rPr lang="en-US" sz="1450" dirty="0" smtClean="0"/>
+              <a:t> advection</a:t>
+            </a:r>
+          </a:p>
+          <a:p>
+            <a:pPr lvl="1"/>
+            <a:r>
+              <a:rPr lang="en-US" sz="1450" dirty="0" err="1" smtClean="0"/>
+              <a:t>Baroclinic</a:t>
+            </a:r>
+            <a:r>
+              <a:rPr lang="en-US" sz="1450" dirty="0" smtClean="0"/>
+              <a:t> component must therefore tilt westward with height</a:t>
+            </a:r>
+          </a:p>
+          <a:p>
+            <a:pPr lvl="1"/>
+            <a:r>
+              <a:rPr lang="en-US" sz="1450" dirty="0" smtClean="0"/>
+              <a:t>Prescribed phase tilt in the </a:t>
+            </a:r>
+            <a:r>
+              <a:rPr lang="en-US" sz="1450" i="1" dirty="0" smtClean="0"/>
+              <a:t>x</a:t>
+            </a:r>
+            <a:r>
+              <a:rPr lang="en-US" sz="1450" dirty="0" smtClean="0"/>
+              <a:t>-</a:t>
+            </a:r>
+            <a:r>
+              <a:rPr lang="en-US" sz="1450" i="1" dirty="0" smtClean="0"/>
+              <a:t>y</a:t>
+            </a:r>
+            <a:r>
+              <a:rPr lang="en-US" sz="1450" dirty="0" smtClean="0"/>
+              <a:t> plane (see next slide…)</a:t>
+            </a:r>
+          </a:p>
+          <a:p>
+            <a:endParaRPr lang="en-US" sz="1450" dirty="0" smtClean="0"/>
+          </a:p>
+          <a:p>
+            <a:pPr lvl="1"/>
+            <a:endParaRPr lang="en-US" sz="1450" dirty="0" smtClean="0"/>
+          </a:p>
+        </p:txBody>
+      </p:sp>
       <p:sp>
         <p:nvSpPr>
           <p:cNvPr id="2" name="Title 1"/>
@@ -3122,60 +3642,26 @@
             <p:ph type="title"/>
           </p:nvPr>
         </p:nvSpPr>
-        <p:spPr/>
-        <p:txBody>
-          <a:bodyPr/>
+        <p:spPr>
+          <a:xfrm>
+            <a:off x="457200" y="0"/>
+            <a:ext cx="8229600" cy="457200"/>
+          </a:xfrm>
+        </p:spPr>
+        <p:txBody>
+          <a:bodyPr>
+            <a:noAutofit/>
+          </a:bodyPr>
           <a:lstStyle/>
           <a:p>
-            <a:endParaRPr lang="en-US"/>
-          </a:p>
-        </p:txBody>
-      </p:sp>
-      <p:sp>
-        <p:nvSpPr>
-          <p:cNvPr id="3" name="Content Placeholder 2"/>
-          <p:cNvSpPr>
-            <a:spLocks noGrp="1"/>
-          </p:cNvSpPr>
-          <p:nvPr>
-            <p:ph idx="1"/>
-          </p:nvPr>
-        </p:nvSpPr>
-        <p:spPr/>
-        <p:txBody>
-          <a:bodyPr/>
-          <a:lstStyle/>
-          <a:p>
-            <a:endParaRPr lang="en-US"/>
-          </a:p>
-        </p:txBody>
-      </p:sp>
-      <p:pic>
-        <p:nvPicPr>
-          <p:cNvPr id="4098" name="Picture 2" descr="C:\Users\Joshua Pan\Desktop\PSUYr2_scratch\qg_baroc_wv\xp_T_Z.png"/>
-          <p:cNvPicPr>
-            <a:picLocks noChangeAspect="1" noChangeArrowheads="1"/>
-          </p:cNvPicPr>
-          <p:nvPr/>
-        </p:nvPicPr>
-        <p:blipFill>
-          <a:blip r:embed="rId2" cstate="print"/>
-          <a:srcRect/>
-          <a:stretch>
-            <a:fillRect/>
-          </a:stretch>
-        </p:blipFill>
-        <p:spPr bwMode="auto">
-          <a:xfrm>
-            <a:off x="1905000" y="0"/>
-            <a:ext cx="5725396" cy="4267200"/>
-          </a:xfrm>
-          <a:prstGeom prst="rect">
-            <a:avLst/>
-          </a:prstGeom>
-          <a:noFill/>
-        </p:spPr>
-      </p:pic>
+            <a:r>
+              <a:rPr lang="en-US" sz="3600" dirty="0" smtClean="0"/>
+              <a:t>Overview of setup</a:t>
+            </a:r>
+            <a:endParaRPr lang="en-US" sz="3600" dirty="0"/>
+          </a:p>
+        </p:txBody>
+      </p:sp>
     </p:spTree>
   </p:cSld>
   <p:clrMapOvr>
@@ -3237,12 +3723,134 @@
             <p:ph idx="1"/>
           </p:nvPr>
         </p:nvSpPr>
-        <p:spPr/>
-        <p:txBody>
-          <a:bodyPr/>
+        <p:spPr>
+          <a:xfrm>
+            <a:off x="457200" y="3886200"/>
+            <a:ext cx="8229600" cy="2971800"/>
+          </a:xfrm>
+        </p:spPr>
+        <p:txBody>
+          <a:bodyPr>
+            <a:normAutofit/>
+          </a:bodyPr>
           <a:lstStyle/>
           <a:p>
-            <a:endParaRPr lang="en-US"/>
+            <a:pPr>
+              <a:buNone/>
+            </a:pPr>
+            <a:r>
+              <a:rPr lang="en-US" sz="2800" b="1" dirty="0" err="1" smtClean="0"/>
+              <a:t>Meridional</a:t>
+            </a:r>
+            <a:r>
+              <a:rPr lang="en-US" sz="2800" b="1" dirty="0" smtClean="0"/>
+              <a:t> eddy fluxes</a:t>
+            </a:r>
+          </a:p>
+          <a:p>
+            <a:r>
+              <a:rPr lang="en-US" sz="1800" dirty="0" err="1" smtClean="0"/>
+              <a:t>Meridional</a:t>
+            </a:r>
+            <a:r>
+              <a:rPr lang="en-US" sz="1800" dirty="0" smtClean="0"/>
+              <a:t> eddy heat flux (</a:t>
+            </a:r>
+            <a:r>
+              <a:rPr lang="en-US" sz="1800" b="1" dirty="0" smtClean="0"/>
+              <a:t>EHF</a:t>
+            </a:r>
+            <a:r>
+              <a:rPr lang="en-US" sz="1800" dirty="0" smtClean="0"/>
+              <a:t>) is overwhelmingly </a:t>
+            </a:r>
+            <a:r>
+              <a:rPr lang="en-US" sz="1800" dirty="0" err="1" smtClean="0"/>
+              <a:t>poleward</a:t>
+            </a:r>
+            <a:r>
+              <a:rPr lang="en-US" sz="1800" dirty="0" smtClean="0"/>
+              <a:t> as </a:t>
+            </a:r>
+            <a:r>
+              <a:rPr lang="en-US" sz="1800" i="1" dirty="0" smtClean="0"/>
+              <a:t>v</a:t>
+            </a:r>
+            <a:r>
+              <a:rPr lang="en-US" sz="1800" dirty="0" smtClean="0"/>
+              <a:t>’ and </a:t>
+            </a:r>
+            <a:r>
+              <a:rPr lang="en-US" sz="1800" i="1" dirty="0" smtClean="0"/>
+              <a:t>T</a:t>
+            </a:r>
+            <a:r>
+              <a:rPr lang="en-US" sz="1800" dirty="0" smtClean="0"/>
+              <a:t>’ are in-phase in the lower-troposphere</a:t>
+            </a:r>
+          </a:p>
+          <a:p>
+            <a:r>
+              <a:rPr lang="en-US" sz="1800" dirty="0" smtClean="0"/>
+              <a:t>Phase tilt in the </a:t>
+            </a:r>
+            <a:r>
+              <a:rPr lang="en-US" sz="1800" i="1" dirty="0" smtClean="0"/>
+              <a:t>x</a:t>
+            </a:r>
+            <a:r>
+              <a:rPr lang="en-US" sz="1800" dirty="0" smtClean="0"/>
+              <a:t>-</a:t>
+            </a:r>
+            <a:r>
+              <a:rPr lang="en-US" sz="1800" i="1" dirty="0" smtClean="0"/>
+              <a:t>y</a:t>
+            </a:r>
+            <a:r>
+              <a:rPr lang="en-US" sz="1800" dirty="0" smtClean="0"/>
+              <a:t> plane allow </a:t>
+            </a:r>
+            <a:r>
+              <a:rPr lang="en-US" sz="1800" i="1" dirty="0" smtClean="0"/>
+              <a:t>u</a:t>
+            </a:r>
+            <a:r>
+              <a:rPr lang="en-US" sz="1800" dirty="0" smtClean="0"/>
+              <a:t>’ and </a:t>
+            </a:r>
+            <a:r>
+              <a:rPr lang="en-US" sz="1800" i="1" dirty="0" smtClean="0"/>
+              <a:t>v</a:t>
+            </a:r>
+            <a:r>
+              <a:rPr lang="en-US" sz="1800" dirty="0" smtClean="0"/>
+              <a:t>’ to </a:t>
+            </a:r>
+            <a:r>
+              <a:rPr lang="en-US" sz="1800" dirty="0" err="1" smtClean="0"/>
+              <a:t>covary</a:t>
+            </a:r>
+            <a:r>
+              <a:rPr lang="en-US" sz="1800" dirty="0" smtClean="0"/>
+              <a:t> in the zonal mean, giving rise to net </a:t>
+            </a:r>
+            <a:r>
+              <a:rPr lang="en-US" sz="1800" dirty="0" err="1" smtClean="0"/>
+              <a:t>poleward</a:t>
+            </a:r>
+            <a:r>
+              <a:rPr lang="en-US" sz="1800" dirty="0" smtClean="0"/>
+              <a:t> fluxes of westerly momentum (eddy momentum flux; </a:t>
+            </a:r>
+            <a:r>
+              <a:rPr lang="en-US" sz="1800" b="1" dirty="0" smtClean="0"/>
+              <a:t>EMF</a:t>
+            </a:r>
+            <a:r>
+              <a:rPr lang="en-US" sz="1800" dirty="0" smtClean="0"/>
+              <a:t>)</a:t>
+            </a:r>
+            <a:endParaRPr lang="en-US" sz="1800" dirty="0"/>
           </a:p>
         </p:txBody>
       </p:sp>
@@ -3349,25 +3957,6 @@
           </a:p>
         </p:txBody>
       </p:sp>
-      <p:sp>
-        <p:nvSpPr>
-          <p:cNvPr id="3" name="Content Placeholder 2"/>
-          <p:cNvSpPr>
-            <a:spLocks noGrp="1"/>
-          </p:cNvSpPr>
-          <p:nvPr>
-            <p:ph idx="1"/>
-          </p:nvPr>
-        </p:nvSpPr>
-        <p:spPr/>
-        <p:txBody>
-          <a:bodyPr/>
-          <a:lstStyle/>
-          <a:p>
-            <a:endParaRPr lang="en-US"/>
-          </a:p>
-        </p:txBody>
-      </p:sp>
       <p:pic>
         <p:nvPicPr>
           <p:cNvPr id="1026" name="Picture 2" descr="C:\Users\Joshua Pan\Desktop\PSUYr2_scratch\qg_baroc_wv\xy_Zp_Ttot_Vtot.png"/>
@@ -3420,6 +4009,93 @@
           <a:noFill/>
         </p:spPr>
       </p:pic>
+      <p:sp>
+        <p:nvSpPr>
+          <p:cNvPr id="6" name="Content Placeholder 2"/>
+          <p:cNvSpPr>
+            <a:spLocks noGrp="1"/>
+          </p:cNvSpPr>
+          <p:nvPr>
+            <p:ph idx="1"/>
+          </p:nvPr>
+        </p:nvSpPr>
+        <p:spPr>
+          <a:xfrm>
+            <a:off x="457200" y="3886200"/>
+            <a:ext cx="8229600" cy="2971800"/>
+          </a:xfrm>
+        </p:spPr>
+        <p:txBody>
+          <a:bodyPr>
+            <a:normAutofit/>
+          </a:bodyPr>
+          <a:lstStyle/>
+          <a:p>
+            <a:pPr>
+              <a:buNone/>
+            </a:pPr>
+            <a:r>
+              <a:rPr lang="en-US" sz="2400" b="1" dirty="0" smtClean="0"/>
+              <a:t>Typical synoptic map view of T and T advection</a:t>
+            </a:r>
+          </a:p>
+          <a:p>
+            <a:r>
+              <a:rPr lang="en-US" sz="1800" dirty="0" smtClean="0"/>
+              <a:t>Cold air advection (CAA) is generally upstream of cyclones, and warm air advection (WAA) occurs downstream of cyclones.</a:t>
+            </a:r>
+          </a:p>
+          <a:p>
+            <a:r>
+              <a:rPr lang="en-US" sz="1800" dirty="0" smtClean="0"/>
+              <a:t>No realistic frontal structures are present because</a:t>
+            </a:r>
+          </a:p>
+          <a:p>
+            <a:pPr marL="800100" lvl="1" indent="-342900">
+              <a:buFont typeface="+mj-lt"/>
+              <a:buAutoNum type="arabicParenR"/>
+            </a:pPr>
+            <a:r>
+              <a:rPr lang="en-US" sz="1600" dirty="0" smtClean="0"/>
+              <a:t>Practically: they add a lot of mathematical complexity</a:t>
+            </a:r>
+          </a:p>
+          <a:p>
+            <a:pPr marL="800100" lvl="1" indent="-342900">
+              <a:buFont typeface="+mj-lt"/>
+              <a:buAutoNum type="arabicParenR"/>
+            </a:pPr>
+            <a:r>
+              <a:rPr lang="en-US" sz="1600" dirty="0" smtClean="0"/>
+              <a:t>Dynamically: there has been no prognostic model evolution to allow for </a:t>
+            </a:r>
+            <a:r>
+              <a:rPr lang="en-US" sz="1600" dirty="0" err="1" smtClean="0"/>
+              <a:t>frontogenic</a:t>
+            </a:r>
+            <a:r>
+              <a:rPr lang="en-US" sz="1600" dirty="0" smtClean="0"/>
+              <a:t> processes/feedbacks. Note that such processes would be better described by </a:t>
+            </a:r>
+            <a:r>
+              <a:rPr lang="en-US" sz="1600" dirty="0" err="1" smtClean="0"/>
+              <a:t>semigeostrophic</a:t>
+            </a:r>
+            <a:r>
+              <a:rPr lang="en-US" sz="1600" dirty="0" smtClean="0"/>
+              <a:t> dynamics.</a:t>
+            </a:r>
+          </a:p>
+          <a:p>
+            <a:pPr marL="800100" lvl="1" indent="-342900">
+              <a:buFont typeface="+mj-lt"/>
+              <a:buAutoNum type="arabicParenR"/>
+            </a:pPr>
+            <a:endParaRPr lang="en-US" sz="1400" dirty="0" smtClean="0"/>
+          </a:p>
+        </p:txBody>
+      </p:sp>
     </p:spTree>
   </p:cSld>
   <p:clrMapOvr>
@@ -3460,25 +4136,6 @@
           </p:cNvSpPr>
           <p:nvPr>
             <p:ph type="title"/>
-          </p:nvPr>
-        </p:nvSpPr>
-        <p:spPr/>
-        <p:txBody>
-          <a:bodyPr/>
-          <a:lstStyle/>
-          <a:p>
-            <a:endParaRPr lang="en-US"/>
-          </a:p>
-        </p:txBody>
-      </p:sp>
-      <p:sp>
-        <p:nvSpPr>
-          <p:cNvPr id="3" name="Content Placeholder 2"/>
-          <p:cNvSpPr>
-            <a:spLocks noGrp="1"/>
-          </p:cNvSpPr>
-          <p:nvPr>
-            <p:ph idx="1"/>
           </p:nvPr>
         </p:nvSpPr>
         <p:spPr/>
@@ -3542,6 +4199,486 @@
           <a:noFill/>
         </p:spPr>
       </p:pic>
+      <p:sp>
+        <p:nvSpPr>
+          <p:cNvPr id="6" name="Content Placeholder 2"/>
+          <p:cNvSpPr txBox="1">
+            <a:spLocks/>
+          </p:cNvSpPr>
+          <p:nvPr/>
+        </p:nvSpPr>
+        <p:spPr>
+          <a:xfrm>
+            <a:off x="457200" y="3962400"/>
+            <a:ext cx="8229600" cy="2895600"/>
+          </a:xfrm>
+          <a:prstGeom prst="rect">
+            <a:avLst/>
+          </a:prstGeom>
+        </p:spPr>
+        <p:txBody>
+          <a:bodyPr vert="horz" lIns="91440" tIns="45720" rIns="91440" bIns="45720" rtlCol="0">
+            <a:normAutofit/>
+          </a:bodyPr>
+          <a:lstStyle/>
+          <a:p>
+            <a:pPr marL="342900" marR="0" lvl="0" indent="-342900" algn="l" defTabSz="914400" rtl="0" eaLnBrk="1" fontAlgn="auto" latinLnBrk="0" hangingPunct="1">
+              <a:lnSpc>
+                <a:spcPct val="100000"/>
+              </a:lnSpc>
+              <a:spcBef>
+                <a:spcPct val="20000"/>
+              </a:spcBef>
+              <a:spcAft>
+                <a:spcPts val="0"/>
+              </a:spcAft>
+              <a:buClrTx/>
+              <a:buSzTx/>
+              <a:buFont typeface="Arial" pitchFamily="34" charset="0"/>
+              <a:buNone/>
+              <a:tabLst/>
+              <a:defRPr/>
+            </a:pPr>
+            <a:r>
+              <a:rPr kumimoji="0" lang="en-US" sz="2400" b="1" i="0" u="none" strike="noStrike" kern="1200" cap="none" spc="0" normalizeH="0" baseline="0" noProof="0" dirty="0" smtClean="0">
+                <a:ln>
+                  <a:noFill/>
+                </a:ln>
+                <a:solidFill>
+                  <a:schemeClr val="tx1"/>
+                </a:solidFill>
+                <a:effectLst/>
+                <a:uLnTx/>
+                <a:uFillTx/>
+                <a:latin typeface="+mn-lt"/>
+                <a:ea typeface="+mn-ea"/>
+                <a:cs typeface="+mn-cs"/>
+              </a:rPr>
+              <a:t>Typical synoptic map view of relative</a:t>
+            </a:r>
+            <a:r>
+              <a:rPr kumimoji="0" lang="en-US" sz="2400" b="1" i="0" u="none" strike="noStrike" kern="1200" cap="none" spc="0" normalizeH="0" noProof="0" dirty="0" smtClean="0">
+                <a:ln>
+                  <a:noFill/>
+                </a:ln>
+                <a:solidFill>
+                  <a:schemeClr val="tx1"/>
+                </a:solidFill>
+                <a:effectLst/>
+                <a:uLnTx/>
+                <a:uFillTx/>
+                <a:latin typeface="+mn-lt"/>
+                <a:ea typeface="+mn-ea"/>
+                <a:cs typeface="+mn-cs"/>
+              </a:rPr>
+              <a:t> </a:t>
+            </a:r>
+            <a:r>
+              <a:rPr kumimoji="0" lang="en-US" sz="2400" b="1" i="0" u="none" strike="noStrike" kern="1200" cap="none" spc="0" normalizeH="0" noProof="0" dirty="0" err="1" smtClean="0">
+                <a:ln>
+                  <a:noFill/>
+                </a:ln>
+                <a:solidFill>
+                  <a:schemeClr val="tx1"/>
+                </a:solidFill>
+                <a:effectLst/>
+                <a:uLnTx/>
+                <a:uFillTx/>
+                <a:latin typeface="+mn-lt"/>
+                <a:ea typeface="+mn-ea"/>
+                <a:cs typeface="+mn-cs"/>
+              </a:rPr>
+              <a:t>vorticity</a:t>
+            </a:r>
+            <a:endParaRPr kumimoji="0" lang="en-US" sz="2400" b="1" i="0" u="none" strike="noStrike" kern="1200" cap="none" spc="0" normalizeH="0" baseline="0" noProof="0" dirty="0" smtClean="0">
+              <a:ln>
+                <a:noFill/>
+              </a:ln>
+              <a:solidFill>
+                <a:schemeClr val="tx1"/>
+              </a:solidFill>
+              <a:effectLst/>
+              <a:uLnTx/>
+              <a:uFillTx/>
+              <a:latin typeface="+mn-lt"/>
+              <a:ea typeface="+mn-ea"/>
+              <a:cs typeface="+mn-cs"/>
+            </a:endParaRPr>
+          </a:p>
+          <a:p>
+            <a:pPr marL="342900" marR="0" lvl="0" indent="-342900" algn="l" defTabSz="914400" rtl="0" eaLnBrk="1" fontAlgn="auto" latinLnBrk="0" hangingPunct="1">
+              <a:lnSpc>
+                <a:spcPct val="100000"/>
+              </a:lnSpc>
+              <a:spcBef>
+                <a:spcPct val="20000"/>
+              </a:spcBef>
+              <a:spcAft>
+                <a:spcPts val="0"/>
+              </a:spcAft>
+              <a:buClrTx/>
+              <a:buSzTx/>
+              <a:buFont typeface="Arial" pitchFamily="34" charset="0"/>
+              <a:buChar char="•"/>
+              <a:tabLst/>
+              <a:defRPr/>
+            </a:pPr>
+            <a:r>
+              <a:rPr kumimoji="0" lang="en-US" sz="1800" b="0" i="0" u="none" strike="noStrike" kern="1200" cap="none" spc="0" normalizeH="0" baseline="0" noProof="0" dirty="0" smtClean="0">
+                <a:ln>
+                  <a:noFill/>
+                </a:ln>
+                <a:solidFill>
+                  <a:schemeClr val="tx1"/>
+                </a:solidFill>
+                <a:effectLst/>
+                <a:uLnTx/>
+                <a:uFillTx/>
+                <a:latin typeface="+mn-lt"/>
+                <a:ea typeface="+mn-ea"/>
+                <a:cs typeface="+mn-cs"/>
+              </a:rPr>
+              <a:t>Both the</a:t>
+            </a:r>
+            <a:r>
+              <a:rPr kumimoji="0" lang="en-US" sz="1800" b="0" i="0" u="none" strike="noStrike" kern="1200" cap="none" spc="0" normalizeH="0" noProof="0" dirty="0" smtClean="0">
+                <a:ln>
+                  <a:noFill/>
+                </a:ln>
+                <a:solidFill>
+                  <a:schemeClr val="tx1"/>
+                </a:solidFill>
+                <a:effectLst/>
+                <a:uLnTx/>
+                <a:uFillTx/>
+                <a:latin typeface="+mn-lt"/>
+                <a:ea typeface="+mn-ea"/>
+                <a:cs typeface="+mn-cs"/>
+              </a:rPr>
+              <a:t> eddies and the </a:t>
+            </a:r>
+            <a:r>
+              <a:rPr kumimoji="0" lang="en-US" sz="1800" b="0" i="0" u="none" strike="noStrike" kern="1200" cap="none" spc="0" normalizeH="0" noProof="0" dirty="0" err="1" smtClean="0">
+                <a:ln>
+                  <a:noFill/>
+                </a:ln>
+                <a:solidFill>
+                  <a:schemeClr val="tx1"/>
+                </a:solidFill>
+                <a:effectLst/>
+                <a:uLnTx/>
+                <a:uFillTx/>
+                <a:latin typeface="+mn-lt"/>
+                <a:ea typeface="+mn-ea"/>
+                <a:cs typeface="+mn-cs"/>
+              </a:rPr>
+              <a:t>meridional</a:t>
+            </a:r>
+            <a:r>
+              <a:rPr kumimoji="0" lang="en-US" sz="1800" b="0" i="0" u="none" strike="noStrike" kern="1200" cap="none" spc="0" normalizeH="0" noProof="0" dirty="0" smtClean="0">
+                <a:ln>
+                  <a:noFill/>
+                </a:ln>
+                <a:solidFill>
+                  <a:schemeClr val="tx1"/>
+                </a:solidFill>
+                <a:effectLst/>
+                <a:uLnTx/>
+                <a:uFillTx/>
+                <a:latin typeface="+mn-lt"/>
+                <a:ea typeface="+mn-ea"/>
+                <a:cs typeface="+mn-cs"/>
+              </a:rPr>
+              <a:t> shear of the zonal-mean jet contribute to the relative </a:t>
+            </a:r>
+            <a:r>
+              <a:rPr kumimoji="0" lang="en-US" sz="1800" b="0" i="0" u="none" strike="noStrike" kern="1200" cap="none" spc="0" normalizeH="0" noProof="0" dirty="0" err="1" smtClean="0">
+                <a:ln>
+                  <a:noFill/>
+                </a:ln>
+                <a:solidFill>
+                  <a:schemeClr val="tx1"/>
+                </a:solidFill>
+                <a:effectLst/>
+                <a:uLnTx/>
+                <a:uFillTx/>
+                <a:latin typeface="+mn-lt"/>
+                <a:ea typeface="+mn-ea"/>
+                <a:cs typeface="+mn-cs"/>
+              </a:rPr>
+              <a:t>vorticity</a:t>
+            </a:r>
+            <a:r>
+              <a:rPr kumimoji="0" lang="en-US" sz="1800" b="0" i="0" u="none" strike="noStrike" kern="1200" cap="none" spc="0" normalizeH="0" noProof="0" dirty="0" smtClean="0">
+                <a:ln>
+                  <a:noFill/>
+                </a:ln>
+                <a:solidFill>
+                  <a:schemeClr val="tx1"/>
+                </a:solidFill>
+                <a:effectLst/>
+                <a:uLnTx/>
+                <a:uFillTx/>
+                <a:latin typeface="+mn-lt"/>
+                <a:ea typeface="+mn-ea"/>
+                <a:cs typeface="+mn-cs"/>
+              </a:rPr>
+              <a:t> fields.</a:t>
+            </a:r>
+            <a:endParaRPr kumimoji="0" lang="en-US" sz="1800" b="0" i="0" u="none" strike="noStrike" kern="1200" cap="none" spc="0" normalizeH="0" baseline="0" noProof="0" dirty="0" smtClean="0">
+              <a:ln>
+                <a:noFill/>
+              </a:ln>
+              <a:solidFill>
+                <a:schemeClr val="tx1"/>
+              </a:solidFill>
+              <a:effectLst/>
+              <a:uLnTx/>
+              <a:uFillTx/>
+              <a:latin typeface="+mn-lt"/>
+              <a:ea typeface="+mn-ea"/>
+              <a:cs typeface="+mn-cs"/>
+            </a:endParaRPr>
+          </a:p>
+          <a:p>
+            <a:pPr marL="342900" marR="0" lvl="0" indent="-342900" algn="l" defTabSz="914400" rtl="0" eaLnBrk="1" fontAlgn="auto" latinLnBrk="0" hangingPunct="1">
+              <a:lnSpc>
+                <a:spcPct val="100000"/>
+              </a:lnSpc>
+              <a:spcBef>
+                <a:spcPct val="20000"/>
+              </a:spcBef>
+              <a:spcAft>
+                <a:spcPts val="0"/>
+              </a:spcAft>
+              <a:buClrTx/>
+              <a:buSzTx/>
+              <a:buFont typeface="Arial" pitchFamily="34" charset="0"/>
+              <a:buChar char="•"/>
+              <a:tabLst/>
+              <a:defRPr/>
+            </a:pPr>
+            <a:r>
+              <a:rPr kumimoji="0" lang="en-US" sz="1800" b="0" i="0" u="none" strike="noStrike" kern="1200" cap="none" spc="0" normalizeH="0" baseline="0" noProof="0" dirty="0" smtClean="0">
+                <a:ln>
+                  <a:noFill/>
+                </a:ln>
+                <a:solidFill>
+                  <a:schemeClr val="tx1"/>
+                </a:solidFill>
+                <a:effectLst/>
+                <a:uLnTx/>
+                <a:uFillTx/>
+                <a:latin typeface="+mn-lt"/>
+                <a:ea typeface="+mn-ea"/>
+                <a:cs typeface="+mn-cs"/>
+              </a:rPr>
+              <a:t>Due to the </a:t>
+            </a:r>
+            <a:r>
+              <a:rPr kumimoji="0" lang="en-US" sz="1800" b="0" i="1" u="none" strike="noStrike" kern="1200" cap="none" spc="0" normalizeH="0" baseline="0" noProof="0" dirty="0" smtClean="0">
+                <a:ln>
+                  <a:noFill/>
+                </a:ln>
+                <a:solidFill>
+                  <a:schemeClr val="tx1"/>
+                </a:solidFill>
+                <a:effectLst/>
+                <a:uLnTx/>
+                <a:uFillTx/>
+                <a:latin typeface="+mn-lt"/>
+                <a:ea typeface="+mn-ea"/>
+                <a:cs typeface="+mn-cs"/>
+              </a:rPr>
+              <a:t>x</a:t>
+            </a:r>
+            <a:r>
+              <a:rPr kumimoji="0" lang="en-US" sz="1800" b="0" i="0" u="none" strike="noStrike" kern="1200" cap="none" spc="0" normalizeH="0" baseline="0" noProof="0" dirty="0" smtClean="0">
+                <a:ln>
+                  <a:noFill/>
+                </a:ln>
+                <a:solidFill>
+                  <a:schemeClr val="tx1"/>
+                </a:solidFill>
+                <a:effectLst/>
+                <a:uLnTx/>
+                <a:uFillTx/>
+                <a:latin typeface="+mn-lt"/>
+                <a:ea typeface="+mn-ea"/>
+                <a:cs typeface="+mn-cs"/>
+              </a:rPr>
+              <a:t>-</a:t>
+            </a:r>
+            <a:r>
+              <a:rPr kumimoji="0" lang="en-US" sz="1800" b="0" i="1" u="none" strike="noStrike" kern="1200" cap="none" spc="0" normalizeH="0" baseline="0" noProof="0" dirty="0" smtClean="0">
+                <a:ln>
+                  <a:noFill/>
+                </a:ln>
+                <a:solidFill>
+                  <a:schemeClr val="tx1"/>
+                </a:solidFill>
+                <a:effectLst/>
+                <a:uLnTx/>
+                <a:uFillTx/>
+                <a:latin typeface="+mn-lt"/>
+                <a:ea typeface="+mn-ea"/>
+                <a:cs typeface="+mn-cs"/>
+              </a:rPr>
+              <a:t>y</a:t>
+            </a:r>
+            <a:r>
+              <a:rPr kumimoji="0" lang="en-US" sz="1800" b="0" i="0" u="none" strike="noStrike" kern="1200" cap="none" spc="0" normalizeH="0" baseline="0" noProof="0" dirty="0" smtClean="0">
+                <a:ln>
+                  <a:noFill/>
+                </a:ln>
+                <a:solidFill>
+                  <a:schemeClr val="tx1"/>
+                </a:solidFill>
+                <a:effectLst/>
+                <a:uLnTx/>
+                <a:uFillTx/>
+                <a:latin typeface="+mn-lt"/>
+                <a:ea typeface="+mn-ea"/>
+                <a:cs typeface="+mn-cs"/>
+              </a:rPr>
+              <a:t> phase tilt, the lobes</a:t>
+            </a:r>
+            <a:r>
+              <a:rPr kumimoji="0" lang="en-US" sz="1800" b="0" i="0" u="none" strike="noStrike" kern="1200" cap="none" spc="0" normalizeH="0" noProof="0" dirty="0" smtClean="0">
+                <a:ln>
+                  <a:noFill/>
+                </a:ln>
+                <a:solidFill>
+                  <a:schemeClr val="tx1"/>
+                </a:solidFill>
+                <a:effectLst/>
+                <a:uLnTx/>
+                <a:uFillTx/>
+                <a:latin typeface="+mn-lt"/>
+                <a:ea typeface="+mn-ea"/>
+                <a:cs typeface="+mn-cs"/>
+              </a:rPr>
+              <a:t> of </a:t>
+            </a:r>
+            <a:r>
+              <a:rPr kumimoji="0" lang="en-US" sz="1800" b="0" i="0" u="none" strike="noStrike" kern="1200" cap="none" spc="0" normalizeH="0" noProof="0" dirty="0" err="1" smtClean="0">
+                <a:ln>
+                  <a:noFill/>
+                </a:ln>
+                <a:solidFill>
+                  <a:schemeClr val="tx1"/>
+                </a:solidFill>
+                <a:effectLst/>
+                <a:uLnTx/>
+                <a:uFillTx/>
+                <a:latin typeface="+mn-lt"/>
+                <a:ea typeface="+mn-ea"/>
+                <a:cs typeface="+mn-cs"/>
+              </a:rPr>
+              <a:t>anticyclonic</a:t>
+            </a:r>
+            <a:r>
+              <a:rPr kumimoji="0" lang="en-US" sz="1800" b="0" i="0" u="none" strike="noStrike" kern="1200" cap="none" spc="0" normalizeH="0" noProof="0" dirty="0" smtClean="0">
+                <a:ln>
+                  <a:noFill/>
+                </a:ln>
+                <a:solidFill>
+                  <a:schemeClr val="tx1"/>
+                </a:solidFill>
+                <a:effectLst/>
+                <a:uLnTx/>
+                <a:uFillTx/>
+                <a:latin typeface="+mn-lt"/>
+                <a:ea typeface="+mn-ea"/>
+                <a:cs typeface="+mn-cs"/>
+              </a:rPr>
+              <a:t> (negative) </a:t>
+            </a:r>
+            <a:r>
+              <a:rPr kumimoji="0" lang="en-US" sz="1800" b="0" i="0" u="none" strike="noStrike" kern="1200" cap="none" spc="0" normalizeH="0" noProof="0" dirty="0" err="1" smtClean="0">
+                <a:ln>
+                  <a:noFill/>
+                </a:ln>
+                <a:solidFill>
+                  <a:schemeClr val="tx1"/>
+                </a:solidFill>
+                <a:effectLst/>
+                <a:uLnTx/>
+                <a:uFillTx/>
+                <a:latin typeface="+mn-lt"/>
+                <a:ea typeface="+mn-ea"/>
+                <a:cs typeface="+mn-cs"/>
+              </a:rPr>
+              <a:t>vorticity</a:t>
+            </a:r>
+            <a:r>
+              <a:rPr kumimoji="0" lang="en-US" sz="1800" b="0" i="0" u="none" strike="noStrike" kern="1200" cap="none" spc="0" normalizeH="0" noProof="0" dirty="0" smtClean="0">
+                <a:ln>
+                  <a:noFill/>
+                </a:ln>
+                <a:solidFill>
+                  <a:schemeClr val="tx1"/>
+                </a:solidFill>
+                <a:effectLst/>
+                <a:uLnTx/>
+                <a:uFillTx/>
+                <a:latin typeface="+mn-lt"/>
+                <a:ea typeface="+mn-ea"/>
+                <a:cs typeface="+mn-cs"/>
+              </a:rPr>
+              <a:t> advection are slightly stronger than lobes of cyclonic </a:t>
+            </a:r>
+            <a:r>
+              <a:rPr kumimoji="0" lang="en-US" sz="1800" b="0" i="0" u="none" strike="noStrike" kern="1200" cap="none" spc="0" normalizeH="0" noProof="0" dirty="0" err="1" smtClean="0">
+                <a:ln>
+                  <a:noFill/>
+                </a:ln>
+                <a:solidFill>
+                  <a:schemeClr val="tx1"/>
+                </a:solidFill>
+                <a:effectLst/>
+                <a:uLnTx/>
+                <a:uFillTx/>
+                <a:latin typeface="+mn-lt"/>
+                <a:ea typeface="+mn-ea"/>
+                <a:cs typeface="+mn-cs"/>
+              </a:rPr>
+              <a:t>vorticity</a:t>
+            </a:r>
+            <a:r>
+              <a:rPr kumimoji="0" lang="en-US" sz="1800" b="0" i="0" u="none" strike="noStrike" kern="1200" cap="none" spc="0" normalizeH="0" noProof="0" dirty="0" smtClean="0">
+                <a:ln>
+                  <a:noFill/>
+                </a:ln>
+                <a:solidFill>
+                  <a:schemeClr val="tx1"/>
+                </a:solidFill>
+                <a:effectLst/>
+                <a:uLnTx/>
+                <a:uFillTx/>
+                <a:latin typeface="+mn-lt"/>
+                <a:ea typeface="+mn-ea"/>
+                <a:cs typeface="+mn-cs"/>
+              </a:rPr>
+              <a:t> advection.</a:t>
+            </a:r>
+            <a:endParaRPr kumimoji="0" lang="en-US" sz="1800" b="0" i="0" u="none" strike="noStrike" kern="1200" cap="none" spc="0" normalizeH="0" baseline="0" noProof="0" dirty="0" smtClean="0">
+              <a:ln>
+                <a:noFill/>
+              </a:ln>
+              <a:solidFill>
+                <a:schemeClr val="tx1"/>
+              </a:solidFill>
+              <a:effectLst/>
+              <a:uLnTx/>
+              <a:uFillTx/>
+              <a:latin typeface="+mn-lt"/>
+              <a:ea typeface="+mn-ea"/>
+              <a:cs typeface="+mn-cs"/>
+            </a:endParaRPr>
+          </a:p>
+        </p:txBody>
+      </p:sp>
     </p:spTree>
   </p:cSld>
   <p:clrMapOvr>
@@ -3582,25 +4719,6 @@
           </p:cNvSpPr>
           <p:nvPr>
             <p:ph type="title"/>
-          </p:nvPr>
-        </p:nvSpPr>
-        <p:spPr/>
-        <p:txBody>
-          <a:bodyPr/>
-          <a:lstStyle/>
-          <a:p>
-            <a:endParaRPr lang="en-US"/>
-          </a:p>
-        </p:txBody>
-      </p:sp>
-      <p:sp>
-        <p:nvSpPr>
-          <p:cNvPr id="3" name="Content Placeholder 2"/>
-          <p:cNvSpPr>
-            <a:spLocks noGrp="1"/>
-          </p:cNvSpPr>
-          <p:nvPr>
-            <p:ph idx="1"/>
           </p:nvPr>
         </p:nvSpPr>
         <p:spPr/>
@@ -3664,6 +4782,258 @@
           <a:noFill/>
         </p:spPr>
       </p:pic>
+      <p:sp>
+        <p:nvSpPr>
+          <p:cNvPr id="7" name="Content Placeholder 2"/>
+          <p:cNvSpPr txBox="1">
+            <a:spLocks/>
+          </p:cNvSpPr>
+          <p:nvPr/>
+        </p:nvSpPr>
+        <p:spPr>
+          <a:xfrm>
+            <a:off x="457200" y="3505200"/>
+            <a:ext cx="8229600" cy="3352800"/>
+          </a:xfrm>
+          <a:prstGeom prst="rect">
+            <a:avLst/>
+          </a:prstGeom>
+        </p:spPr>
+        <p:txBody>
+          <a:bodyPr vert="horz" lIns="91440" tIns="45720" rIns="91440" bIns="45720" rtlCol="0">
+            <a:normAutofit/>
+          </a:bodyPr>
+          <a:lstStyle/>
+          <a:p>
+            <a:pPr marL="342900" marR="0" lvl="0" indent="-342900" algn="l" defTabSz="914400" rtl="0" eaLnBrk="1" fontAlgn="auto" latinLnBrk="0" hangingPunct="1">
+              <a:lnSpc>
+                <a:spcPct val="100000"/>
+              </a:lnSpc>
+              <a:spcBef>
+                <a:spcPct val="20000"/>
+              </a:spcBef>
+              <a:spcAft>
+                <a:spcPts val="0"/>
+              </a:spcAft>
+              <a:buClrTx/>
+              <a:buSzTx/>
+              <a:buFont typeface="Arial" pitchFamily="34" charset="0"/>
+              <a:buNone/>
+              <a:tabLst/>
+              <a:defRPr/>
+            </a:pPr>
+            <a:r>
+              <a:rPr kumimoji="0" lang="en-US" sz="2400" b="1" i="0" u="none" strike="noStrike" kern="1200" cap="none" spc="0" normalizeH="0" baseline="0" noProof="0" dirty="0" smtClean="0">
+                <a:ln>
+                  <a:noFill/>
+                </a:ln>
+                <a:solidFill>
+                  <a:schemeClr val="tx1"/>
+                </a:solidFill>
+                <a:effectLst/>
+                <a:uLnTx/>
+                <a:uFillTx/>
+                <a:latin typeface="+mn-lt"/>
+                <a:ea typeface="+mn-ea"/>
+                <a:cs typeface="+mn-cs"/>
+              </a:rPr>
+              <a:t>Zonal-mean view of T advection</a:t>
+            </a:r>
+          </a:p>
+          <a:p>
+            <a:pPr marL="342900" marR="0" lvl="0" indent="-342900" algn="l" defTabSz="914400" rtl="0" eaLnBrk="1" fontAlgn="auto" latinLnBrk="0" hangingPunct="1">
+              <a:lnSpc>
+                <a:spcPct val="100000"/>
+              </a:lnSpc>
+              <a:spcBef>
+                <a:spcPct val="20000"/>
+              </a:spcBef>
+              <a:spcAft>
+                <a:spcPts val="0"/>
+              </a:spcAft>
+              <a:buClrTx/>
+              <a:buSzTx/>
+              <a:buFont typeface="Arial" pitchFamily="34" charset="0"/>
+              <a:buChar char="•"/>
+              <a:tabLst/>
+              <a:defRPr/>
+            </a:pPr>
+            <a:r>
+              <a:rPr kumimoji="0" lang="en-US" sz="1800" b="0" i="0" u="none" strike="noStrike" kern="1200" cap="none" spc="0" normalizeH="0" baseline="0" noProof="0" dirty="0" smtClean="0">
+                <a:ln>
+                  <a:noFill/>
+                </a:ln>
+                <a:solidFill>
+                  <a:schemeClr val="tx1"/>
+                </a:solidFill>
+                <a:effectLst/>
+                <a:uLnTx/>
+                <a:uFillTx/>
+                <a:latin typeface="+mn-lt"/>
+                <a:ea typeface="+mn-ea"/>
+                <a:cs typeface="+mn-cs"/>
+              </a:rPr>
+              <a:t>There is net WAA on the </a:t>
+            </a:r>
+            <a:r>
+              <a:rPr kumimoji="0" lang="en-US" sz="1800" b="0" i="0" u="none" strike="noStrike" kern="1200" cap="none" spc="0" normalizeH="0" baseline="0" noProof="0" dirty="0" err="1" smtClean="0">
+                <a:ln>
+                  <a:noFill/>
+                </a:ln>
+                <a:solidFill>
+                  <a:schemeClr val="tx1"/>
+                </a:solidFill>
+                <a:effectLst/>
+                <a:uLnTx/>
+                <a:uFillTx/>
+                <a:latin typeface="+mn-lt"/>
+                <a:ea typeface="+mn-ea"/>
+                <a:cs typeface="+mn-cs"/>
+              </a:rPr>
+              <a:t>poleward</a:t>
+            </a:r>
+            <a:r>
+              <a:rPr kumimoji="0" lang="en-US" sz="1800" b="0" i="0" u="none" strike="noStrike" kern="1200" cap="none" spc="0" normalizeH="0" baseline="0" noProof="0" dirty="0" smtClean="0">
+                <a:ln>
+                  <a:noFill/>
+                </a:ln>
+                <a:solidFill>
+                  <a:schemeClr val="tx1"/>
+                </a:solidFill>
+                <a:effectLst/>
+                <a:uLnTx/>
+                <a:uFillTx/>
+                <a:latin typeface="+mn-lt"/>
+                <a:ea typeface="+mn-ea"/>
+                <a:cs typeface="+mn-cs"/>
+              </a:rPr>
+              <a:t> flank of the eddies</a:t>
+            </a:r>
+            <a:r>
+              <a:rPr kumimoji="0" lang="en-US" sz="1800" b="0" i="0" u="none" strike="noStrike" kern="1200" cap="none" spc="0" normalizeH="0" noProof="0" dirty="0" smtClean="0">
+                <a:ln>
+                  <a:noFill/>
+                </a:ln>
+                <a:solidFill>
+                  <a:schemeClr val="tx1"/>
+                </a:solidFill>
+                <a:effectLst/>
+                <a:uLnTx/>
+                <a:uFillTx/>
+                <a:latin typeface="+mn-lt"/>
+                <a:ea typeface="+mn-ea"/>
+                <a:cs typeface="+mn-cs"/>
+              </a:rPr>
+              <a:t> and CAA on the </a:t>
+            </a:r>
+            <a:r>
+              <a:rPr kumimoji="0" lang="en-US" sz="1800" b="0" i="0" u="none" strike="noStrike" kern="1200" cap="none" spc="0" normalizeH="0" noProof="0" dirty="0" err="1" smtClean="0">
+                <a:ln>
+                  <a:noFill/>
+                </a:ln>
+                <a:solidFill>
+                  <a:schemeClr val="tx1"/>
+                </a:solidFill>
+                <a:effectLst/>
+                <a:uLnTx/>
+                <a:uFillTx/>
+                <a:latin typeface="+mn-lt"/>
+                <a:ea typeface="+mn-ea"/>
+                <a:cs typeface="+mn-cs"/>
+              </a:rPr>
+              <a:t>equatorward</a:t>
+            </a:r>
+            <a:r>
+              <a:rPr kumimoji="0" lang="en-US" sz="1800" b="0" i="0" u="none" strike="noStrike" kern="1200" cap="none" spc="0" normalizeH="0" noProof="0" dirty="0" smtClean="0">
+                <a:ln>
+                  <a:noFill/>
+                </a:ln>
+                <a:solidFill>
+                  <a:schemeClr val="tx1"/>
+                </a:solidFill>
+                <a:effectLst/>
+                <a:uLnTx/>
+                <a:uFillTx/>
+                <a:latin typeface="+mn-lt"/>
+                <a:ea typeface="+mn-ea"/>
+                <a:cs typeface="+mn-cs"/>
+              </a:rPr>
+              <a:t> flank.</a:t>
+            </a:r>
+            <a:endParaRPr kumimoji="0" lang="en-US" sz="1800" b="0" i="0" u="none" strike="noStrike" kern="1200" cap="none" spc="0" normalizeH="0" baseline="0" noProof="0" dirty="0" smtClean="0">
+              <a:ln>
+                <a:noFill/>
+              </a:ln>
+              <a:solidFill>
+                <a:schemeClr val="tx1"/>
+              </a:solidFill>
+              <a:effectLst/>
+              <a:uLnTx/>
+              <a:uFillTx/>
+              <a:latin typeface="+mn-lt"/>
+              <a:ea typeface="+mn-ea"/>
+              <a:cs typeface="+mn-cs"/>
+            </a:endParaRPr>
+          </a:p>
+          <a:p>
+            <a:pPr marL="342900" marR="0" lvl="0" indent="-342900" algn="l" defTabSz="914400" rtl="0" eaLnBrk="1" fontAlgn="auto" latinLnBrk="0" hangingPunct="1">
+              <a:lnSpc>
+                <a:spcPct val="100000"/>
+              </a:lnSpc>
+              <a:spcBef>
+                <a:spcPct val="20000"/>
+              </a:spcBef>
+              <a:spcAft>
+                <a:spcPts val="0"/>
+              </a:spcAft>
+              <a:buClrTx/>
+              <a:buSzTx/>
+              <a:buFont typeface="Arial" pitchFamily="34" charset="0"/>
+              <a:buChar char="•"/>
+              <a:tabLst/>
+              <a:defRPr/>
+            </a:pPr>
+            <a:r>
+              <a:rPr lang="en-US" noProof="0" dirty="0" smtClean="0"/>
+              <a:t>The </a:t>
+            </a:r>
+            <a:r>
+              <a:rPr lang="en-US" noProof="0" dirty="0" err="1" smtClean="0"/>
+              <a:t>advective</a:t>
+            </a:r>
+            <a:r>
+              <a:rPr lang="en-US" noProof="0" dirty="0" smtClean="0"/>
+              <a:t> temperature tendency is nearly identical to the temperature tendency due to EHF convergence -(</a:t>
+            </a:r>
+            <a:r>
+              <a:rPr lang="en-US" noProof="0" dirty="0" err="1" smtClean="0"/>
+              <a:t>v’T</a:t>
+            </a:r>
+            <a:r>
+              <a:rPr lang="en-US" noProof="0" dirty="0" smtClean="0"/>
+              <a:t>’)</a:t>
+            </a:r>
+            <a:r>
+              <a:rPr lang="en-US" baseline="-25000" noProof="0" dirty="0" smtClean="0"/>
+              <a:t>y</a:t>
+            </a:r>
+            <a:endParaRPr kumimoji="0" lang="en-US" sz="1400" b="0" i="0" u="none" strike="noStrike" kern="1200" cap="none" spc="0" normalizeH="0" baseline="-25000" noProof="0" dirty="0" smtClean="0">
+              <a:ln>
+                <a:noFill/>
+              </a:ln>
+              <a:solidFill>
+                <a:schemeClr val="tx1"/>
+              </a:solidFill>
+              <a:effectLst/>
+              <a:uLnTx/>
+              <a:uFillTx/>
+              <a:latin typeface="+mn-lt"/>
+              <a:ea typeface="+mn-ea"/>
+              <a:cs typeface="+mn-cs"/>
+            </a:endParaRPr>
+          </a:p>
+        </p:txBody>
+      </p:sp>
     </p:spTree>
   </p:cSld>
   <p:clrMapOvr>
@@ -3715,14 +5085,1090 @@
           </a:p>
         </p:txBody>
       </p:sp>
-      <p:sp>
-        <p:nvSpPr>
-          <p:cNvPr id="3" name="Content Placeholder 2"/>
-          <p:cNvSpPr>
-            <a:spLocks noGrp="1"/>
-          </p:cNvSpPr>
-          <p:nvPr>
-            <p:ph idx="1"/>
+      <p:pic>
+        <p:nvPicPr>
+          <p:cNvPr id="6" name="Picture 2" descr="C:\Users\Joshua Pan\Desktop\PSUYr2_scratch\qg_baroc_wv\yp_TA_EHFc.png"/>
+          <p:cNvPicPr>
+            <a:picLocks noChangeAspect="1" noChangeArrowheads="1"/>
+          </p:cNvPicPr>
+          <p:nvPr/>
+        </p:nvPicPr>
+        <p:blipFill>
+          <a:blip r:embed="rId2" cstate="print"/>
+          <a:srcRect/>
+          <a:stretch>
+            <a:fillRect/>
+          </a:stretch>
+        </p:blipFill>
+        <p:spPr bwMode="auto">
+          <a:xfrm>
+            <a:off x="0" y="0"/>
+            <a:ext cx="4419601" cy="3484163"/>
+          </a:xfrm>
+          <a:prstGeom prst="rect">
+            <a:avLst/>
+          </a:prstGeom>
+          <a:noFill/>
+        </p:spPr>
+      </p:pic>
+      <p:pic>
+        <p:nvPicPr>
+          <p:cNvPr id="6146" name="Picture 2" descr="C:\Users\Joshua Pan\Desktop\PSUYr2_scratch\qg_baroc_wv\yp_wTA_TA.png"/>
+          <p:cNvPicPr>
+            <a:picLocks noChangeAspect="1" noChangeArrowheads="1"/>
+          </p:cNvPicPr>
+          <p:nvPr/>
+        </p:nvPicPr>
+        <p:blipFill>
+          <a:blip r:embed="rId3" cstate="print"/>
+          <a:srcRect/>
+          <a:stretch>
+            <a:fillRect/>
+          </a:stretch>
+        </p:blipFill>
+        <p:spPr bwMode="auto">
+          <a:xfrm>
+            <a:off x="4487026" y="0"/>
+            <a:ext cx="4656974" cy="3505200"/>
+          </a:xfrm>
+          <a:prstGeom prst="rect">
+            <a:avLst/>
+          </a:prstGeom>
+          <a:noFill/>
+        </p:spPr>
+      </p:pic>
+      <p:sp>
+        <p:nvSpPr>
+          <p:cNvPr id="7" name="Content Placeholder 2"/>
+          <p:cNvSpPr txBox="1">
+            <a:spLocks/>
+          </p:cNvSpPr>
+          <p:nvPr/>
+        </p:nvSpPr>
+        <p:spPr>
+          <a:xfrm>
+            <a:off x="457200" y="3505200"/>
+            <a:ext cx="8229600" cy="3352800"/>
+          </a:xfrm>
+          <a:prstGeom prst="rect">
+            <a:avLst/>
+          </a:prstGeom>
+        </p:spPr>
+        <p:txBody>
+          <a:bodyPr vert="horz" lIns="91440" tIns="45720" rIns="91440" bIns="45720" rtlCol="0">
+            <a:normAutofit/>
+          </a:bodyPr>
+          <a:lstStyle/>
+          <a:p>
+            <a:pPr marL="342900" marR="0" lvl="0" indent="-342900" algn="l" defTabSz="914400" rtl="0" eaLnBrk="1" fontAlgn="auto" latinLnBrk="0" hangingPunct="1">
+              <a:lnSpc>
+                <a:spcPct val="100000"/>
+              </a:lnSpc>
+              <a:spcBef>
+                <a:spcPct val="20000"/>
+              </a:spcBef>
+              <a:spcAft>
+                <a:spcPts val="0"/>
+              </a:spcAft>
+              <a:buClrTx/>
+              <a:buSzTx/>
+              <a:buFont typeface="Arial" pitchFamily="34" charset="0"/>
+              <a:buNone/>
+              <a:tabLst/>
+              <a:defRPr/>
+            </a:pPr>
+            <a:r>
+              <a:rPr lang="en-US" sz="2400" b="1" noProof="0" dirty="0" smtClean="0"/>
+              <a:t>Solving for vertical motion</a:t>
+            </a:r>
+            <a:endParaRPr kumimoji="0" lang="en-US" sz="2400" b="1" i="0" u="none" strike="noStrike" kern="1200" cap="none" spc="0" normalizeH="0" baseline="0" noProof="0" dirty="0" smtClean="0">
+              <a:ln>
+                <a:noFill/>
+              </a:ln>
+              <a:solidFill>
+                <a:schemeClr val="tx1"/>
+              </a:solidFill>
+              <a:effectLst/>
+              <a:uLnTx/>
+              <a:uFillTx/>
+              <a:latin typeface="+mn-lt"/>
+              <a:ea typeface="+mn-ea"/>
+              <a:cs typeface="+mn-cs"/>
+            </a:endParaRPr>
+          </a:p>
+          <a:p>
+            <a:pPr marL="342900" marR="0" lvl="0" indent="-342900" algn="l" defTabSz="914400" rtl="0" eaLnBrk="1" fontAlgn="auto" latinLnBrk="0" hangingPunct="1">
+              <a:lnSpc>
+                <a:spcPct val="100000"/>
+              </a:lnSpc>
+              <a:spcBef>
+                <a:spcPct val="20000"/>
+              </a:spcBef>
+              <a:spcAft>
+                <a:spcPts val="0"/>
+              </a:spcAft>
+              <a:buClrTx/>
+              <a:buSzTx/>
+              <a:buFont typeface="Arial" pitchFamily="34" charset="0"/>
+              <a:buChar char="•"/>
+              <a:tabLst/>
+              <a:defRPr/>
+            </a:pPr>
+            <a:r>
+              <a:rPr kumimoji="0" lang="en-US" sz="1800" b="0" i="0" u="none" strike="noStrike" kern="1200" cap="none" spc="0" normalizeH="0" baseline="0" noProof="0" dirty="0" smtClean="0">
+                <a:ln>
+                  <a:noFill/>
+                </a:ln>
+                <a:solidFill>
+                  <a:schemeClr val="tx1"/>
+                </a:solidFill>
+                <a:effectLst/>
+                <a:uLnTx/>
+                <a:uFillTx/>
+                <a:latin typeface="+mn-lt"/>
+                <a:ea typeface="+mn-ea"/>
+                <a:cs typeface="+mn-cs"/>
+              </a:rPr>
+              <a:t>Use the </a:t>
+            </a:r>
+            <a:r>
+              <a:rPr kumimoji="0" lang="en-US" sz="1800" b="0" i="0" u="none" strike="noStrike" kern="1200" cap="none" spc="0" normalizeH="0" baseline="0" noProof="0" dirty="0" err="1" smtClean="0">
+                <a:ln>
+                  <a:noFill/>
+                </a:ln>
+                <a:solidFill>
+                  <a:schemeClr val="tx1"/>
+                </a:solidFill>
+                <a:effectLst/>
+                <a:uLnTx/>
+                <a:uFillTx/>
+                <a:latin typeface="+mn-lt"/>
+                <a:ea typeface="+mn-ea"/>
+                <a:cs typeface="+mn-cs"/>
+              </a:rPr>
+              <a:t>Boussinesq</a:t>
+            </a:r>
+            <a:r>
+              <a:rPr kumimoji="0" lang="en-US" sz="1800" b="0" i="0" u="none" strike="noStrike" kern="1200" cap="none" spc="0" normalizeH="0" baseline="0" noProof="0" dirty="0" smtClean="0">
+                <a:ln>
+                  <a:noFill/>
+                </a:ln>
+                <a:solidFill>
+                  <a:schemeClr val="tx1"/>
+                </a:solidFill>
+                <a:effectLst/>
+                <a:uLnTx/>
+                <a:uFillTx/>
+                <a:latin typeface="+mn-lt"/>
+                <a:ea typeface="+mn-ea"/>
+                <a:cs typeface="+mn-cs"/>
+              </a:rPr>
+              <a:t> QG-omega equation (Davies</a:t>
+            </a:r>
+            <a:r>
+              <a:rPr kumimoji="0" lang="en-US" sz="1800" b="0" i="0" u="none" strike="noStrike" kern="1200" cap="none" spc="0" normalizeH="0" noProof="0" dirty="0" smtClean="0">
+                <a:ln>
+                  <a:noFill/>
+                </a:ln>
+                <a:solidFill>
+                  <a:schemeClr val="tx1"/>
+                </a:solidFill>
+                <a:effectLst/>
+                <a:uLnTx/>
+                <a:uFillTx/>
+                <a:latin typeface="+mn-lt"/>
+                <a:ea typeface="+mn-ea"/>
+                <a:cs typeface="+mn-cs"/>
+              </a:rPr>
+              <a:t> 2015, </a:t>
+            </a:r>
+            <a:r>
+              <a:rPr kumimoji="0" lang="en-US" sz="1800" b="0" i="0" u="none" strike="noStrike" kern="1200" cap="none" spc="0" normalizeH="0" noProof="0" dirty="0" err="1" smtClean="0">
+                <a:ln>
+                  <a:noFill/>
+                </a:ln>
+                <a:solidFill>
+                  <a:schemeClr val="tx1"/>
+                </a:solidFill>
+                <a:effectLst/>
+                <a:uLnTx/>
+                <a:uFillTx/>
+                <a:latin typeface="+mn-lt"/>
+                <a:ea typeface="+mn-ea"/>
+                <a:cs typeface="+mn-cs"/>
+              </a:rPr>
+              <a:t>MWRe</a:t>
+            </a:r>
+            <a:r>
+              <a:rPr kumimoji="0" lang="en-US" sz="1800" b="0" i="0" u="none" strike="noStrike" kern="1200" cap="none" spc="0" normalizeH="0" noProof="0" dirty="0" smtClean="0">
+                <a:ln>
+                  <a:noFill/>
+                </a:ln>
+                <a:solidFill>
+                  <a:schemeClr val="tx1"/>
+                </a:solidFill>
+                <a:effectLst/>
+                <a:uLnTx/>
+                <a:uFillTx/>
+                <a:latin typeface="+mn-lt"/>
+                <a:ea typeface="+mn-ea"/>
+                <a:cs typeface="+mn-cs"/>
+              </a:rPr>
+              <a:t>)</a:t>
+            </a:r>
+          </a:p>
+          <a:p>
+            <a:pPr marL="342900" marR="0" lvl="0" indent="-342900" algn="l" defTabSz="914400" rtl="0" eaLnBrk="1" fontAlgn="auto" latinLnBrk="0" hangingPunct="1">
+              <a:lnSpc>
+                <a:spcPct val="100000"/>
+              </a:lnSpc>
+              <a:spcBef>
+                <a:spcPct val="20000"/>
+              </a:spcBef>
+              <a:spcAft>
+                <a:spcPts val="0"/>
+              </a:spcAft>
+              <a:buClrTx/>
+              <a:buSzTx/>
+              <a:buFont typeface="Arial" pitchFamily="34" charset="0"/>
+              <a:buChar char="•"/>
+              <a:tabLst/>
+              <a:defRPr/>
+            </a:pPr>
+            <a:endParaRPr lang="en-US" baseline="0" dirty="0" smtClean="0"/>
+          </a:p>
+          <a:p>
+            <a:pPr marL="342900" marR="0" lvl="0" indent="-342900" algn="l" defTabSz="914400" rtl="0" eaLnBrk="1" fontAlgn="auto" latinLnBrk="0" hangingPunct="1">
+              <a:lnSpc>
+                <a:spcPct val="100000"/>
+              </a:lnSpc>
+              <a:spcBef>
+                <a:spcPct val="20000"/>
+              </a:spcBef>
+              <a:spcAft>
+                <a:spcPts val="0"/>
+              </a:spcAft>
+              <a:buClrTx/>
+              <a:buSzTx/>
+              <a:buFont typeface="Arial" pitchFamily="34" charset="0"/>
+              <a:buChar char="•"/>
+              <a:tabLst/>
+              <a:defRPr/>
+            </a:pPr>
+            <a:endParaRPr kumimoji="0" lang="en-US" sz="1800" b="0" i="0" u="none" strike="noStrike" kern="1200" cap="none" spc="0" normalizeH="0" noProof="0" dirty="0" smtClean="0">
+              <a:ln>
+                <a:noFill/>
+              </a:ln>
+              <a:solidFill>
+                <a:schemeClr val="tx1"/>
+              </a:solidFill>
+              <a:effectLst/>
+              <a:uLnTx/>
+              <a:uFillTx/>
+              <a:latin typeface="+mn-lt"/>
+              <a:ea typeface="+mn-ea"/>
+              <a:cs typeface="+mn-cs"/>
+            </a:endParaRPr>
+          </a:p>
+          <a:p>
+            <a:pPr marL="342900" marR="0" lvl="0" indent="-342900" algn="l" defTabSz="914400" rtl="0" eaLnBrk="1" fontAlgn="auto" latinLnBrk="0" hangingPunct="1">
+              <a:lnSpc>
+                <a:spcPct val="100000"/>
+              </a:lnSpc>
+              <a:spcBef>
+                <a:spcPct val="20000"/>
+              </a:spcBef>
+              <a:spcAft>
+                <a:spcPts val="0"/>
+              </a:spcAft>
+              <a:buClrTx/>
+              <a:buSzTx/>
+              <a:buFont typeface="Arial" pitchFamily="34" charset="0"/>
+              <a:buChar char="•"/>
+              <a:tabLst/>
+              <a:defRPr/>
+            </a:pPr>
+            <a:endParaRPr kumimoji="0" lang="en-US" sz="1800" b="0" i="0" u="none" strike="noStrike" kern="1200" cap="none" spc="0" normalizeH="0" noProof="0" dirty="0" smtClean="0">
+              <a:ln>
+                <a:noFill/>
+              </a:ln>
+              <a:solidFill>
+                <a:schemeClr val="tx1"/>
+              </a:solidFill>
+              <a:effectLst/>
+              <a:uLnTx/>
+              <a:uFillTx/>
+              <a:latin typeface="+mn-lt"/>
+              <a:ea typeface="+mn-ea"/>
+              <a:cs typeface="+mn-cs"/>
+            </a:endParaRPr>
+          </a:p>
+          <a:p>
+            <a:pPr marL="342900" marR="0" lvl="0" indent="-342900" algn="l" defTabSz="914400" rtl="0" eaLnBrk="1" fontAlgn="auto" latinLnBrk="0" hangingPunct="1">
+              <a:lnSpc>
+                <a:spcPct val="100000"/>
+              </a:lnSpc>
+              <a:spcBef>
+                <a:spcPct val="20000"/>
+              </a:spcBef>
+              <a:spcAft>
+                <a:spcPts val="0"/>
+              </a:spcAft>
+              <a:buClrTx/>
+              <a:buSzTx/>
+              <a:buFont typeface="Arial" pitchFamily="34" charset="0"/>
+              <a:buChar char="•"/>
+              <a:tabLst/>
+              <a:defRPr/>
+            </a:pPr>
+            <a:r>
+              <a:rPr lang="en-US" baseline="0" dirty="0" smtClean="0"/>
+              <a:t>Turn the PDE into an </a:t>
+            </a:r>
+            <a:r>
+              <a:rPr lang="en-US" baseline="0" dirty="0" err="1" smtClean="0"/>
+              <a:t>eigen</a:t>
+            </a:r>
+            <a:r>
+              <a:rPr lang="en-US" dirty="0" err="1" smtClean="0"/>
+              <a:t>value</a:t>
+            </a:r>
+            <a:r>
+              <a:rPr lang="en-US" dirty="0" smtClean="0"/>
+              <a:t> problem by setting the </a:t>
+            </a:r>
+            <a:r>
+              <a:rPr lang="en-US" i="1" dirty="0" smtClean="0"/>
+              <a:t>y</a:t>
+            </a:r>
+            <a:r>
+              <a:rPr lang="en-US" dirty="0" smtClean="0"/>
+              <a:t> and </a:t>
+            </a:r>
+            <a:r>
+              <a:rPr lang="en-US" i="1" dirty="0" smtClean="0"/>
+              <a:t>p</a:t>
+            </a:r>
+            <a:r>
+              <a:rPr lang="en-US" dirty="0" smtClean="0"/>
+              <a:t> dependence of fields to </a:t>
+            </a:r>
+            <a:r>
+              <a:rPr lang="en-US" dirty="0" err="1" smtClean="0"/>
+              <a:t>sines</a:t>
+            </a:r>
+            <a:r>
+              <a:rPr lang="en-US" dirty="0" smtClean="0"/>
+              <a:t> and cosines that approximate the true fields.</a:t>
+            </a:r>
+            <a:endParaRPr kumimoji="0" lang="en-US" sz="1800" b="0" i="0" u="none" strike="noStrike" kern="1200" cap="none" spc="0" normalizeH="0" baseline="0" noProof="0" dirty="0" smtClean="0">
+              <a:ln>
+                <a:noFill/>
+              </a:ln>
+              <a:solidFill>
+                <a:schemeClr val="tx1"/>
+              </a:solidFill>
+              <a:effectLst/>
+              <a:uLnTx/>
+              <a:uFillTx/>
+              <a:latin typeface="+mn-lt"/>
+              <a:ea typeface="+mn-ea"/>
+              <a:cs typeface="+mn-cs"/>
+            </a:endParaRPr>
+          </a:p>
+        </p:txBody>
+      </p:sp>
+      <p:pic>
+        <p:nvPicPr>
+          <p:cNvPr id="2050" name="Picture 2" descr="e1"/>
+          <p:cNvPicPr>
+            <a:picLocks noChangeAspect="1" noChangeArrowheads="1"/>
+          </p:cNvPicPr>
+          <p:nvPr/>
+        </p:nvPicPr>
+        <p:blipFill>
+          <a:blip r:embed="rId4" cstate="print"/>
+          <a:srcRect/>
+          <a:stretch>
+            <a:fillRect/>
+          </a:stretch>
+        </p:blipFill>
+        <p:spPr bwMode="auto">
+          <a:xfrm>
+            <a:off x="1981200" y="4343400"/>
+            <a:ext cx="5181600" cy="276177"/>
+          </a:xfrm>
+          <a:prstGeom prst="rect">
+            <a:avLst/>
+          </a:prstGeom>
+          <a:noFill/>
+        </p:spPr>
+      </p:pic>
+      <p:pic>
+        <p:nvPicPr>
+          <p:cNvPr id="2052" name="Picture 4" descr="e2a"/>
+          <p:cNvPicPr>
+            <a:picLocks noChangeAspect="1" noChangeArrowheads="1"/>
+          </p:cNvPicPr>
+          <p:nvPr/>
+        </p:nvPicPr>
+        <p:blipFill>
+          <a:blip r:embed="rId5" cstate="print"/>
+          <a:srcRect/>
+          <a:stretch>
+            <a:fillRect/>
+          </a:stretch>
+        </p:blipFill>
+        <p:spPr bwMode="auto">
+          <a:xfrm>
+            <a:off x="2743200" y="4724400"/>
+            <a:ext cx="4419600" cy="370171"/>
+          </a:xfrm>
+          <a:prstGeom prst="rect">
+            <a:avLst/>
+          </a:prstGeom>
+          <a:noFill/>
+        </p:spPr>
+      </p:pic>
+    </p:spTree>
+  </p:cSld>
+  <p:clrMapOvr>
+    <a:masterClrMapping/>
+  </p:clrMapOvr>
+  <p:timing>
+    <p:tnLst>
+      <p:par>
+        <p:cTn id="1" dur="indefinite" restart="never" nodeType="tmRoot"/>
+      </p:par>
+    </p:tnLst>
+  </p:timing>
+</p:sld>
+</file>
+
+<file path=ppt/slides/slide8.xml><?xml version="1.0" encoding="utf-8"?>
+<p:sld xmlns:a="http://schemas.openxmlformats.org/drawingml/2006/main" xmlns:r="http://schemas.openxmlformats.org/officeDocument/2006/relationships" xmlns:p="http://schemas.openxmlformats.org/presentationml/2006/main">
+  <p:cSld>
+    <p:spTree>
+      <p:nvGrpSpPr>
+        <p:cNvPr id="1" name=""/>
+        <p:cNvGrpSpPr/>
+        <p:nvPr/>
+      </p:nvGrpSpPr>
+      <p:grpSpPr>
+        <a:xfrm>
+          <a:off x="0" y="0"/>
+          <a:ext cx="0" cy="0"/>
+          <a:chOff x="0" y="0"/>
+          <a:chExt cx="0" cy="0"/>
+        </a:xfrm>
+      </p:grpSpPr>
+      <p:sp>
+        <p:nvSpPr>
+          <p:cNvPr id="2" name="Title 1"/>
+          <p:cNvSpPr>
+            <a:spLocks noGrp="1"/>
+          </p:cNvSpPr>
+          <p:nvPr>
+            <p:ph type="title"/>
+          </p:nvPr>
+        </p:nvSpPr>
+        <p:spPr/>
+        <p:txBody>
+          <a:bodyPr/>
+          <a:lstStyle/>
+          <a:p>
+            <a:endParaRPr lang="en-US"/>
+          </a:p>
+        </p:txBody>
+      </p:sp>
+      <p:pic>
+        <p:nvPicPr>
+          <p:cNvPr id="6" name="Picture 2" descr="C:\Users\Joshua Pan\Desktop\PSUYr2_scratch\qg_baroc_wv\yp_TA_EHFc.png"/>
+          <p:cNvPicPr>
+            <a:picLocks noChangeAspect="1" noChangeArrowheads="1"/>
+          </p:cNvPicPr>
+          <p:nvPr/>
+        </p:nvPicPr>
+        <p:blipFill>
+          <a:blip r:embed="rId2" cstate="print">
+            <a:lum contrast="-80000"/>
+          </a:blip>
+          <a:srcRect/>
+          <a:stretch>
+            <a:fillRect/>
+          </a:stretch>
+        </p:blipFill>
+        <p:spPr bwMode="auto">
+          <a:xfrm>
+            <a:off x="0" y="0"/>
+            <a:ext cx="4419601" cy="3484163"/>
+          </a:xfrm>
+          <a:prstGeom prst="rect">
+            <a:avLst/>
+          </a:prstGeom>
+          <a:noFill/>
+        </p:spPr>
+      </p:pic>
+      <p:pic>
+        <p:nvPicPr>
+          <p:cNvPr id="6146" name="Picture 2" descr="C:\Users\Joshua Pan\Desktop\PSUYr2_scratch\qg_baroc_wv\yp_wTA_TA.png"/>
+          <p:cNvPicPr>
+            <a:picLocks noChangeAspect="1" noChangeArrowheads="1"/>
+          </p:cNvPicPr>
+          <p:nvPr/>
+        </p:nvPicPr>
+        <p:blipFill>
+          <a:blip r:embed="rId3" cstate="print">
+            <a:lum contrast="-80000"/>
+          </a:blip>
+          <a:srcRect/>
+          <a:stretch>
+            <a:fillRect/>
+          </a:stretch>
+        </p:blipFill>
+        <p:spPr bwMode="auto">
+          <a:xfrm>
+            <a:off x="4487026" y="0"/>
+            <a:ext cx="4656974" cy="3505200"/>
+          </a:xfrm>
+          <a:prstGeom prst="rect">
+            <a:avLst/>
+          </a:prstGeom>
+          <a:noFill/>
+        </p:spPr>
+      </p:pic>
+      <p:sp>
+        <p:nvSpPr>
+          <p:cNvPr id="7" name="Content Placeholder 2"/>
+          <p:cNvSpPr txBox="1">
+            <a:spLocks/>
+          </p:cNvSpPr>
+          <p:nvPr/>
+        </p:nvSpPr>
+        <p:spPr>
+          <a:xfrm>
+            <a:off x="457200" y="3505200"/>
+            <a:ext cx="8229600" cy="3352800"/>
+          </a:xfrm>
+          <a:prstGeom prst="rect">
+            <a:avLst/>
+          </a:prstGeom>
+        </p:spPr>
+        <p:txBody>
+          <a:bodyPr vert="horz" lIns="91440" tIns="45720" rIns="91440" bIns="45720" rtlCol="0">
+            <a:normAutofit/>
+          </a:bodyPr>
+          <a:lstStyle/>
+          <a:p>
+            <a:pPr marL="342900" marR="0" lvl="0" indent="-342900" algn="l" defTabSz="914400" rtl="0" eaLnBrk="1" fontAlgn="auto" latinLnBrk="0" hangingPunct="1">
+              <a:lnSpc>
+                <a:spcPct val="100000"/>
+              </a:lnSpc>
+              <a:spcBef>
+                <a:spcPct val="20000"/>
+              </a:spcBef>
+              <a:spcAft>
+                <a:spcPts val="0"/>
+              </a:spcAft>
+              <a:buClrTx/>
+              <a:buSzTx/>
+              <a:buFont typeface="Arial" pitchFamily="34" charset="0"/>
+              <a:buNone/>
+              <a:tabLst/>
+              <a:defRPr/>
+            </a:pPr>
+            <a:r>
+              <a:rPr lang="en-US" sz="2400" b="1" dirty="0" smtClean="0"/>
+              <a:t>How the QG secondary circulation counteracts T advection</a:t>
+            </a:r>
+            <a:endParaRPr kumimoji="0" lang="en-US" sz="2400" b="1" i="0" u="none" strike="noStrike" kern="1200" cap="none" spc="0" normalizeH="0" baseline="0" noProof="0" dirty="0" smtClean="0">
+              <a:ln>
+                <a:noFill/>
+              </a:ln>
+              <a:solidFill>
+                <a:schemeClr val="tx1"/>
+              </a:solidFill>
+              <a:effectLst/>
+              <a:uLnTx/>
+              <a:uFillTx/>
+              <a:latin typeface="+mn-lt"/>
+              <a:ea typeface="+mn-ea"/>
+              <a:cs typeface="+mn-cs"/>
+            </a:endParaRPr>
+          </a:p>
+          <a:p>
+            <a:pPr marL="342900" marR="0" lvl="0" indent="-342900" algn="l" defTabSz="914400" rtl="0" eaLnBrk="1" fontAlgn="auto" latinLnBrk="0" hangingPunct="1">
+              <a:lnSpc>
+                <a:spcPct val="100000"/>
+              </a:lnSpc>
+              <a:spcBef>
+                <a:spcPct val="20000"/>
+              </a:spcBef>
+              <a:spcAft>
+                <a:spcPts val="0"/>
+              </a:spcAft>
+              <a:buClrTx/>
+              <a:buSzTx/>
+              <a:buFont typeface="Arial" pitchFamily="34" charset="0"/>
+              <a:buChar char="•"/>
+              <a:tabLst/>
+              <a:defRPr/>
+            </a:pPr>
+            <a:r>
+              <a:rPr lang="en-US" dirty="0" smtClean="0"/>
+              <a:t>The QG system is </a:t>
+            </a:r>
+            <a:r>
+              <a:rPr lang="en-US" b="1" dirty="0" err="1" smtClean="0"/>
+              <a:t>quasigeostrophic</a:t>
+            </a:r>
+            <a:r>
+              <a:rPr lang="en-US" dirty="0" smtClean="0"/>
+              <a:t>, hence nearly in thermal wind balance.</a:t>
+            </a:r>
+          </a:p>
+          <a:p>
+            <a:pPr marL="342900" marR="0" lvl="0" indent="-342900" algn="l" defTabSz="914400" rtl="0" eaLnBrk="1" fontAlgn="auto" latinLnBrk="0" hangingPunct="1">
+              <a:lnSpc>
+                <a:spcPct val="100000"/>
+              </a:lnSpc>
+              <a:spcBef>
+                <a:spcPct val="20000"/>
+              </a:spcBef>
+              <a:spcAft>
+                <a:spcPts val="0"/>
+              </a:spcAft>
+              <a:buClrTx/>
+              <a:buSzTx/>
+              <a:buFont typeface="Arial" pitchFamily="34" charset="0"/>
+              <a:buChar char="•"/>
+              <a:tabLst/>
+              <a:defRPr/>
+            </a:pPr>
+            <a:r>
+              <a:rPr lang="en-US" dirty="0" err="1" smtClean="0"/>
+              <a:t>Poleward</a:t>
+            </a:r>
+            <a:r>
+              <a:rPr lang="en-US" dirty="0" smtClean="0"/>
+              <a:t> transport of heat by eddies weaken the equator-to-pole temperature gradient.</a:t>
+            </a:r>
+          </a:p>
+          <a:p>
+            <a:pPr marL="342900" marR="0" lvl="0" indent="-342900" algn="l" defTabSz="914400" rtl="0" eaLnBrk="1" fontAlgn="auto" latinLnBrk="0" hangingPunct="1">
+              <a:lnSpc>
+                <a:spcPct val="100000"/>
+              </a:lnSpc>
+              <a:spcBef>
+                <a:spcPct val="20000"/>
+              </a:spcBef>
+              <a:spcAft>
+                <a:spcPts val="0"/>
+              </a:spcAft>
+              <a:buClrTx/>
+              <a:buSzTx/>
+              <a:buFont typeface="Arial" pitchFamily="34" charset="0"/>
+              <a:buChar char="•"/>
+              <a:tabLst/>
+              <a:defRPr/>
+            </a:pPr>
+            <a:r>
+              <a:rPr kumimoji="0" lang="en-US" sz="1800" b="0" i="0" u="none" strike="noStrike" kern="1200" cap="none" spc="0" normalizeH="0" baseline="0" noProof="0" dirty="0" smtClean="0">
+                <a:ln>
+                  <a:noFill/>
+                </a:ln>
+                <a:solidFill>
+                  <a:schemeClr val="tx1"/>
+                </a:solidFill>
+                <a:effectLst/>
+                <a:uLnTx/>
+                <a:uFillTx/>
+                <a:latin typeface="+mn-lt"/>
+                <a:ea typeface="+mn-ea"/>
+                <a:cs typeface="+mn-cs"/>
+              </a:rPr>
+              <a:t>In</a:t>
+            </a:r>
+            <a:r>
+              <a:rPr kumimoji="0" lang="en-US" sz="1800" b="0" i="0" u="none" strike="noStrike" kern="1200" cap="none" spc="0" normalizeH="0" noProof="0" dirty="0" smtClean="0">
+                <a:ln>
+                  <a:noFill/>
+                </a:ln>
+                <a:solidFill>
+                  <a:schemeClr val="tx1"/>
+                </a:solidFill>
+                <a:effectLst/>
+                <a:uLnTx/>
+                <a:uFillTx/>
+                <a:latin typeface="+mn-lt"/>
+                <a:ea typeface="+mn-ea"/>
+                <a:cs typeface="+mn-cs"/>
+              </a:rPr>
+              <a:t> order to restore thermal wind balance, the secondary circulation induces opposing adiabatic temperature tendencies.</a:t>
+            </a:r>
+          </a:p>
+          <a:p>
+            <a:pPr marL="342900" marR="0" lvl="0" indent="-342900" algn="l" defTabSz="914400" rtl="0" eaLnBrk="1" fontAlgn="auto" latinLnBrk="0" hangingPunct="1">
+              <a:lnSpc>
+                <a:spcPct val="100000"/>
+              </a:lnSpc>
+              <a:spcBef>
+                <a:spcPct val="20000"/>
+              </a:spcBef>
+              <a:spcAft>
+                <a:spcPts val="0"/>
+              </a:spcAft>
+              <a:buClrTx/>
+              <a:buSzTx/>
+              <a:buFont typeface="Arial" pitchFamily="34" charset="0"/>
+              <a:buChar char="•"/>
+              <a:tabLst/>
+              <a:defRPr/>
+            </a:pPr>
+            <a:r>
+              <a:rPr lang="en-US" baseline="0" dirty="0" smtClean="0"/>
+              <a:t>Note</a:t>
+            </a:r>
+            <a:r>
+              <a:rPr lang="en-US" dirty="0" smtClean="0"/>
+              <a:t> that the secondary circulation also induces momentum tendencies through the </a:t>
+            </a:r>
+            <a:r>
+              <a:rPr lang="en-US" dirty="0" err="1" smtClean="0"/>
+              <a:t>Coriolis</a:t>
+            </a:r>
+            <a:r>
+              <a:rPr lang="en-US" dirty="0" smtClean="0"/>
+              <a:t> force to restore thermal wind balance (see later slides…)</a:t>
+            </a:r>
+            <a:endParaRPr kumimoji="0" lang="en-US" sz="1800" b="0" i="0" u="none" strike="noStrike" kern="1200" cap="none" spc="0" normalizeH="0" baseline="0" noProof="0" dirty="0" smtClean="0">
+              <a:ln>
+                <a:noFill/>
+              </a:ln>
+              <a:solidFill>
+                <a:schemeClr val="tx1"/>
+              </a:solidFill>
+              <a:effectLst/>
+              <a:uLnTx/>
+              <a:uFillTx/>
+              <a:latin typeface="+mn-lt"/>
+              <a:ea typeface="+mn-ea"/>
+              <a:cs typeface="+mn-cs"/>
+            </a:endParaRPr>
+          </a:p>
+        </p:txBody>
+      </p:sp>
+      <p:sp>
+        <p:nvSpPr>
+          <p:cNvPr id="8" name="TextBox 7"/>
+          <p:cNvSpPr txBox="1"/>
+          <p:nvPr/>
+        </p:nvSpPr>
+        <p:spPr>
+          <a:xfrm>
+            <a:off x="2362200" y="1371600"/>
+            <a:ext cx="1600200" cy="1298377"/>
+          </a:xfrm>
+          <a:prstGeom prst="ellipse">
+            <a:avLst/>
+          </a:prstGeom>
+          <a:noFill/>
+          <a:ln>
+            <a:solidFill>
+              <a:schemeClr val="bg1"/>
+            </a:solidFill>
+          </a:ln>
+        </p:spPr>
+        <p:txBody>
+          <a:bodyPr wrap="square" rtlCol="0">
+            <a:spAutoFit/>
+          </a:bodyPr>
+          <a:lstStyle/>
+          <a:p>
+            <a:pPr algn="ctr"/>
+            <a:r>
+              <a:rPr lang="en-US" dirty="0" smtClean="0">
+                <a:solidFill>
+                  <a:schemeClr val="bg1"/>
+                </a:solidFill>
+              </a:rPr>
+              <a:t>Warming due to WAA</a:t>
+            </a:r>
+            <a:endParaRPr lang="en-US" dirty="0">
+              <a:solidFill>
+                <a:schemeClr val="bg1"/>
+              </a:solidFill>
+            </a:endParaRPr>
+          </a:p>
+        </p:txBody>
+      </p:sp>
+      <p:sp>
+        <p:nvSpPr>
+          <p:cNvPr id="9" name="TextBox 8"/>
+          <p:cNvSpPr txBox="1"/>
+          <p:nvPr/>
+        </p:nvSpPr>
+        <p:spPr>
+          <a:xfrm>
+            <a:off x="381000" y="1371600"/>
+            <a:ext cx="1600200" cy="1298377"/>
+          </a:xfrm>
+          <a:prstGeom prst="ellipse">
+            <a:avLst/>
+          </a:prstGeom>
+          <a:noFill/>
+          <a:ln>
+            <a:solidFill>
+              <a:schemeClr val="bg1"/>
+            </a:solidFill>
+          </a:ln>
+        </p:spPr>
+        <p:txBody>
+          <a:bodyPr wrap="square" rtlCol="0">
+            <a:spAutoFit/>
+          </a:bodyPr>
+          <a:lstStyle/>
+          <a:p>
+            <a:pPr algn="ctr"/>
+            <a:r>
+              <a:rPr lang="en-US" dirty="0" smtClean="0">
+                <a:solidFill>
+                  <a:schemeClr val="bg1"/>
+                </a:solidFill>
+              </a:rPr>
+              <a:t>Cooling due to CAA</a:t>
+            </a:r>
+            <a:endParaRPr lang="en-US" dirty="0">
+              <a:solidFill>
+                <a:schemeClr val="bg1"/>
+              </a:solidFill>
+            </a:endParaRPr>
+          </a:p>
+        </p:txBody>
+      </p:sp>
+      <p:sp>
+        <p:nvSpPr>
+          <p:cNvPr id="10" name="TextBox 9"/>
+          <p:cNvSpPr txBox="1"/>
+          <p:nvPr/>
+        </p:nvSpPr>
+        <p:spPr>
+          <a:xfrm>
+            <a:off x="1371600" y="457200"/>
+            <a:ext cx="1600200" cy="369332"/>
+          </a:xfrm>
+          <a:prstGeom prst="rect">
+            <a:avLst/>
+          </a:prstGeom>
+          <a:noFill/>
+          <a:ln>
+            <a:noFill/>
+          </a:ln>
+        </p:spPr>
+        <p:txBody>
+          <a:bodyPr wrap="square" rtlCol="0">
+            <a:spAutoFit/>
+          </a:bodyPr>
+          <a:lstStyle/>
+          <a:p>
+            <a:pPr algn="ctr"/>
+            <a:r>
+              <a:rPr lang="en-US" dirty="0" smtClean="0">
+                <a:solidFill>
+                  <a:schemeClr val="bg1"/>
+                </a:solidFill>
+              </a:rPr>
+              <a:t>Forcing</a:t>
+            </a:r>
+            <a:endParaRPr lang="en-US" dirty="0">
+              <a:solidFill>
+                <a:schemeClr val="bg1"/>
+              </a:solidFill>
+            </a:endParaRPr>
+          </a:p>
+        </p:txBody>
+      </p:sp>
+      <p:sp>
+        <p:nvSpPr>
+          <p:cNvPr id="11" name="TextBox 10"/>
+          <p:cNvSpPr txBox="1"/>
+          <p:nvPr/>
+        </p:nvSpPr>
+        <p:spPr>
+          <a:xfrm>
+            <a:off x="6781800" y="1371600"/>
+            <a:ext cx="1676400" cy="1687890"/>
+          </a:xfrm>
+          <a:prstGeom prst="ellipse">
+            <a:avLst/>
+          </a:prstGeom>
+          <a:noFill/>
+          <a:ln>
+            <a:solidFill>
+              <a:schemeClr val="bg1"/>
+            </a:solidFill>
+          </a:ln>
+        </p:spPr>
+        <p:txBody>
+          <a:bodyPr wrap="square" rtlCol="0">
+            <a:spAutoFit/>
+          </a:bodyPr>
+          <a:lstStyle/>
+          <a:p>
+            <a:pPr algn="ctr"/>
+            <a:r>
+              <a:rPr lang="en-US" dirty="0" smtClean="0">
+                <a:solidFill>
+                  <a:schemeClr val="bg1"/>
+                </a:solidFill>
+              </a:rPr>
+              <a:t>Cooling due to ascent</a:t>
+            </a:r>
+          </a:p>
+          <a:p>
+            <a:pPr algn="ctr"/>
+            <a:r>
+              <a:rPr lang="en-US" dirty="0" smtClean="0">
+                <a:solidFill>
+                  <a:schemeClr val="bg1"/>
+                </a:solidFill>
+              </a:rPr>
+              <a:t>↑</a:t>
+            </a:r>
+            <a:endParaRPr lang="en-US" dirty="0">
+              <a:solidFill>
+                <a:schemeClr val="bg1"/>
+              </a:solidFill>
+            </a:endParaRPr>
+          </a:p>
+        </p:txBody>
+      </p:sp>
+      <p:sp>
+        <p:nvSpPr>
+          <p:cNvPr id="12" name="TextBox 11"/>
+          <p:cNvSpPr txBox="1"/>
+          <p:nvPr/>
+        </p:nvSpPr>
+        <p:spPr>
+          <a:xfrm>
+            <a:off x="4800600" y="1371600"/>
+            <a:ext cx="1752600" cy="1687890"/>
+          </a:xfrm>
+          <a:prstGeom prst="ellipse">
+            <a:avLst/>
+          </a:prstGeom>
+          <a:noFill/>
+          <a:ln>
+            <a:solidFill>
+              <a:schemeClr val="bg1"/>
+            </a:solidFill>
+          </a:ln>
+        </p:spPr>
+        <p:txBody>
+          <a:bodyPr wrap="square" rtlCol="0">
+            <a:spAutoFit/>
+          </a:bodyPr>
+          <a:lstStyle/>
+          <a:p>
+            <a:pPr algn="ctr"/>
+            <a:r>
+              <a:rPr lang="en-US" dirty="0" smtClean="0">
+                <a:solidFill>
+                  <a:schemeClr val="bg1"/>
+                </a:solidFill>
+              </a:rPr>
+              <a:t>Warming due to subsidence ↓</a:t>
+            </a:r>
+            <a:endParaRPr lang="en-US" dirty="0">
+              <a:solidFill>
+                <a:schemeClr val="bg1"/>
+              </a:solidFill>
+            </a:endParaRPr>
+          </a:p>
+        </p:txBody>
+      </p:sp>
+      <p:sp>
+        <p:nvSpPr>
+          <p:cNvPr id="13" name="TextBox 12"/>
+          <p:cNvSpPr txBox="1"/>
+          <p:nvPr/>
+        </p:nvSpPr>
+        <p:spPr>
+          <a:xfrm>
+            <a:off x="5410200" y="457200"/>
+            <a:ext cx="2590800" cy="923330"/>
+          </a:xfrm>
+          <a:prstGeom prst="rect">
+            <a:avLst/>
+          </a:prstGeom>
+          <a:noFill/>
+          <a:ln>
+            <a:noFill/>
+          </a:ln>
+        </p:spPr>
+        <p:txBody>
+          <a:bodyPr wrap="square" rtlCol="0">
+            <a:spAutoFit/>
+          </a:bodyPr>
+          <a:lstStyle/>
+          <a:p>
+            <a:pPr algn="ctr"/>
+            <a:r>
+              <a:rPr lang="en-US" dirty="0" smtClean="0">
+                <a:solidFill>
+                  <a:schemeClr val="bg1"/>
+                </a:solidFill>
+              </a:rPr>
+              <a:t>Response: vertical motion induces adiabatic temperature tendencies</a:t>
+            </a:r>
+            <a:endParaRPr lang="en-US" dirty="0">
+              <a:solidFill>
+                <a:schemeClr val="bg1"/>
+              </a:solidFill>
+            </a:endParaRPr>
+          </a:p>
+        </p:txBody>
+      </p:sp>
+    </p:spTree>
+  </p:cSld>
+  <p:clrMapOvr>
+    <a:masterClrMapping/>
+  </p:clrMapOvr>
+  <p:timing>
+    <p:tnLst>
+      <p:par>
+        <p:cTn id="1" dur="indefinite" restart="never" nodeType="tmRoot"/>
+      </p:par>
+    </p:tnLst>
+  </p:timing>
+</p:sld>
+</file>
+
+<file path=ppt/slides/slide9.xml><?xml version="1.0" encoding="utf-8"?>
+<p:sld xmlns:a="http://schemas.openxmlformats.org/drawingml/2006/main" xmlns:r="http://schemas.openxmlformats.org/officeDocument/2006/relationships" xmlns:p="http://schemas.openxmlformats.org/presentationml/2006/main">
+  <p:cSld>
+    <p:spTree>
+      <p:nvGrpSpPr>
+        <p:cNvPr id="1" name=""/>
+        <p:cNvGrpSpPr/>
+        <p:nvPr/>
+      </p:nvGrpSpPr>
+      <p:grpSpPr>
+        <a:xfrm>
+          <a:off x="0" y="0"/>
+          <a:ext cx="0" cy="0"/>
+          <a:chOff x="0" y="0"/>
+          <a:chExt cx="0" cy="0"/>
+        </a:xfrm>
+      </p:grpSpPr>
+      <p:sp>
+        <p:nvSpPr>
+          <p:cNvPr id="2" name="Title 1"/>
+          <p:cNvSpPr>
+            <a:spLocks noGrp="1"/>
+          </p:cNvSpPr>
+          <p:nvPr>
+            <p:ph type="title"/>
           </p:nvPr>
         </p:nvSpPr>
         <p:spPr/>
@@ -3786,154 +6232,469 @@
           <a:noFill/>
         </p:spPr>
       </p:pic>
-    </p:spTree>
-  </p:cSld>
-  <p:clrMapOvr>
-    <a:masterClrMapping/>
-  </p:clrMapOvr>
-  <p:timing>
-    <p:tnLst>
-      <p:par>
-        <p:cTn id="1" dur="indefinite" restart="never" nodeType="tmRoot"/>
-      </p:par>
-    </p:tnLst>
-  </p:timing>
-</p:sld>
-</file>
-
-<file path=ppt/slides/slide8.xml><?xml version="1.0" encoding="utf-8"?>
-<p:sld xmlns:a="http://schemas.openxmlformats.org/drawingml/2006/main" xmlns:r="http://schemas.openxmlformats.org/officeDocument/2006/relationships" xmlns:p="http://schemas.openxmlformats.org/presentationml/2006/main">
-  <p:cSld>
-    <p:spTree>
-      <p:nvGrpSpPr>
-        <p:cNvPr id="1" name=""/>
-        <p:cNvGrpSpPr/>
-        <p:nvPr/>
-      </p:nvGrpSpPr>
-      <p:grpSpPr>
-        <a:xfrm>
-          <a:off x="0" y="0"/>
-          <a:ext cx="0" cy="0"/>
-          <a:chOff x="0" y="0"/>
-          <a:chExt cx="0" cy="0"/>
-        </a:xfrm>
-      </p:grpSpPr>
-      <p:sp>
-        <p:nvSpPr>
-          <p:cNvPr id="2" name="Title 1"/>
-          <p:cNvSpPr>
-            <a:spLocks noGrp="1"/>
-          </p:cNvSpPr>
-          <p:nvPr>
-            <p:ph type="title"/>
-          </p:nvPr>
-        </p:nvSpPr>
-        <p:spPr/>
-        <p:txBody>
-          <a:bodyPr/>
-          <a:lstStyle/>
-          <a:p>
-            <a:endParaRPr lang="en-US"/>
-          </a:p>
-        </p:txBody>
-      </p:sp>
-      <p:sp>
-        <p:nvSpPr>
-          <p:cNvPr id="3" name="Content Placeholder 2"/>
-          <p:cNvSpPr>
-            <a:spLocks noGrp="1"/>
-          </p:cNvSpPr>
-          <p:nvPr>
-            <p:ph idx="1"/>
-          </p:nvPr>
-        </p:nvSpPr>
-        <p:spPr/>
-        <p:txBody>
-          <a:bodyPr/>
-          <a:lstStyle/>
-          <a:p>
-            <a:endParaRPr lang="en-US"/>
-          </a:p>
-        </p:txBody>
-      </p:sp>
-      <p:pic>
-        <p:nvPicPr>
-          <p:cNvPr id="7171" name="Picture 3" descr="C:\Users\Joshua Pan\Desktop\PSUYr2_scratch\qg_baroc_wv\yp_QG_TA.png"/>
-          <p:cNvPicPr>
-            <a:picLocks noChangeAspect="1" noChangeArrowheads="1"/>
-          </p:cNvPicPr>
+      <p:sp>
+        <p:nvSpPr>
+          <p:cNvPr id="7" name="Content Placeholder 2"/>
+          <p:cNvSpPr txBox="1">
+            <a:spLocks/>
+          </p:cNvSpPr>
           <p:nvPr/>
-        </p:nvPicPr>
-        <p:blipFill>
-          <a:blip r:embed="rId2" cstate="print"/>
-          <a:srcRect b="4428"/>
-          <a:stretch>
-            <a:fillRect/>
-          </a:stretch>
-        </p:blipFill>
-        <p:spPr bwMode="auto">
+        </p:nvSpPr>
+        <p:spPr>
           <a:xfrm>
-            <a:off x="0" y="152400"/>
-            <a:ext cx="4572000" cy="3124200"/>
+            <a:off x="457200" y="3505200"/>
+            <a:ext cx="8229600" cy="3352800"/>
           </a:xfrm>
           <a:prstGeom prst="rect">
             <a:avLst/>
           </a:prstGeom>
-          <a:noFill/>
         </p:spPr>
-      </p:pic>
-      <p:pic>
-        <p:nvPicPr>
-          <p:cNvPr id="7173" name="Picture 5" descr="C:\Users\Joshua Pan\Desktop\PSUYr2_scratch\qg_baroc_wv\yp_QG_VA.png"/>
-          <p:cNvPicPr>
-            <a:picLocks noChangeAspect="1" noChangeArrowheads="1"/>
-          </p:cNvPicPr>
-          <p:nvPr/>
-        </p:nvPicPr>
-        <p:blipFill>
-          <a:blip r:embed="rId3" cstate="print"/>
-          <a:srcRect b="4428"/>
-          <a:stretch>
-            <a:fillRect/>
-          </a:stretch>
-        </p:blipFill>
-        <p:spPr bwMode="auto">
-          <a:xfrm>
-            <a:off x="4572000" y="152400"/>
-            <a:ext cx="4572000" cy="3124200"/>
-          </a:xfrm>
-          <a:prstGeom prst="rect">
-            <a:avLst/>
-          </a:prstGeom>
-          <a:noFill/>
-        </p:spPr>
-      </p:pic>
-      <p:pic>
-        <p:nvPicPr>
-          <p:cNvPr id="7175" name="Picture 7" descr="C:\Users\Joshua Pan\Desktop\PSUYr2_scratch\qg_baroc_wv\yp_QG.png"/>
-          <p:cNvPicPr>
-            <a:picLocks noChangeAspect="1" noChangeArrowheads="1"/>
-          </p:cNvPicPr>
-          <p:nvPr/>
-        </p:nvPicPr>
-        <p:blipFill>
-          <a:blip r:embed="rId4" cstate="print"/>
-          <a:srcRect/>
-          <a:stretch>
-            <a:fillRect/>
-          </a:stretch>
-        </p:blipFill>
-        <p:spPr bwMode="auto">
-          <a:xfrm>
-            <a:off x="2133600" y="3302000"/>
-            <a:ext cx="5334000" cy="3556000"/>
-          </a:xfrm>
-          <a:prstGeom prst="rect">
-            <a:avLst/>
-          </a:prstGeom>
-          <a:noFill/>
-        </p:spPr>
-      </p:pic>
+        <p:txBody>
+          <a:bodyPr vert="horz" lIns="91440" tIns="45720" rIns="91440" bIns="45720" rtlCol="0">
+            <a:normAutofit/>
+          </a:bodyPr>
+          <a:lstStyle/>
+          <a:p>
+            <a:pPr marL="342900" marR="0" lvl="0" indent="-342900" algn="l" defTabSz="914400" rtl="0" eaLnBrk="1" fontAlgn="auto" latinLnBrk="0" hangingPunct="1">
+              <a:lnSpc>
+                <a:spcPct val="100000"/>
+              </a:lnSpc>
+              <a:spcBef>
+                <a:spcPct val="20000"/>
+              </a:spcBef>
+              <a:spcAft>
+                <a:spcPts val="0"/>
+              </a:spcAft>
+              <a:buClrTx/>
+              <a:buSzTx/>
+              <a:buFont typeface="Arial" pitchFamily="34" charset="0"/>
+              <a:buNone/>
+              <a:tabLst/>
+              <a:defRPr/>
+            </a:pPr>
+            <a:r>
+              <a:rPr kumimoji="0" lang="en-US" sz="2400" b="1" i="0" u="none" strike="noStrike" kern="1200" cap="none" spc="0" normalizeH="0" baseline="0" noProof="0" dirty="0" smtClean="0">
+                <a:ln>
+                  <a:noFill/>
+                </a:ln>
+                <a:solidFill>
+                  <a:schemeClr val="tx1"/>
+                </a:solidFill>
+                <a:effectLst/>
+                <a:uLnTx/>
+                <a:uFillTx/>
+                <a:latin typeface="+mn-lt"/>
+                <a:ea typeface="+mn-ea"/>
+                <a:cs typeface="+mn-cs"/>
+              </a:rPr>
+              <a:t>Zonal-mean view of</a:t>
+            </a:r>
+            <a:r>
+              <a:rPr kumimoji="0" lang="en-US" sz="2400" b="1" i="0" u="none" strike="noStrike" kern="1200" cap="none" spc="0" normalizeH="0" noProof="0" dirty="0" smtClean="0">
+                <a:ln>
+                  <a:noFill/>
+                </a:ln>
+                <a:solidFill>
+                  <a:schemeClr val="tx1"/>
+                </a:solidFill>
+                <a:effectLst/>
+                <a:uLnTx/>
+                <a:uFillTx/>
+                <a:latin typeface="+mn-lt"/>
+                <a:ea typeface="+mn-ea"/>
+                <a:cs typeface="+mn-cs"/>
+              </a:rPr>
+              <a:t> EMF and </a:t>
+            </a:r>
+            <a:r>
+              <a:rPr kumimoji="0" lang="en-US" sz="2400" b="1" i="0" u="none" strike="noStrike" kern="1200" cap="none" spc="0" normalizeH="0" noProof="0" dirty="0" err="1" smtClean="0">
+                <a:ln>
+                  <a:noFill/>
+                </a:ln>
+                <a:solidFill>
+                  <a:schemeClr val="tx1"/>
+                </a:solidFill>
+                <a:effectLst/>
+                <a:uLnTx/>
+                <a:uFillTx/>
+                <a:latin typeface="+mn-lt"/>
+                <a:ea typeface="+mn-ea"/>
+                <a:cs typeface="+mn-cs"/>
+              </a:rPr>
+              <a:t>vorticity</a:t>
+            </a:r>
+            <a:r>
+              <a:rPr kumimoji="0" lang="en-US" sz="2400" b="1" i="0" u="none" strike="noStrike" kern="1200" cap="none" spc="0" normalizeH="0" noProof="0" dirty="0" smtClean="0">
+                <a:ln>
+                  <a:noFill/>
+                </a:ln>
+                <a:solidFill>
+                  <a:schemeClr val="tx1"/>
+                </a:solidFill>
+                <a:effectLst/>
+                <a:uLnTx/>
+                <a:uFillTx/>
+                <a:latin typeface="+mn-lt"/>
+                <a:ea typeface="+mn-ea"/>
+                <a:cs typeface="+mn-cs"/>
+              </a:rPr>
+              <a:t> advection</a:t>
+            </a:r>
+            <a:endParaRPr kumimoji="0" lang="en-US" sz="2400" b="1" i="0" u="none" strike="noStrike" kern="1200" cap="none" spc="0" normalizeH="0" baseline="0" noProof="0" dirty="0" smtClean="0">
+              <a:ln>
+                <a:noFill/>
+              </a:ln>
+              <a:solidFill>
+                <a:schemeClr val="tx1"/>
+              </a:solidFill>
+              <a:effectLst/>
+              <a:uLnTx/>
+              <a:uFillTx/>
+              <a:latin typeface="+mn-lt"/>
+              <a:ea typeface="+mn-ea"/>
+              <a:cs typeface="+mn-cs"/>
+            </a:endParaRPr>
+          </a:p>
+          <a:p>
+            <a:pPr marL="342900" marR="0" lvl="0" indent="-342900" algn="l" defTabSz="914400" rtl="0" eaLnBrk="1" fontAlgn="auto" latinLnBrk="0" hangingPunct="1">
+              <a:lnSpc>
+                <a:spcPct val="100000"/>
+              </a:lnSpc>
+              <a:spcBef>
+                <a:spcPct val="20000"/>
+              </a:spcBef>
+              <a:spcAft>
+                <a:spcPts val="0"/>
+              </a:spcAft>
+              <a:buClrTx/>
+              <a:buSzTx/>
+              <a:buFont typeface="Arial" pitchFamily="34" charset="0"/>
+              <a:buChar char="•"/>
+              <a:tabLst/>
+              <a:defRPr/>
+            </a:pPr>
+            <a:r>
+              <a:rPr kumimoji="0" lang="en-US" sz="1800" b="0" i="0" u="none" strike="noStrike" kern="1200" cap="none" spc="0" normalizeH="0" baseline="0" noProof="0" dirty="0" smtClean="0">
+                <a:ln>
+                  <a:noFill/>
+                </a:ln>
+                <a:solidFill>
+                  <a:schemeClr val="tx1"/>
+                </a:solidFill>
+                <a:effectLst/>
+                <a:uLnTx/>
+                <a:uFillTx/>
+                <a:latin typeface="+mn-lt"/>
+                <a:ea typeface="+mn-ea"/>
+                <a:cs typeface="+mn-cs"/>
+              </a:rPr>
+              <a:t>The EMF decelerates</a:t>
+            </a:r>
+            <a:r>
+              <a:rPr kumimoji="0" lang="en-US" sz="1800" b="0" i="0" u="none" strike="noStrike" kern="1200" cap="none" spc="0" normalizeH="0" noProof="0" dirty="0" smtClean="0">
+                <a:ln>
+                  <a:noFill/>
+                </a:ln>
+                <a:solidFill>
+                  <a:schemeClr val="tx1"/>
+                </a:solidFill>
+                <a:effectLst/>
+                <a:uLnTx/>
+                <a:uFillTx/>
+                <a:latin typeface="+mn-lt"/>
+                <a:ea typeface="+mn-ea"/>
+                <a:cs typeface="+mn-cs"/>
+              </a:rPr>
+              <a:t> </a:t>
+            </a:r>
+            <a:r>
+              <a:rPr kumimoji="0" lang="en-US" sz="1800" b="0" i="0" u="none" strike="noStrike" kern="1200" cap="none" spc="0" normalizeH="0" noProof="0" dirty="0" err="1" smtClean="0">
+                <a:ln>
+                  <a:noFill/>
+                </a:ln>
+                <a:solidFill>
+                  <a:schemeClr val="tx1"/>
+                </a:solidFill>
+                <a:effectLst/>
+                <a:uLnTx/>
+                <a:uFillTx/>
+                <a:latin typeface="+mn-lt"/>
+                <a:ea typeface="+mn-ea"/>
+                <a:cs typeface="+mn-cs"/>
+              </a:rPr>
+              <a:t>westerlies</a:t>
+            </a:r>
+            <a:r>
+              <a:rPr kumimoji="0" lang="en-US" sz="1800" b="0" i="0" u="none" strike="noStrike" kern="1200" cap="none" spc="0" normalizeH="0" noProof="0" dirty="0" smtClean="0">
+                <a:ln>
+                  <a:noFill/>
+                </a:ln>
+                <a:solidFill>
+                  <a:schemeClr val="tx1"/>
+                </a:solidFill>
+                <a:effectLst/>
+                <a:uLnTx/>
+                <a:uFillTx/>
+                <a:latin typeface="+mn-lt"/>
+                <a:ea typeface="+mn-ea"/>
+                <a:cs typeface="+mn-cs"/>
+              </a:rPr>
+              <a:t> on the </a:t>
+            </a:r>
+            <a:r>
+              <a:rPr kumimoji="0" lang="en-US" sz="1800" b="0" i="0" u="none" strike="noStrike" kern="1200" cap="none" spc="0" normalizeH="0" noProof="0" dirty="0" err="1" smtClean="0">
+                <a:ln>
+                  <a:noFill/>
+                </a:ln>
+                <a:solidFill>
+                  <a:schemeClr val="tx1"/>
+                </a:solidFill>
+                <a:effectLst/>
+                <a:uLnTx/>
+                <a:uFillTx/>
+                <a:latin typeface="+mn-lt"/>
+                <a:ea typeface="+mn-ea"/>
+                <a:cs typeface="+mn-cs"/>
+              </a:rPr>
+              <a:t>equatorward</a:t>
+            </a:r>
+            <a:r>
+              <a:rPr kumimoji="0" lang="en-US" sz="1800" b="0" i="0" u="none" strike="noStrike" kern="1200" cap="none" spc="0" normalizeH="0" noProof="0" dirty="0" smtClean="0">
+                <a:ln>
+                  <a:noFill/>
+                </a:ln>
+                <a:solidFill>
+                  <a:schemeClr val="tx1"/>
+                </a:solidFill>
+                <a:effectLst/>
+                <a:uLnTx/>
+                <a:uFillTx/>
+                <a:latin typeface="+mn-lt"/>
+                <a:ea typeface="+mn-ea"/>
+                <a:cs typeface="+mn-cs"/>
+              </a:rPr>
+              <a:t> flank of the domain and accelerates </a:t>
+            </a:r>
+            <a:r>
+              <a:rPr kumimoji="0" lang="en-US" sz="1800" b="0" i="0" u="none" strike="noStrike" kern="1200" cap="none" spc="0" normalizeH="0" noProof="0" dirty="0" err="1" smtClean="0">
+                <a:ln>
+                  <a:noFill/>
+                </a:ln>
+                <a:solidFill>
+                  <a:schemeClr val="tx1"/>
+                </a:solidFill>
+                <a:effectLst/>
+                <a:uLnTx/>
+                <a:uFillTx/>
+                <a:latin typeface="+mn-lt"/>
+                <a:ea typeface="+mn-ea"/>
+                <a:cs typeface="+mn-cs"/>
+              </a:rPr>
+              <a:t>westerlies</a:t>
+            </a:r>
+            <a:r>
+              <a:rPr kumimoji="0" lang="en-US" sz="1800" b="0" i="0" u="none" strike="noStrike" kern="1200" cap="none" spc="0" normalizeH="0" noProof="0" dirty="0" smtClean="0">
+                <a:ln>
+                  <a:noFill/>
+                </a:ln>
+                <a:solidFill>
+                  <a:schemeClr val="tx1"/>
+                </a:solidFill>
+                <a:effectLst/>
+                <a:uLnTx/>
+                <a:uFillTx/>
+                <a:latin typeface="+mn-lt"/>
+                <a:ea typeface="+mn-ea"/>
+                <a:cs typeface="+mn-cs"/>
+              </a:rPr>
+              <a:t> on the </a:t>
+            </a:r>
+            <a:r>
+              <a:rPr kumimoji="0" lang="en-US" sz="1800" b="0" i="0" u="none" strike="noStrike" kern="1200" cap="none" spc="0" normalizeH="0" noProof="0" dirty="0" err="1" smtClean="0">
+                <a:ln>
+                  <a:noFill/>
+                </a:ln>
+                <a:solidFill>
+                  <a:schemeClr val="tx1"/>
+                </a:solidFill>
+                <a:effectLst/>
+                <a:uLnTx/>
+                <a:uFillTx/>
+                <a:latin typeface="+mn-lt"/>
+                <a:ea typeface="+mn-ea"/>
+                <a:cs typeface="+mn-cs"/>
+              </a:rPr>
+              <a:t>poleward</a:t>
+            </a:r>
+            <a:r>
+              <a:rPr kumimoji="0" lang="en-US" sz="1800" b="0" i="0" u="none" strike="noStrike" kern="1200" cap="none" spc="0" normalizeH="0" noProof="0" dirty="0" smtClean="0">
+                <a:ln>
+                  <a:noFill/>
+                </a:ln>
+                <a:solidFill>
+                  <a:schemeClr val="tx1"/>
+                </a:solidFill>
+                <a:effectLst/>
+                <a:uLnTx/>
+                <a:uFillTx/>
+                <a:latin typeface="+mn-lt"/>
+                <a:ea typeface="+mn-ea"/>
+                <a:cs typeface="+mn-cs"/>
+              </a:rPr>
+              <a:t> flank.</a:t>
+            </a:r>
+            <a:endParaRPr kumimoji="0" lang="en-US" sz="1800" b="0" i="0" u="none" strike="noStrike" kern="1200" cap="none" spc="0" normalizeH="0" baseline="0" noProof="0" dirty="0" smtClean="0">
+              <a:ln>
+                <a:noFill/>
+              </a:ln>
+              <a:solidFill>
+                <a:schemeClr val="tx1"/>
+              </a:solidFill>
+              <a:effectLst/>
+              <a:uLnTx/>
+              <a:uFillTx/>
+              <a:latin typeface="+mn-lt"/>
+              <a:ea typeface="+mn-ea"/>
+              <a:cs typeface="+mn-cs"/>
+            </a:endParaRPr>
+          </a:p>
+          <a:p>
+            <a:pPr marL="342900" marR="0" lvl="0" indent="-342900" algn="l" defTabSz="914400" rtl="0" eaLnBrk="1" fontAlgn="auto" latinLnBrk="0" hangingPunct="1">
+              <a:lnSpc>
+                <a:spcPct val="100000"/>
+              </a:lnSpc>
+              <a:spcBef>
+                <a:spcPct val="20000"/>
+              </a:spcBef>
+              <a:spcAft>
+                <a:spcPts val="0"/>
+              </a:spcAft>
+              <a:buClrTx/>
+              <a:buSzTx/>
+              <a:buFont typeface="Arial" pitchFamily="34" charset="0"/>
+              <a:buChar char="•"/>
+              <a:tabLst/>
+              <a:defRPr/>
+            </a:pPr>
+            <a:r>
+              <a:rPr kumimoji="0" lang="en-US" sz="1800" b="0" i="0" u="none" strike="noStrike" kern="1200" cap="none" spc="0" normalizeH="0" baseline="0" noProof="0" dirty="0" smtClean="0">
+                <a:ln>
+                  <a:noFill/>
+                </a:ln>
+                <a:solidFill>
+                  <a:schemeClr val="tx1"/>
+                </a:solidFill>
+                <a:effectLst/>
+                <a:uLnTx/>
+                <a:uFillTx/>
+                <a:latin typeface="+mn-lt"/>
+                <a:ea typeface="+mn-ea"/>
+                <a:cs typeface="+mn-cs"/>
+              </a:rPr>
+              <a:t>There is net</a:t>
+            </a:r>
+            <a:r>
+              <a:rPr kumimoji="0" lang="en-US" sz="1800" b="0" i="0" u="none" strike="noStrike" kern="1200" cap="none" spc="0" normalizeH="0" noProof="0" dirty="0" smtClean="0">
+                <a:ln>
+                  <a:noFill/>
+                </a:ln>
+                <a:solidFill>
+                  <a:schemeClr val="tx1"/>
+                </a:solidFill>
+                <a:effectLst/>
+                <a:uLnTx/>
+                <a:uFillTx/>
+                <a:latin typeface="+mn-lt"/>
+                <a:ea typeface="+mn-ea"/>
+                <a:cs typeface="+mn-cs"/>
+              </a:rPr>
+              <a:t> </a:t>
+            </a:r>
+            <a:r>
+              <a:rPr kumimoji="0" lang="en-US" sz="1800" b="0" i="0" u="none" strike="noStrike" kern="1200" cap="none" spc="0" normalizeH="0" noProof="0" dirty="0" err="1" smtClean="0">
+                <a:ln>
+                  <a:noFill/>
+                </a:ln>
+                <a:solidFill>
+                  <a:schemeClr val="tx1"/>
+                </a:solidFill>
+                <a:effectLst/>
+                <a:uLnTx/>
+                <a:uFillTx/>
+                <a:latin typeface="+mn-lt"/>
+                <a:ea typeface="+mn-ea"/>
+                <a:cs typeface="+mn-cs"/>
+              </a:rPr>
+              <a:t>anticyclonic</a:t>
+            </a:r>
+            <a:r>
+              <a:rPr kumimoji="0" lang="en-US" sz="1800" b="0" i="0" u="none" strike="noStrike" kern="1200" cap="none" spc="0" normalizeH="0" noProof="0" dirty="0" smtClean="0">
+                <a:ln>
+                  <a:noFill/>
+                </a:ln>
+                <a:solidFill>
+                  <a:schemeClr val="tx1"/>
+                </a:solidFill>
+                <a:effectLst/>
+                <a:uLnTx/>
+                <a:uFillTx/>
+                <a:latin typeface="+mn-lt"/>
+                <a:ea typeface="+mn-ea"/>
+                <a:cs typeface="+mn-cs"/>
+              </a:rPr>
+              <a:t> </a:t>
+            </a:r>
+            <a:r>
+              <a:rPr kumimoji="0" lang="en-US" sz="1800" b="0" i="0" u="none" strike="noStrike" kern="1200" cap="none" spc="0" normalizeH="0" noProof="0" dirty="0" err="1" smtClean="0">
+                <a:ln>
+                  <a:noFill/>
+                </a:ln>
+                <a:solidFill>
+                  <a:schemeClr val="tx1"/>
+                </a:solidFill>
+                <a:effectLst/>
+                <a:uLnTx/>
+                <a:uFillTx/>
+                <a:latin typeface="+mn-lt"/>
+                <a:ea typeface="+mn-ea"/>
+                <a:cs typeface="+mn-cs"/>
+              </a:rPr>
+              <a:t>vorticity</a:t>
+            </a:r>
+            <a:r>
+              <a:rPr kumimoji="0" lang="en-US" sz="1800" b="0" i="0" u="none" strike="noStrike" kern="1200" cap="none" spc="0" normalizeH="0" noProof="0" dirty="0" smtClean="0">
+                <a:ln>
+                  <a:noFill/>
+                </a:ln>
+                <a:solidFill>
+                  <a:schemeClr val="tx1"/>
+                </a:solidFill>
+                <a:effectLst/>
+                <a:uLnTx/>
+                <a:uFillTx/>
+                <a:latin typeface="+mn-lt"/>
+                <a:ea typeface="+mn-ea"/>
+                <a:cs typeface="+mn-cs"/>
+              </a:rPr>
+              <a:t> advection associated with EMF.</a:t>
+            </a:r>
+            <a:endParaRPr kumimoji="0" lang="en-US" sz="1800" b="0" i="0" u="none" strike="noStrike" kern="1200" cap="none" spc="0" normalizeH="0" baseline="0" noProof="0" dirty="0" smtClean="0">
+              <a:ln>
+                <a:noFill/>
+              </a:ln>
+              <a:solidFill>
+                <a:schemeClr val="tx1"/>
+              </a:solidFill>
+              <a:effectLst/>
+              <a:uLnTx/>
+              <a:uFillTx/>
+              <a:latin typeface="+mn-lt"/>
+              <a:ea typeface="+mn-ea"/>
+              <a:cs typeface="+mn-cs"/>
+            </a:endParaRPr>
+          </a:p>
+        </p:txBody>
+      </p:sp>
     </p:spTree>
   </p:cSld>
   <p:clrMapOvr>

</xml_diff>

<commit_message>
coded QG secondary circ streamfunc
</commit_message>
<xml_diff>
--- a/baroc_wv_diag_draft.pptx
+++ b/baroc_wv_diag_draft.pptx
@@ -3080,29 +3080,65 @@
         </p:nvSpPr>
         <p:spPr/>
         <p:txBody>
+          <a:bodyPr>
+            <a:normAutofit fontScale="90000"/>
+          </a:bodyPr>
+          <a:lstStyle/>
+          <a:p>
+            <a:r>
+              <a:rPr lang="en-US" dirty="0" smtClean="0"/>
+              <a:t>An idealized diagnostic </a:t>
+            </a:r>
+            <a:r>
+              <a:rPr lang="en-US" dirty="0" err="1" smtClean="0"/>
+              <a:t>baroclinic</a:t>
+            </a:r>
+            <a:r>
+              <a:rPr lang="en-US" dirty="0" smtClean="0"/>
+              <a:t> eddy flux model (Part I): explaining the </a:t>
+            </a:r>
+            <a:r>
+              <a:rPr lang="en-US" dirty="0" err="1" smtClean="0"/>
+              <a:t>Ferrel</a:t>
+            </a:r>
+            <a:r>
+              <a:rPr lang="en-US" dirty="0" smtClean="0"/>
+              <a:t> cell through QG dynamics</a:t>
+            </a:r>
+            <a:endParaRPr lang="en-US" dirty="0"/>
+          </a:p>
+        </p:txBody>
+      </p:sp>
+      <p:sp>
+        <p:nvSpPr>
+          <p:cNvPr id="3" name="Subtitle 2"/>
+          <p:cNvSpPr>
+            <a:spLocks noGrp="1"/>
+          </p:cNvSpPr>
+          <p:nvPr>
+            <p:ph type="subTitle" idx="1"/>
+          </p:nvPr>
+        </p:nvSpPr>
+        <p:spPr/>
+        <p:txBody>
           <a:bodyPr/>
           <a:lstStyle/>
           <a:p>
-            <a:endParaRPr lang="en-US"/>
-          </a:p>
-        </p:txBody>
-      </p:sp>
-      <p:sp>
-        <p:nvSpPr>
-          <p:cNvPr id="3" name="Subtitle 2"/>
-          <p:cNvSpPr>
-            <a:spLocks noGrp="1"/>
-          </p:cNvSpPr>
-          <p:nvPr>
-            <p:ph type="subTitle" idx="1"/>
-          </p:nvPr>
-        </p:nvSpPr>
-        <p:spPr/>
-        <p:txBody>
-          <a:bodyPr/>
-          <a:lstStyle/>
-          <a:p>
-            <a:endParaRPr lang="en-US"/>
+            <a:r>
+              <a:rPr lang="en-US" dirty="0" smtClean="0"/>
+              <a:t>Joshu</a:t>
+            </a:r>
+            <a:r>
+              <a:rPr lang="en-US" dirty="0" smtClean="0"/>
+              <a:t>a Pan</a:t>
+            </a:r>
+          </a:p>
+          <a:p>
+            <a:r>
+              <a:rPr lang="en-US" dirty="0" smtClean="0"/>
+              <a:t>July 2025</a:t>
+            </a:r>
+            <a:endParaRPr lang="en-US" dirty="0"/>
           </a:p>
         </p:txBody>
       </p:sp>
@@ -5804,7 +5840,7 @@
                 <a:ea typeface="+mn-ea"/>
                 <a:cs typeface="+mn-cs"/>
               </a:rPr>
-              <a:t> order to restore thermal wind balance, the secondary circulation induces opposing adiabatic temperature tendencies.</a:t>
+              <a:t> order to maintain thermal wind balance, the secondary circulation induces opposing adiabatic temperature tendencies.</a:t>
             </a:r>
           </a:p>
           <a:p>
@@ -5839,7 +5875,7 @@
             </a:r>
             <a:r>
               <a:rPr lang="en-US" dirty="0" smtClean="0"/>
-              <a:t> force to restore thermal wind balance (see later slides…)</a:t>
+              <a:t> force, acting to maintain thermal wind balance (see later slides…)</a:t>
             </a:r>
             <a:endParaRPr kumimoji="0" lang="en-US" sz="1800" b="0" i="0" u="none" strike="noStrike" kern="1200" cap="none" spc="0" normalizeH="0" baseline="0" noProof="0" dirty="0" smtClean="0">
               <a:ln>

</xml_diff>

<commit_message>
qg diag slide deck complete
</commit_message>
<xml_diff>
--- a/baroc_wv_diag_draft.pptx
+++ b/baroc_wv_diag_draft.pptx
@@ -4,6 +4,9 @@
   <p:sldMasterIdLst>
     <p:sldMasterId id="2147483648" r:id="rId1"/>
   </p:sldMasterIdLst>
+  <p:notesMasterIdLst>
+    <p:notesMasterId r:id="rId14"/>
+  </p:notesMasterIdLst>
   <p:sldIdLst>
     <p:sldId id="256" r:id="rId2"/>
     <p:sldId id="260" r:id="rId3"/>
@@ -118,6 +121,353 @@
 </p:presentation>
 </file>
 
+<file path=ppt/notesMasters/notesMaster1.xml><?xml version="1.0" encoding="utf-8"?>
+<p:notesMaster xmlns:a="http://schemas.openxmlformats.org/drawingml/2006/main" xmlns:r="http://schemas.openxmlformats.org/officeDocument/2006/relationships" xmlns:p="http://schemas.openxmlformats.org/presentationml/2006/main">
+  <p:cSld>
+    <p:bg>
+      <p:bgRef idx="1001">
+        <a:schemeClr val="bg1"/>
+      </p:bgRef>
+    </p:bg>
+    <p:spTree>
+      <p:nvGrpSpPr>
+        <p:cNvPr id="1" name=""/>
+        <p:cNvGrpSpPr/>
+        <p:nvPr/>
+      </p:nvGrpSpPr>
+      <p:grpSpPr>
+        <a:xfrm>
+          <a:off x="0" y="0"/>
+          <a:ext cx="0" cy="0"/>
+          <a:chOff x="0" y="0"/>
+          <a:chExt cx="0" cy="0"/>
+        </a:xfrm>
+      </p:grpSpPr>
+      <p:sp>
+        <p:nvSpPr>
+          <p:cNvPr id="2" name="Header Placeholder 1"/>
+          <p:cNvSpPr>
+            <a:spLocks noGrp="1"/>
+          </p:cNvSpPr>
+          <p:nvPr>
+            <p:ph type="hdr" sz="quarter"/>
+          </p:nvPr>
+        </p:nvSpPr>
+        <p:spPr>
+          <a:xfrm>
+            <a:off x="0" y="0"/>
+            <a:ext cx="2971800" cy="457200"/>
+          </a:xfrm>
+          <a:prstGeom prst="rect">
+            <a:avLst/>
+          </a:prstGeom>
+        </p:spPr>
+        <p:txBody>
+          <a:bodyPr vert="horz" lIns="91440" tIns="45720" rIns="91440" bIns="45720" rtlCol="0"/>
+          <a:lstStyle>
+            <a:lvl1pPr algn="l">
+              <a:defRPr sz="1200"/>
+            </a:lvl1pPr>
+          </a:lstStyle>
+          <a:p>
+            <a:endParaRPr lang="en-US"/>
+          </a:p>
+        </p:txBody>
+      </p:sp>
+      <p:sp>
+        <p:nvSpPr>
+          <p:cNvPr id="3" name="Date Placeholder 2"/>
+          <p:cNvSpPr>
+            <a:spLocks noGrp="1"/>
+          </p:cNvSpPr>
+          <p:nvPr>
+            <p:ph type="dt" idx="1"/>
+          </p:nvPr>
+        </p:nvSpPr>
+        <p:spPr>
+          <a:xfrm>
+            <a:off x="3884613" y="0"/>
+            <a:ext cx="2971800" cy="457200"/>
+          </a:xfrm>
+          <a:prstGeom prst="rect">
+            <a:avLst/>
+          </a:prstGeom>
+        </p:spPr>
+        <p:txBody>
+          <a:bodyPr vert="horz" lIns="91440" tIns="45720" rIns="91440" bIns="45720" rtlCol="0"/>
+          <a:lstStyle>
+            <a:lvl1pPr algn="r">
+              <a:defRPr sz="1200"/>
+            </a:lvl1pPr>
+          </a:lstStyle>
+          <a:p>
+            <a:fld id="{955F2DEB-6309-46DF-8C98-E33A8B8A9E96}" type="datetimeFigureOut">
+              <a:rPr lang="en-US" smtClean="0"/>
+              <a:t>7/7/2025</a:t>
+            </a:fld>
+            <a:endParaRPr lang="en-US"/>
+          </a:p>
+        </p:txBody>
+      </p:sp>
+      <p:sp>
+        <p:nvSpPr>
+          <p:cNvPr id="4" name="Slide Image Placeholder 3"/>
+          <p:cNvSpPr>
+            <a:spLocks noGrp="1" noRot="1" noChangeAspect="1"/>
+          </p:cNvSpPr>
+          <p:nvPr>
+            <p:ph type="sldImg" idx="2"/>
+          </p:nvPr>
+        </p:nvSpPr>
+        <p:spPr>
+          <a:xfrm>
+            <a:off x="1143000" y="685800"/>
+            <a:ext cx="4572000" cy="3429000"/>
+          </a:xfrm>
+          <a:prstGeom prst="rect">
+            <a:avLst/>
+          </a:prstGeom>
+          <a:noFill/>
+          <a:ln w="12700">
+            <a:solidFill>
+              <a:prstClr val="black"/>
+            </a:solidFill>
+          </a:ln>
+        </p:spPr>
+        <p:txBody>
+          <a:bodyPr vert="horz" lIns="91440" tIns="45720" rIns="91440" bIns="45720" rtlCol="0" anchor="ctr"/>
+          <a:lstStyle/>
+          <a:p>
+            <a:endParaRPr lang="en-US"/>
+          </a:p>
+        </p:txBody>
+      </p:sp>
+      <p:sp>
+        <p:nvSpPr>
+          <p:cNvPr id="5" name="Notes Placeholder 4"/>
+          <p:cNvSpPr>
+            <a:spLocks noGrp="1"/>
+          </p:cNvSpPr>
+          <p:nvPr>
+            <p:ph type="body" sz="quarter" idx="3"/>
+          </p:nvPr>
+        </p:nvSpPr>
+        <p:spPr>
+          <a:xfrm>
+            <a:off x="685800" y="4343400"/>
+            <a:ext cx="5486400" cy="4114800"/>
+          </a:xfrm>
+          <a:prstGeom prst="rect">
+            <a:avLst/>
+          </a:prstGeom>
+        </p:spPr>
+        <p:txBody>
+          <a:bodyPr vert="horz" lIns="91440" tIns="45720" rIns="91440" bIns="45720" rtlCol="0">
+            <a:normAutofit/>
+          </a:bodyPr>
+          <a:lstStyle/>
+          <a:p>
+            <a:pPr lvl="0"/>
+            <a:r>
+              <a:rPr lang="en-US" smtClean="0"/>
+              <a:t>Click to edit Master text styles</a:t>
+            </a:r>
+          </a:p>
+          <a:p>
+            <a:pPr lvl="1"/>
+            <a:r>
+              <a:rPr lang="en-US" smtClean="0"/>
+              <a:t>Second level</a:t>
+            </a:r>
+          </a:p>
+          <a:p>
+            <a:pPr lvl="2"/>
+            <a:r>
+              <a:rPr lang="en-US" smtClean="0"/>
+              <a:t>Third level</a:t>
+            </a:r>
+          </a:p>
+          <a:p>
+            <a:pPr lvl="3"/>
+            <a:r>
+              <a:rPr lang="en-US" smtClean="0"/>
+              <a:t>Fourth level</a:t>
+            </a:r>
+          </a:p>
+          <a:p>
+            <a:pPr lvl="4"/>
+            <a:r>
+              <a:rPr lang="en-US" smtClean="0"/>
+              <a:t>Fifth level</a:t>
+            </a:r>
+            <a:endParaRPr lang="en-US"/>
+          </a:p>
+        </p:txBody>
+      </p:sp>
+      <p:sp>
+        <p:nvSpPr>
+          <p:cNvPr id="6" name="Footer Placeholder 5"/>
+          <p:cNvSpPr>
+            <a:spLocks noGrp="1"/>
+          </p:cNvSpPr>
+          <p:nvPr>
+            <p:ph type="ftr" sz="quarter" idx="4"/>
+          </p:nvPr>
+        </p:nvSpPr>
+        <p:spPr>
+          <a:xfrm>
+            <a:off x="0" y="8685213"/>
+            <a:ext cx="2971800" cy="457200"/>
+          </a:xfrm>
+          <a:prstGeom prst="rect">
+            <a:avLst/>
+          </a:prstGeom>
+        </p:spPr>
+        <p:txBody>
+          <a:bodyPr vert="horz" lIns="91440" tIns="45720" rIns="91440" bIns="45720" rtlCol="0" anchor="b"/>
+          <a:lstStyle>
+            <a:lvl1pPr algn="l">
+              <a:defRPr sz="1200"/>
+            </a:lvl1pPr>
+          </a:lstStyle>
+          <a:p>
+            <a:endParaRPr lang="en-US"/>
+          </a:p>
+        </p:txBody>
+      </p:sp>
+      <p:sp>
+        <p:nvSpPr>
+          <p:cNvPr id="7" name="Slide Number Placeholder 6"/>
+          <p:cNvSpPr>
+            <a:spLocks noGrp="1"/>
+          </p:cNvSpPr>
+          <p:nvPr>
+            <p:ph type="sldNum" sz="quarter" idx="5"/>
+          </p:nvPr>
+        </p:nvSpPr>
+        <p:spPr>
+          <a:xfrm>
+            <a:off x="3884613" y="8685213"/>
+            <a:ext cx="2971800" cy="457200"/>
+          </a:xfrm>
+          <a:prstGeom prst="rect">
+            <a:avLst/>
+          </a:prstGeom>
+        </p:spPr>
+        <p:txBody>
+          <a:bodyPr vert="horz" lIns="91440" tIns="45720" rIns="91440" bIns="45720" rtlCol="0" anchor="b"/>
+          <a:lstStyle>
+            <a:lvl1pPr algn="r">
+              <a:defRPr sz="1200"/>
+            </a:lvl1pPr>
+          </a:lstStyle>
+          <a:p>
+            <a:fld id="{69055FDF-1ACF-4465-AF68-F2243BD5BF1A}" type="slidenum">
+              <a:rPr lang="en-US" smtClean="0"/>
+              <a:t>‹#›</a:t>
+            </a:fld>
+            <a:endParaRPr lang="en-US"/>
+          </a:p>
+        </p:txBody>
+      </p:sp>
+    </p:spTree>
+  </p:cSld>
+  <p:clrMap bg1="lt1" tx1="dk1" bg2="lt2" tx2="dk2" accent1="accent1" accent2="accent2" accent3="accent3" accent4="accent4" accent5="accent5" accent6="accent6" hlink="hlink" folHlink="folHlink"/>
+  <p:notesStyle>
+    <a:lvl1pPr marL="0" algn="l" defTabSz="914400" rtl="0" eaLnBrk="1" latinLnBrk="0" hangingPunct="1">
+      <a:defRPr sz="1200" kern="1200">
+        <a:solidFill>
+          <a:schemeClr val="tx1"/>
+        </a:solidFill>
+        <a:latin typeface="+mn-lt"/>
+        <a:ea typeface="+mn-ea"/>
+        <a:cs typeface="+mn-cs"/>
+      </a:defRPr>
+    </a:lvl1pPr>
+    <a:lvl2pPr marL="457200" algn="l" defTabSz="914400" rtl="0" eaLnBrk="1" latinLnBrk="0" hangingPunct="1">
+      <a:defRPr sz="1200" kern="1200">
+        <a:solidFill>
+          <a:schemeClr val="tx1"/>
+        </a:solidFill>
+        <a:latin typeface="+mn-lt"/>
+        <a:ea typeface="+mn-ea"/>
+        <a:cs typeface="+mn-cs"/>
+      </a:defRPr>
+    </a:lvl2pPr>
+    <a:lvl3pPr marL="914400" algn="l" defTabSz="914400" rtl="0" eaLnBrk="1" latinLnBrk="0" hangingPunct="1">
+      <a:defRPr sz="1200" kern="1200">
+        <a:solidFill>
+          <a:schemeClr val="tx1"/>
+        </a:solidFill>
+        <a:latin typeface="+mn-lt"/>
+        <a:ea typeface="+mn-ea"/>
+        <a:cs typeface="+mn-cs"/>
+      </a:defRPr>
+    </a:lvl3pPr>
+    <a:lvl4pPr marL="1371600" algn="l" defTabSz="914400" rtl="0" eaLnBrk="1" latinLnBrk="0" hangingPunct="1">
+      <a:defRPr sz="1200" kern="1200">
+        <a:solidFill>
+          <a:schemeClr val="tx1"/>
+        </a:solidFill>
+        <a:latin typeface="+mn-lt"/>
+        <a:ea typeface="+mn-ea"/>
+        <a:cs typeface="+mn-cs"/>
+      </a:defRPr>
+    </a:lvl4pPr>
+    <a:lvl5pPr marL="1828800" algn="l" defTabSz="914400" rtl="0" eaLnBrk="1" latinLnBrk="0" hangingPunct="1">
+      <a:defRPr sz="1200" kern="1200">
+        <a:solidFill>
+          <a:schemeClr val="tx1"/>
+        </a:solidFill>
+        <a:latin typeface="+mn-lt"/>
+        <a:ea typeface="+mn-ea"/>
+        <a:cs typeface="+mn-cs"/>
+      </a:defRPr>
+    </a:lvl5pPr>
+    <a:lvl6pPr marL="2286000" algn="l" defTabSz="914400" rtl="0" eaLnBrk="1" latinLnBrk="0" hangingPunct="1">
+      <a:defRPr sz="1200" kern="1200">
+        <a:solidFill>
+          <a:schemeClr val="tx1"/>
+        </a:solidFill>
+        <a:latin typeface="+mn-lt"/>
+        <a:ea typeface="+mn-ea"/>
+        <a:cs typeface="+mn-cs"/>
+      </a:defRPr>
+    </a:lvl6pPr>
+    <a:lvl7pPr marL="2743200" algn="l" defTabSz="914400" rtl="0" eaLnBrk="1" latinLnBrk="0" hangingPunct="1">
+      <a:defRPr sz="1200" kern="1200">
+        <a:solidFill>
+          <a:schemeClr val="tx1"/>
+        </a:solidFill>
+        <a:latin typeface="+mn-lt"/>
+        <a:ea typeface="+mn-ea"/>
+        <a:cs typeface="+mn-cs"/>
+      </a:defRPr>
+    </a:lvl7pPr>
+    <a:lvl8pPr marL="3200400" algn="l" defTabSz="914400" rtl="0" eaLnBrk="1" latinLnBrk="0" hangingPunct="1">
+      <a:defRPr sz="1200" kern="1200">
+        <a:solidFill>
+          <a:schemeClr val="tx1"/>
+        </a:solidFill>
+        <a:latin typeface="+mn-lt"/>
+        <a:ea typeface="+mn-ea"/>
+        <a:cs typeface="+mn-cs"/>
+      </a:defRPr>
+    </a:lvl8pPr>
+    <a:lvl9pPr marL="3657600" algn="l" defTabSz="914400" rtl="0" eaLnBrk="1" latinLnBrk="0" hangingPunct="1">
+      <a:defRPr sz="1200" kern="1200">
+        <a:solidFill>
+          <a:schemeClr val="tx1"/>
+        </a:solidFill>
+        <a:latin typeface="+mn-lt"/>
+        <a:ea typeface="+mn-ea"/>
+        <a:cs typeface="+mn-cs"/>
+      </a:defRPr>
+    </a:lvl9pPr>
+  </p:notesStyle>
+</p:notesMaster>
+</file>
+
 <file path=ppt/slideLayouts/slideLayout1.xml><?xml version="1.0" encoding="utf-8"?>
 <p:sldLayout xmlns:a="http://schemas.openxmlformats.org/drawingml/2006/main" xmlns:r="http://schemas.openxmlformats.org/officeDocument/2006/relationships" xmlns:p="http://schemas.openxmlformats.org/presentationml/2006/main" type="title" preserve="1">
   <p:cSld name="Title Slide">
@@ -297,10 +647,9 @@
           <a:bodyPr/>
           <a:lstStyle/>
           <a:p>
-            <a:fld id="{DA584CC5-6B92-4E90-A501-052394C1965A}" type="datetimeFigureOut">
-              <a:rPr lang="en-US" smtClean="0"/>
-              <a:pPr/>
-              <a:t>7/3/2025</a:t>
+            <a:fld id="{B87B7722-E9DF-4F1B-BDB2-13F57123B95A}" type="datetime1">
+              <a:rPr lang="en-US" smtClean="0"/>
+              <a:t>7/7/2025</a:t>
             </a:fld>
             <a:endParaRPr lang="en-US"/>
           </a:p>
@@ -316,11 +665,20 @@
             <p:ph type="ftr" sz="quarter" idx="11"/>
           </p:nvPr>
         </p:nvSpPr>
-        <p:spPr/>
+        <p:spPr>
+          <a:xfrm>
+            <a:off x="6248400" y="6340475"/>
+            <a:ext cx="2895600" cy="365125"/>
+          </a:xfrm>
+        </p:spPr>
         <p:txBody>
           <a:bodyPr/>
           <a:lstStyle/>
           <a:p>
+            <a:r>
+              <a:rPr lang="en-US" smtClean="0"/>
+              <a:t>Joshua Pan</a:t>
+            </a:r>
             <a:endParaRPr lang="en-US"/>
           </a:p>
         </p:txBody>
@@ -464,10 +822,9 @@
           <a:bodyPr/>
           <a:lstStyle/>
           <a:p>
-            <a:fld id="{DA584CC5-6B92-4E90-A501-052394C1965A}" type="datetimeFigureOut">
-              <a:rPr lang="en-US" smtClean="0"/>
-              <a:pPr/>
-              <a:t>7/3/2025</a:t>
+            <a:fld id="{F54B2567-1FA5-4377-A825-F88C557E4DCF}" type="datetime1">
+              <a:rPr lang="en-US" smtClean="0"/>
+              <a:t>7/7/2025</a:t>
             </a:fld>
             <a:endParaRPr lang="en-US"/>
           </a:p>
@@ -488,6 +845,10 @@
           <a:bodyPr/>
           <a:lstStyle/>
           <a:p>
+            <a:r>
+              <a:rPr lang="en-US" smtClean="0"/>
+              <a:t>Joshua Pan</a:t>
+            </a:r>
             <a:endParaRPr lang="en-US"/>
           </a:p>
         </p:txBody>
@@ -641,10 +1002,9 @@
           <a:bodyPr/>
           <a:lstStyle/>
           <a:p>
-            <a:fld id="{DA584CC5-6B92-4E90-A501-052394C1965A}" type="datetimeFigureOut">
-              <a:rPr lang="en-US" smtClean="0"/>
-              <a:pPr/>
-              <a:t>7/3/2025</a:t>
+            <a:fld id="{709E6C73-A1E1-42A3-BBAF-9D2E39EC5261}" type="datetime1">
+              <a:rPr lang="en-US" smtClean="0"/>
+              <a:t>7/7/2025</a:t>
             </a:fld>
             <a:endParaRPr lang="en-US"/>
           </a:p>
@@ -665,6 +1025,10 @@
           <a:bodyPr/>
           <a:lstStyle/>
           <a:p>
+            <a:r>
+              <a:rPr lang="en-US" smtClean="0"/>
+              <a:t>Joshua Pan</a:t>
+            </a:r>
             <a:endParaRPr lang="en-US"/>
           </a:p>
         </p:txBody>
@@ -808,10 +1172,9 @@
           <a:bodyPr/>
           <a:lstStyle/>
           <a:p>
-            <a:fld id="{DA584CC5-6B92-4E90-A501-052394C1965A}" type="datetimeFigureOut">
-              <a:rPr lang="en-US" smtClean="0"/>
-              <a:pPr/>
-              <a:t>7/3/2025</a:t>
+            <a:fld id="{376B1114-5C4B-48CC-996F-D30EA7F0F505}" type="datetime1">
+              <a:rPr lang="en-US" smtClean="0"/>
+              <a:t>7/7/2025</a:t>
             </a:fld>
             <a:endParaRPr lang="en-US"/>
           </a:p>
@@ -827,11 +1190,20 @@
             <p:ph type="ftr" sz="quarter" idx="11"/>
           </p:nvPr>
         </p:nvSpPr>
-        <p:spPr/>
+        <p:spPr>
+          <a:xfrm>
+            <a:off x="6248400" y="6356350"/>
+            <a:ext cx="2895600" cy="365125"/>
+          </a:xfrm>
+        </p:spPr>
         <p:txBody>
           <a:bodyPr/>
           <a:lstStyle/>
           <a:p>
+            <a:r>
+              <a:rPr lang="en-US" smtClean="0"/>
+              <a:t>Joshua Pan</a:t>
+            </a:r>
             <a:endParaRPr lang="en-US"/>
           </a:p>
         </p:txBody>
@@ -1051,10 +1423,9 @@
           <a:bodyPr/>
           <a:lstStyle/>
           <a:p>
-            <a:fld id="{DA584CC5-6B92-4E90-A501-052394C1965A}" type="datetimeFigureOut">
-              <a:rPr lang="en-US" smtClean="0"/>
-              <a:pPr/>
-              <a:t>7/3/2025</a:t>
+            <a:fld id="{2328092D-7695-4313-AFE3-38E5AC304151}" type="datetime1">
+              <a:rPr lang="en-US" smtClean="0"/>
+              <a:t>7/7/2025</a:t>
             </a:fld>
             <a:endParaRPr lang="en-US"/>
           </a:p>
@@ -1075,6 +1446,10 @@
           <a:bodyPr/>
           <a:lstStyle/>
           <a:p>
+            <a:r>
+              <a:rPr lang="en-US" smtClean="0"/>
+              <a:t>Joshua Pan</a:t>
+            </a:r>
             <a:endParaRPr lang="en-US"/>
           </a:p>
         </p:txBody>
@@ -1336,10 +1711,9 @@
           <a:bodyPr/>
           <a:lstStyle/>
           <a:p>
-            <a:fld id="{DA584CC5-6B92-4E90-A501-052394C1965A}" type="datetimeFigureOut">
-              <a:rPr lang="en-US" smtClean="0"/>
-              <a:pPr/>
-              <a:t>7/3/2025</a:t>
+            <a:fld id="{C448A315-412A-46F9-95C0-747AA765A127}" type="datetime1">
+              <a:rPr lang="en-US" smtClean="0"/>
+              <a:t>7/7/2025</a:t>
             </a:fld>
             <a:endParaRPr lang="en-US"/>
           </a:p>
@@ -1360,6 +1734,10 @@
           <a:bodyPr/>
           <a:lstStyle/>
           <a:p>
+            <a:r>
+              <a:rPr lang="en-US" smtClean="0"/>
+              <a:t>Joshua Pan</a:t>
+            </a:r>
             <a:endParaRPr lang="en-US"/>
           </a:p>
         </p:txBody>
@@ -1755,10 +2133,9 @@
           <a:bodyPr/>
           <a:lstStyle/>
           <a:p>
-            <a:fld id="{DA584CC5-6B92-4E90-A501-052394C1965A}" type="datetimeFigureOut">
-              <a:rPr lang="en-US" smtClean="0"/>
-              <a:pPr/>
-              <a:t>7/3/2025</a:t>
+            <a:fld id="{E55A3CC7-2536-4415-BDFF-8BFFCCA3B16B}" type="datetime1">
+              <a:rPr lang="en-US" smtClean="0"/>
+              <a:t>7/7/2025</a:t>
             </a:fld>
             <a:endParaRPr lang="en-US"/>
           </a:p>
@@ -1779,6 +2156,10 @@
           <a:bodyPr/>
           <a:lstStyle/>
           <a:p>
+            <a:r>
+              <a:rPr lang="en-US" smtClean="0"/>
+              <a:t>Joshua Pan</a:t>
+            </a:r>
             <a:endParaRPr lang="en-US"/>
           </a:p>
         </p:txBody>
@@ -1870,10 +2251,9 @@
           <a:bodyPr/>
           <a:lstStyle/>
           <a:p>
-            <a:fld id="{DA584CC5-6B92-4E90-A501-052394C1965A}" type="datetimeFigureOut">
-              <a:rPr lang="en-US" smtClean="0"/>
-              <a:pPr/>
-              <a:t>7/3/2025</a:t>
+            <a:fld id="{8A00E020-A4AE-44FF-9C3F-A51A2E431297}" type="datetime1">
+              <a:rPr lang="en-US" smtClean="0"/>
+              <a:t>7/7/2025</a:t>
             </a:fld>
             <a:endParaRPr lang="en-US"/>
           </a:p>
@@ -1894,6 +2274,10 @@
           <a:bodyPr/>
           <a:lstStyle/>
           <a:p>
+            <a:r>
+              <a:rPr lang="en-US" smtClean="0"/>
+              <a:t>Joshua Pan</a:t>
+            </a:r>
             <a:endParaRPr lang="en-US"/>
           </a:p>
         </p:txBody>
@@ -1962,10 +2346,9 @@
           <a:bodyPr/>
           <a:lstStyle/>
           <a:p>
-            <a:fld id="{DA584CC5-6B92-4E90-A501-052394C1965A}" type="datetimeFigureOut">
-              <a:rPr lang="en-US" smtClean="0"/>
-              <a:pPr/>
-              <a:t>7/3/2025</a:t>
+            <a:fld id="{4985AC92-1B29-4245-BAC0-37FBEC872EAD}" type="datetime1">
+              <a:rPr lang="en-US" smtClean="0"/>
+              <a:t>7/7/2025</a:t>
             </a:fld>
             <a:endParaRPr lang="en-US"/>
           </a:p>
@@ -1986,6 +2369,10 @@
           <a:bodyPr/>
           <a:lstStyle/>
           <a:p>
+            <a:r>
+              <a:rPr lang="en-US" smtClean="0"/>
+              <a:t>Joshua Pan</a:t>
+            </a:r>
             <a:endParaRPr lang="en-US"/>
           </a:p>
         </p:txBody>
@@ -2236,10 +2623,9 @@
           <a:bodyPr/>
           <a:lstStyle/>
           <a:p>
-            <a:fld id="{DA584CC5-6B92-4E90-A501-052394C1965A}" type="datetimeFigureOut">
-              <a:rPr lang="en-US" smtClean="0"/>
-              <a:pPr/>
-              <a:t>7/3/2025</a:t>
+            <a:fld id="{9F4402C3-7E31-4325-924F-AF94AEE0DDC3}" type="datetime1">
+              <a:rPr lang="en-US" smtClean="0"/>
+              <a:t>7/7/2025</a:t>
             </a:fld>
             <a:endParaRPr lang="en-US"/>
           </a:p>
@@ -2260,6 +2646,10 @@
           <a:bodyPr/>
           <a:lstStyle/>
           <a:p>
+            <a:r>
+              <a:rPr lang="en-US" smtClean="0"/>
+              <a:t>Joshua Pan</a:t>
+            </a:r>
             <a:endParaRPr lang="en-US"/>
           </a:p>
         </p:txBody>
@@ -2486,10 +2876,9 @@
           <a:bodyPr/>
           <a:lstStyle/>
           <a:p>
-            <a:fld id="{DA584CC5-6B92-4E90-A501-052394C1965A}" type="datetimeFigureOut">
-              <a:rPr lang="en-US" smtClean="0"/>
-              <a:pPr/>
-              <a:t>7/3/2025</a:t>
+            <a:fld id="{D764FC5A-8D66-4DCE-97DC-B52038A0A479}" type="datetime1">
+              <a:rPr lang="en-US" smtClean="0"/>
+              <a:t>7/7/2025</a:t>
             </a:fld>
             <a:endParaRPr lang="en-US"/>
           </a:p>
@@ -2510,6 +2899,10 @@
           <a:bodyPr/>
           <a:lstStyle/>
           <a:p>
+            <a:r>
+              <a:rPr lang="en-US" smtClean="0"/>
+              <a:t>Joshua Pan</a:t>
+            </a:r>
             <a:endParaRPr lang="en-US"/>
           </a:p>
         </p:txBody>
@@ -2696,10 +3089,9 @@
             </a:lvl1pPr>
           </a:lstStyle>
           <a:p>
-            <a:fld id="{DA584CC5-6B92-4E90-A501-052394C1965A}" type="datetimeFigureOut">
-              <a:rPr lang="en-US" smtClean="0"/>
-              <a:pPr/>
-              <a:t>7/3/2025</a:t>
+            <a:fld id="{F4E79B35-B697-47D4-9697-C3F9D957693D}" type="datetime1">
+              <a:rPr lang="en-US" smtClean="0"/>
+              <a:t>7/7/2025</a:t>
             </a:fld>
             <a:endParaRPr lang="en-US"/>
           </a:p>
@@ -2738,6 +3130,10 @@
             </a:lvl1pPr>
           </a:lstStyle>
           <a:p>
+            <a:r>
+              <a:rPr lang="en-US" smtClean="0"/>
+              <a:t>Joshua Pan</a:t>
+            </a:r>
             <a:endParaRPr lang="en-US"/>
           </a:p>
         </p:txBody>
@@ -2800,6 +3196,7 @@
     <p:sldLayoutId id="2147483658" r:id="rId10"/>
     <p:sldLayoutId id="2147483659" r:id="rId11"/>
   </p:sldLayoutIdLst>
+  <p:hf hdr="0" dt="0"/>
   <p:txStyles>
     <p:titleStyle>
       <a:lvl1pPr algn="ctr" defTabSz="914400" rtl="0" eaLnBrk="1" latinLnBrk="0" hangingPunct="1">
@@ -3144,6 +3541,53 @@
           </a:p>
         </p:txBody>
       </p:sp>
+      <p:sp>
+        <p:nvSpPr>
+          <p:cNvPr id="4" name="Slide Number Placeholder 3"/>
+          <p:cNvSpPr>
+            <a:spLocks noGrp="1"/>
+          </p:cNvSpPr>
+          <p:nvPr>
+            <p:ph type="sldNum" sz="quarter" idx="12"/>
+          </p:nvPr>
+        </p:nvSpPr>
+        <p:spPr/>
+        <p:txBody>
+          <a:bodyPr/>
+          <a:lstStyle/>
+          <a:p>
+            <a:fld id="{2FBD9FBA-E540-4D8F-97D2-506A094E5AAE}" type="slidenum">
+              <a:rPr lang="en-US" smtClean="0"/>
+              <a:pPr/>
+              <a:t>1</a:t>
+            </a:fld>
+            <a:endParaRPr lang="en-US"/>
+          </a:p>
+        </p:txBody>
+      </p:sp>
+      <p:sp>
+        <p:nvSpPr>
+          <p:cNvPr id="5" name="Footer Placeholder 4"/>
+          <p:cNvSpPr>
+            <a:spLocks noGrp="1"/>
+          </p:cNvSpPr>
+          <p:nvPr>
+            <p:ph type="ftr" sz="quarter" idx="11"/>
+          </p:nvPr>
+        </p:nvSpPr>
+        <p:spPr/>
+        <p:txBody>
+          <a:bodyPr/>
+          <a:lstStyle/>
+          <a:p>
+            <a:r>
+              <a:rPr lang="en-US" dirty="0" smtClean="0"/>
+              <a:t>Joshua Pan</a:t>
+            </a:r>
+            <a:endParaRPr lang="en-US" dirty="0"/>
+          </a:p>
+        </p:txBody>
+      </p:sp>
     </p:spTree>
   </p:cSld>
   <p:clrMapOvr>
@@ -4100,6 +4544,53 @@
           </a:p>
         </p:txBody>
       </p:sp>
+      <p:sp>
+        <p:nvSpPr>
+          <p:cNvPr id="17" name="Slide Number Placeholder 16"/>
+          <p:cNvSpPr>
+            <a:spLocks noGrp="1"/>
+          </p:cNvSpPr>
+          <p:nvPr>
+            <p:ph type="sldNum" sz="quarter" idx="12"/>
+          </p:nvPr>
+        </p:nvSpPr>
+        <p:spPr/>
+        <p:txBody>
+          <a:bodyPr/>
+          <a:lstStyle/>
+          <a:p>
+            <a:fld id="{2FBD9FBA-E540-4D8F-97D2-506A094E5AAE}" type="slidenum">
+              <a:rPr lang="en-US" smtClean="0"/>
+              <a:pPr/>
+              <a:t>10</a:t>
+            </a:fld>
+            <a:endParaRPr lang="en-US"/>
+          </a:p>
+        </p:txBody>
+      </p:sp>
+      <p:sp>
+        <p:nvSpPr>
+          <p:cNvPr id="18" name="Footer Placeholder 17"/>
+          <p:cNvSpPr>
+            <a:spLocks noGrp="1"/>
+          </p:cNvSpPr>
+          <p:nvPr>
+            <p:ph type="ftr" sz="quarter" idx="11"/>
+          </p:nvPr>
+        </p:nvSpPr>
+        <p:spPr/>
+        <p:txBody>
+          <a:bodyPr/>
+          <a:lstStyle/>
+          <a:p>
+            <a:r>
+              <a:rPr lang="en-US" smtClean="0"/>
+              <a:t>Joshua Pan</a:t>
+            </a:r>
+            <a:endParaRPr lang="en-US"/>
+          </a:p>
+        </p:txBody>
+      </p:sp>
     </p:spTree>
   </p:cSld>
   <p:clrMapOvr>
@@ -4878,6 +5369,53 @@
           </a:p>
         </p:txBody>
       </p:sp>
+      <p:sp>
+        <p:nvSpPr>
+          <p:cNvPr id="19" name="Slide Number Placeholder 18"/>
+          <p:cNvSpPr>
+            <a:spLocks noGrp="1"/>
+          </p:cNvSpPr>
+          <p:nvPr>
+            <p:ph type="sldNum" sz="quarter" idx="12"/>
+          </p:nvPr>
+        </p:nvSpPr>
+        <p:spPr/>
+        <p:txBody>
+          <a:bodyPr/>
+          <a:lstStyle/>
+          <a:p>
+            <a:fld id="{2FBD9FBA-E540-4D8F-97D2-506A094E5AAE}" type="slidenum">
+              <a:rPr lang="en-US" smtClean="0"/>
+              <a:pPr/>
+              <a:t>11</a:t>
+            </a:fld>
+            <a:endParaRPr lang="en-US"/>
+          </a:p>
+        </p:txBody>
+      </p:sp>
+      <p:sp>
+        <p:nvSpPr>
+          <p:cNvPr id="20" name="Footer Placeholder 19"/>
+          <p:cNvSpPr>
+            <a:spLocks noGrp="1"/>
+          </p:cNvSpPr>
+          <p:nvPr>
+            <p:ph type="ftr" sz="quarter" idx="11"/>
+          </p:nvPr>
+        </p:nvSpPr>
+        <p:spPr/>
+        <p:txBody>
+          <a:bodyPr/>
+          <a:lstStyle/>
+          <a:p>
+            <a:r>
+              <a:rPr lang="en-US" smtClean="0"/>
+              <a:t>Joshua Pan</a:t>
+            </a:r>
+            <a:endParaRPr lang="en-US"/>
+          </a:p>
+        </p:txBody>
+      </p:sp>
     </p:spTree>
   </p:cSld>
   <p:clrMapOvr>
@@ -4910,47 +5448,9 @@
           <a:chExt cx="0" cy="0"/>
         </a:xfrm>
       </p:grpSpPr>
-      <p:sp>
-        <p:nvSpPr>
-          <p:cNvPr id="2" name="Title 1"/>
-          <p:cNvSpPr>
-            <a:spLocks noGrp="1"/>
-          </p:cNvSpPr>
-          <p:nvPr>
-            <p:ph type="title"/>
-          </p:nvPr>
-        </p:nvSpPr>
-        <p:spPr/>
-        <p:txBody>
-          <a:bodyPr/>
-          <a:lstStyle/>
-          <a:p>
-            <a:endParaRPr lang="en-US"/>
-          </a:p>
-        </p:txBody>
-      </p:sp>
-      <p:sp>
-        <p:nvSpPr>
-          <p:cNvPr id="3" name="Content Placeholder 2"/>
-          <p:cNvSpPr>
-            <a:spLocks noGrp="1"/>
-          </p:cNvSpPr>
-          <p:nvPr>
-            <p:ph idx="1"/>
-          </p:nvPr>
-        </p:nvSpPr>
-        <p:spPr/>
-        <p:txBody>
-          <a:bodyPr/>
-          <a:lstStyle/>
-          <a:p>
-            <a:endParaRPr lang="en-US"/>
-          </a:p>
-        </p:txBody>
-      </p:sp>
       <p:pic>
         <p:nvPicPr>
-          <p:cNvPr id="7171" name="Picture 3" descr="C:\Users\Joshua Pan\Desktop\PSUYr2_scratch\qg_baroc_wv\yp_QG_TA.png"/>
+          <p:cNvPr id="23554" name="Picture 2" descr="C:\Users\Joshua Pan\Desktop\PSUYr2_scratch\qg_baroc_wv\yp_QG.png"/>
           <p:cNvPicPr>
             <a:picLocks noChangeAspect="1" noChangeArrowheads="1"/>
           </p:cNvPicPr>
@@ -4958,15 +5458,15 @@
         </p:nvPicPr>
         <p:blipFill>
           <a:blip r:embed="rId2" cstate="print"/>
-          <a:srcRect b="4428"/>
+          <a:srcRect/>
           <a:stretch>
             <a:fillRect/>
           </a:stretch>
         </p:blipFill>
         <p:spPr bwMode="auto">
           <a:xfrm>
-            <a:off x="0" y="152400"/>
-            <a:ext cx="4572000" cy="3124200"/>
+            <a:off x="-76200" y="0"/>
+            <a:ext cx="4800600" cy="3200400"/>
           </a:xfrm>
           <a:prstGeom prst="rect">
             <a:avLst/>
@@ -4976,7 +5476,7 @@
       </p:pic>
       <p:pic>
         <p:nvPicPr>
-          <p:cNvPr id="7173" name="Picture 5" descr="C:\Users\Joshua Pan\Desktop\PSUYr2_scratch\qg_baroc_wv\yp_QG_VA.png"/>
+          <p:cNvPr id="23556" name="Picture 4" descr="https://sites.ecmwf.int/era/40-atlas/images/full/D27_XS_DJF.gif"/>
           <p:cNvPicPr>
             <a:picLocks noChangeAspect="1" noChangeArrowheads="1"/>
           </p:cNvPicPr>
@@ -4984,15 +5484,15 @@
         </p:nvPicPr>
         <p:blipFill>
           <a:blip r:embed="rId3" cstate="print"/>
-          <a:srcRect b="4428"/>
+          <a:srcRect r="46000"/>
           <a:stretch>
             <a:fillRect/>
           </a:stretch>
         </p:blipFill>
         <p:spPr bwMode="auto">
-          <a:xfrm>
-            <a:off x="4572000" y="152400"/>
-            <a:ext cx="4572000" cy="3124200"/>
+          <a:xfrm flipH="1">
+            <a:off x="4800599" y="0"/>
+            <a:ext cx="3838325" cy="3156073"/>
           </a:xfrm>
           <a:prstGeom prst="rect">
             <a:avLst/>
@@ -5002,23 +5502,23 @@
       </p:pic>
       <p:pic>
         <p:nvPicPr>
-          <p:cNvPr id="7175" name="Picture 7" descr="C:\Users\Joshua Pan\Desktop\PSUYr2_scratch\qg_baroc_wv\yp_QG.png"/>
+          <p:cNvPr id="9" name="Picture 4" descr="https://sites.ecmwf.int/era/40-atlas/images/full/D27_XS_DJF.gif"/>
           <p:cNvPicPr>
             <a:picLocks noChangeAspect="1" noChangeArrowheads="1"/>
           </p:cNvPicPr>
           <p:nvPr/>
         </p:nvPicPr>
         <p:blipFill>
-          <a:blip r:embed="rId4" cstate="print"/>
-          <a:srcRect/>
+          <a:blip r:embed="rId3" cstate="print"/>
+          <a:srcRect l="91000"/>
           <a:stretch>
             <a:fillRect/>
           </a:stretch>
         </p:blipFill>
         <p:spPr bwMode="auto">
           <a:xfrm>
-            <a:off x="2133600" y="3302000"/>
-            <a:ext cx="5334000" cy="3556000"/>
+            <a:off x="8555145" y="1"/>
+            <a:ext cx="588854" cy="3124199"/>
           </a:xfrm>
           <a:prstGeom prst="rect">
             <a:avLst/>
@@ -5026,6 +5526,353 @@
           <a:noFill/>
         </p:spPr>
       </p:pic>
+      <p:sp>
+        <p:nvSpPr>
+          <p:cNvPr id="10" name="Content Placeholder 2"/>
+          <p:cNvSpPr txBox="1">
+            <a:spLocks/>
+          </p:cNvSpPr>
+          <p:nvPr/>
+        </p:nvSpPr>
+        <p:spPr>
+          <a:xfrm>
+            <a:off x="457200" y="3657600"/>
+            <a:ext cx="8229600" cy="3200400"/>
+          </a:xfrm>
+          <a:prstGeom prst="rect">
+            <a:avLst/>
+          </a:prstGeom>
+        </p:spPr>
+        <p:txBody>
+          <a:bodyPr vert="horz" lIns="91440" tIns="45720" rIns="91440" bIns="45720" rtlCol="0">
+            <a:normAutofit/>
+          </a:bodyPr>
+          <a:lstStyle/>
+          <a:p>
+            <a:pPr marL="342900" marR="0" lvl="0" indent="-342900" algn="l" defTabSz="914400" rtl="0" eaLnBrk="1" fontAlgn="auto" latinLnBrk="0" hangingPunct="1">
+              <a:lnSpc>
+                <a:spcPct val="100000"/>
+              </a:lnSpc>
+              <a:spcBef>
+                <a:spcPct val="20000"/>
+              </a:spcBef>
+              <a:spcAft>
+                <a:spcPts val="0"/>
+              </a:spcAft>
+              <a:buClrTx/>
+              <a:buSzTx/>
+              <a:buFont typeface="Arial" pitchFamily="34" charset="0"/>
+              <a:buNone/>
+              <a:tabLst/>
+              <a:defRPr/>
+            </a:pPr>
+            <a:r>
+              <a:rPr kumimoji="0" lang="en-US" sz="2400" b="1" i="0" u="none" strike="noStrike" kern="1200" cap="none" spc="0" normalizeH="0" baseline="0" noProof="0" dirty="0" smtClean="0">
+                <a:ln>
+                  <a:noFill/>
+                </a:ln>
+                <a:solidFill>
+                  <a:schemeClr val="tx1"/>
+                </a:solidFill>
+                <a:effectLst/>
+                <a:uLnTx/>
+                <a:uFillTx/>
+                <a:latin typeface="+mn-lt"/>
+                <a:ea typeface="+mn-ea"/>
+                <a:cs typeface="+mn-cs"/>
+              </a:rPr>
+              <a:t>The “thermally indirect” </a:t>
+            </a:r>
+            <a:r>
+              <a:rPr kumimoji="0" lang="en-US" sz="2400" b="1" i="0" u="none" strike="noStrike" kern="1200" cap="none" spc="0" normalizeH="0" baseline="0" noProof="0" dirty="0" err="1" smtClean="0">
+                <a:ln>
+                  <a:noFill/>
+                </a:ln>
+                <a:solidFill>
+                  <a:schemeClr val="tx1"/>
+                </a:solidFill>
+                <a:effectLst/>
+                <a:uLnTx/>
+                <a:uFillTx/>
+                <a:latin typeface="+mn-lt"/>
+                <a:ea typeface="+mn-ea"/>
+                <a:cs typeface="+mn-cs"/>
+              </a:rPr>
+              <a:t>Ferrel</a:t>
+            </a:r>
+            <a:r>
+              <a:rPr kumimoji="0" lang="en-US" sz="2400" b="1" i="0" u="none" strike="noStrike" kern="1200" cap="none" spc="0" normalizeH="0" baseline="0" noProof="0" dirty="0" smtClean="0">
+                <a:ln>
+                  <a:noFill/>
+                </a:ln>
+                <a:solidFill>
+                  <a:schemeClr val="tx1"/>
+                </a:solidFill>
+                <a:effectLst/>
+                <a:uLnTx/>
+                <a:uFillTx/>
+                <a:latin typeface="+mn-lt"/>
+                <a:ea typeface="+mn-ea"/>
+                <a:cs typeface="+mn-cs"/>
+              </a:rPr>
+              <a:t> cell</a:t>
+            </a:r>
+          </a:p>
+          <a:p>
+            <a:pPr marL="342900" marR="0" lvl="0" indent="-342900" algn="l" defTabSz="914400" rtl="0" eaLnBrk="1" fontAlgn="auto" latinLnBrk="0" hangingPunct="1">
+              <a:lnSpc>
+                <a:spcPct val="100000"/>
+              </a:lnSpc>
+              <a:spcBef>
+                <a:spcPct val="20000"/>
+              </a:spcBef>
+              <a:spcAft>
+                <a:spcPts val="0"/>
+              </a:spcAft>
+              <a:buClrTx/>
+              <a:buSzTx/>
+              <a:buFont typeface="Arial" pitchFamily="34" charset="0"/>
+              <a:buChar char="•"/>
+              <a:tabLst/>
+              <a:defRPr/>
+            </a:pPr>
+            <a:r>
+              <a:rPr lang="en-US" baseline="0" dirty="0" smtClean="0"/>
+              <a:t>The QG omega</a:t>
+            </a:r>
+            <a:r>
+              <a:rPr lang="en-US" dirty="0" smtClean="0"/>
+              <a:t> equation and continuity are linear equations, so the secondary circulations from the two forcing terms can be added together.</a:t>
+            </a:r>
+          </a:p>
+          <a:p>
+            <a:pPr marL="342900" marR="0" lvl="0" indent="-342900" algn="l" defTabSz="914400" rtl="0" eaLnBrk="1" fontAlgn="auto" latinLnBrk="0" hangingPunct="1">
+              <a:lnSpc>
+                <a:spcPct val="100000"/>
+              </a:lnSpc>
+              <a:spcBef>
+                <a:spcPct val="20000"/>
+              </a:spcBef>
+              <a:spcAft>
+                <a:spcPts val="0"/>
+              </a:spcAft>
+              <a:buClrTx/>
+              <a:buSzTx/>
+              <a:buFont typeface="Arial" pitchFamily="34" charset="0"/>
+              <a:buChar char="•"/>
+              <a:tabLst/>
+              <a:defRPr/>
+            </a:pPr>
+            <a:r>
+              <a:rPr lang="en-US" dirty="0" smtClean="0"/>
+              <a:t>EHF and EMF collectively drive ascent </a:t>
+            </a:r>
+            <a:r>
+              <a:rPr lang="en-US" dirty="0" err="1" smtClean="0"/>
+              <a:t>poleward</a:t>
+            </a:r>
+            <a:r>
+              <a:rPr lang="en-US" dirty="0" smtClean="0"/>
+              <a:t> of the storm track and descent </a:t>
+            </a:r>
+            <a:r>
+              <a:rPr lang="en-US" dirty="0" err="1" smtClean="0"/>
+              <a:t>equatorward</a:t>
+            </a:r>
+            <a:r>
+              <a:rPr lang="en-US" dirty="0" smtClean="0"/>
+              <a:t> of the storm track in the </a:t>
+            </a:r>
+            <a:r>
+              <a:rPr lang="en-US" dirty="0" err="1" smtClean="0"/>
+              <a:t>Eulerian</a:t>
+            </a:r>
+            <a:r>
+              <a:rPr lang="en-US" dirty="0" smtClean="0"/>
+              <a:t> mean.</a:t>
+            </a:r>
+          </a:p>
+          <a:p>
+            <a:pPr marL="342900" marR="0" lvl="0" indent="-342900" algn="l" defTabSz="914400" rtl="0" eaLnBrk="1" fontAlgn="auto" latinLnBrk="0" hangingPunct="1">
+              <a:lnSpc>
+                <a:spcPct val="100000"/>
+              </a:lnSpc>
+              <a:spcBef>
+                <a:spcPct val="20000"/>
+              </a:spcBef>
+              <a:spcAft>
+                <a:spcPts val="0"/>
+              </a:spcAft>
+              <a:buClrTx/>
+              <a:buSzTx/>
+              <a:buFont typeface="Arial" pitchFamily="34" charset="0"/>
+              <a:buChar char="•"/>
+              <a:tabLst/>
+              <a:defRPr/>
+            </a:pPr>
+            <a:r>
+              <a:rPr lang="en-US" dirty="0" smtClean="0"/>
+              <a:t>In reality, the relative positions of advection fields, zonal jets, and </a:t>
+            </a:r>
+            <a:r>
+              <a:rPr lang="en-US" dirty="0" err="1" smtClean="0"/>
+              <a:t>meridional</a:t>
+            </a:r>
+            <a:r>
+              <a:rPr lang="en-US" dirty="0" smtClean="0"/>
+              <a:t> circulations are different due to dissipation and non-linear dynamics.</a:t>
+            </a:r>
+          </a:p>
+        </p:txBody>
+      </p:sp>
+      <p:cxnSp>
+        <p:nvCxnSpPr>
+          <p:cNvPr id="12" name="Straight Arrow Connector 11"/>
+          <p:cNvCxnSpPr/>
+          <p:nvPr/>
+        </p:nvCxnSpPr>
+        <p:spPr>
+          <a:xfrm flipV="1">
+            <a:off x="7239000" y="1295400"/>
+            <a:ext cx="0" cy="533400"/>
+          </a:xfrm>
+          <a:prstGeom prst="straightConnector1">
+            <a:avLst/>
+          </a:prstGeom>
+          <a:ln w="57150">
+            <a:solidFill>
+              <a:srgbClr val="FF0000"/>
+            </a:solidFill>
+            <a:tailEnd type="arrow"/>
+          </a:ln>
+        </p:spPr>
+        <p:style>
+          <a:lnRef idx="1">
+            <a:schemeClr val="accent1"/>
+          </a:lnRef>
+          <a:fillRef idx="0">
+            <a:schemeClr val="accent1"/>
+          </a:fillRef>
+          <a:effectRef idx="0">
+            <a:schemeClr val="accent1"/>
+          </a:effectRef>
+          <a:fontRef idx="minor">
+            <a:schemeClr val="tx1"/>
+          </a:fontRef>
+        </p:style>
+      </p:cxnSp>
+      <p:cxnSp>
+        <p:nvCxnSpPr>
+          <p:cNvPr id="13" name="Straight Arrow Connector 12"/>
+          <p:cNvCxnSpPr/>
+          <p:nvPr/>
+        </p:nvCxnSpPr>
+        <p:spPr>
+          <a:xfrm>
+            <a:off x="6324600" y="1219200"/>
+            <a:ext cx="0" cy="533400"/>
+          </a:xfrm>
+          <a:prstGeom prst="straightConnector1">
+            <a:avLst/>
+          </a:prstGeom>
+          <a:ln w="57150">
+            <a:solidFill>
+              <a:srgbClr val="FF0000"/>
+            </a:solidFill>
+            <a:tailEnd type="arrow"/>
+          </a:ln>
+        </p:spPr>
+        <p:style>
+          <a:lnRef idx="1">
+            <a:schemeClr val="accent1"/>
+          </a:lnRef>
+          <a:fillRef idx="0">
+            <a:schemeClr val="accent1"/>
+          </a:fillRef>
+          <a:effectRef idx="0">
+            <a:schemeClr val="accent1"/>
+          </a:effectRef>
+          <a:fontRef idx="minor">
+            <a:schemeClr val="tx1"/>
+          </a:fontRef>
+        </p:style>
+      </p:cxnSp>
+      <p:sp>
+        <p:nvSpPr>
+          <p:cNvPr id="18" name="Rectangle 17"/>
+          <p:cNvSpPr/>
+          <p:nvPr/>
+        </p:nvSpPr>
+        <p:spPr>
+          <a:xfrm>
+            <a:off x="4267200" y="3124200"/>
+            <a:ext cx="4876800" cy="261610"/>
+          </a:xfrm>
+          <a:prstGeom prst="rect">
+            <a:avLst/>
+          </a:prstGeom>
+        </p:spPr>
+        <p:txBody>
+          <a:bodyPr wrap="square">
+            <a:spAutoFit/>
+          </a:bodyPr>
+          <a:lstStyle/>
+          <a:p>
+            <a:r>
+              <a:rPr lang="en-US" sz="1100" dirty="0" smtClean="0"/>
+              <a:t>https://sites.ecmwf.int/era/40-atlas/docs/section_D25/charts/D27_XS_DJF.html</a:t>
+            </a:r>
+            <a:endParaRPr lang="en-US" sz="1100" dirty="0"/>
+          </a:p>
+        </p:txBody>
+      </p:sp>
+      <p:sp>
+        <p:nvSpPr>
+          <p:cNvPr id="19" name="Slide Number Placeholder 18"/>
+          <p:cNvSpPr>
+            <a:spLocks noGrp="1"/>
+          </p:cNvSpPr>
+          <p:nvPr>
+            <p:ph type="sldNum" sz="quarter" idx="12"/>
+          </p:nvPr>
+        </p:nvSpPr>
+        <p:spPr/>
+        <p:txBody>
+          <a:bodyPr/>
+          <a:lstStyle/>
+          <a:p>
+            <a:fld id="{2FBD9FBA-E540-4D8F-97D2-506A094E5AAE}" type="slidenum">
+              <a:rPr lang="en-US" smtClean="0"/>
+              <a:pPr/>
+              <a:t>12</a:t>
+            </a:fld>
+            <a:endParaRPr lang="en-US"/>
+          </a:p>
+        </p:txBody>
+      </p:sp>
+      <p:sp>
+        <p:nvSpPr>
+          <p:cNvPr id="20" name="Footer Placeholder 19"/>
+          <p:cNvSpPr>
+            <a:spLocks noGrp="1"/>
+          </p:cNvSpPr>
+          <p:nvPr>
+            <p:ph type="ftr" sz="quarter" idx="11"/>
+          </p:nvPr>
+        </p:nvSpPr>
+        <p:spPr/>
+        <p:txBody>
+          <a:bodyPr/>
+          <a:lstStyle/>
+          <a:p>
+            <a:r>
+              <a:rPr lang="en-US" smtClean="0"/>
+              <a:t>Joshua Pan</a:t>
+            </a:r>
+            <a:endParaRPr lang="en-US"/>
+          </a:p>
+        </p:txBody>
+      </p:sp>
     </p:spTree>
   </p:cSld>
   <p:clrMapOvr>
@@ -5240,7 +6087,7 @@
             </a:r>
             <a:r>
               <a:rPr lang="en-US" sz="1450" dirty="0" smtClean="0"/>
-              <a:t> fluid on an </a:t>
+              <a:t> atmosphere on an </a:t>
             </a:r>
             <a:r>
               <a:rPr lang="en-US" sz="1450" i="1" dirty="0" smtClean="0"/>
@@ -5275,7 +6122,7 @@
             <a:pPr lvl="1"/>
             <a:r>
               <a:rPr lang="en-US" sz="1450" dirty="0" smtClean="0"/>
-              <a:t>Stratification consistent with constant buoyancy freq. squared (</a:t>
+              <a:t>Stratification consistent with a constant buoyancy freq. squared (</a:t>
             </a:r>
             <a:r>
               <a:rPr lang="en-US" sz="1450" i="1" dirty="0" smtClean="0"/>
@@ -5369,7 +6216,7 @@
             </a:r>
             <a:r>
               <a:rPr lang="en-US" sz="1450" dirty="0" smtClean="0"/>
-              <a:t> component must therefore tilt westward with height</a:t>
+              <a:t> component tilts westward with height</a:t>
             </a:r>
           </a:p>
           <a:p>
@@ -5431,6 +6278,53 @@
               <a:t>Overview of setup</a:t>
             </a:r>
             <a:endParaRPr lang="en-US" sz="3600" dirty="0"/>
+          </a:p>
+        </p:txBody>
+      </p:sp>
+      <p:sp>
+        <p:nvSpPr>
+          <p:cNvPr id="11" name="Slide Number Placeholder 10"/>
+          <p:cNvSpPr>
+            <a:spLocks noGrp="1"/>
+          </p:cNvSpPr>
+          <p:nvPr>
+            <p:ph type="sldNum" sz="quarter" idx="12"/>
+          </p:nvPr>
+        </p:nvSpPr>
+        <p:spPr/>
+        <p:txBody>
+          <a:bodyPr/>
+          <a:lstStyle/>
+          <a:p>
+            <a:fld id="{2FBD9FBA-E540-4D8F-97D2-506A094E5AAE}" type="slidenum">
+              <a:rPr lang="en-US" smtClean="0"/>
+              <a:pPr/>
+              <a:t>2</a:t>
+            </a:fld>
+            <a:endParaRPr lang="en-US"/>
+          </a:p>
+        </p:txBody>
+      </p:sp>
+      <p:sp>
+        <p:nvSpPr>
+          <p:cNvPr id="12" name="Footer Placeholder 11"/>
+          <p:cNvSpPr>
+            <a:spLocks noGrp="1"/>
+          </p:cNvSpPr>
+          <p:nvPr>
+            <p:ph type="ftr" sz="quarter" idx="11"/>
+          </p:nvPr>
+        </p:nvSpPr>
+        <p:spPr/>
+        <p:txBody>
+          <a:bodyPr/>
+          <a:lstStyle/>
+          <a:p>
+            <a:r>
+              <a:rPr lang="en-US" smtClean="0"/>
+              <a:t>Joshua Pan</a:t>
+            </a:r>
+            <a:endParaRPr lang="en-US"/>
           </a:p>
         </p:txBody>
       </p:sp>
@@ -5580,7 +6474,7 @@
             </a:r>
             <a:r>
               <a:rPr lang="en-US" sz="1800" dirty="0" smtClean="0"/>
-              <a:t> plane allow </a:t>
+              <a:t> plane allows </a:t>
             </a:r>
             <a:r>
               <a:rPr lang="en-US" sz="1800" i="1" dirty="0" smtClean="0"/>
@@ -5678,6 +6572,53 @@
           <a:noFill/>
         </p:spPr>
       </p:pic>
+      <p:sp>
+        <p:nvSpPr>
+          <p:cNvPr id="6" name="Slide Number Placeholder 5"/>
+          <p:cNvSpPr>
+            <a:spLocks noGrp="1"/>
+          </p:cNvSpPr>
+          <p:nvPr>
+            <p:ph type="sldNum" sz="quarter" idx="12"/>
+          </p:nvPr>
+        </p:nvSpPr>
+        <p:spPr/>
+        <p:txBody>
+          <a:bodyPr/>
+          <a:lstStyle/>
+          <a:p>
+            <a:fld id="{2FBD9FBA-E540-4D8F-97D2-506A094E5AAE}" type="slidenum">
+              <a:rPr lang="en-US" smtClean="0"/>
+              <a:pPr/>
+              <a:t>3</a:t>
+            </a:fld>
+            <a:endParaRPr lang="en-US"/>
+          </a:p>
+        </p:txBody>
+      </p:sp>
+      <p:sp>
+        <p:nvSpPr>
+          <p:cNvPr id="7" name="Footer Placeholder 6"/>
+          <p:cNvSpPr>
+            <a:spLocks noGrp="1"/>
+          </p:cNvSpPr>
+          <p:nvPr>
+            <p:ph type="ftr" sz="quarter" idx="11"/>
+          </p:nvPr>
+        </p:nvSpPr>
+        <p:spPr/>
+        <p:txBody>
+          <a:bodyPr/>
+          <a:lstStyle/>
+          <a:p>
+            <a:r>
+              <a:rPr lang="en-US" smtClean="0"/>
+              <a:t>Joshua Pan</a:t>
+            </a:r>
+            <a:endParaRPr lang="en-US"/>
+          </a:p>
+        </p:txBody>
+      </p:sp>
     </p:spTree>
   </p:cSld>
   <p:clrMapOvr>
@@ -5868,6 +6809,53 @@
           </a:p>
         </p:txBody>
       </p:sp>
+      <p:sp>
+        <p:nvSpPr>
+          <p:cNvPr id="7" name="Slide Number Placeholder 6"/>
+          <p:cNvSpPr>
+            <a:spLocks noGrp="1"/>
+          </p:cNvSpPr>
+          <p:nvPr>
+            <p:ph type="sldNum" sz="quarter" idx="12"/>
+          </p:nvPr>
+        </p:nvSpPr>
+        <p:spPr/>
+        <p:txBody>
+          <a:bodyPr/>
+          <a:lstStyle/>
+          <a:p>
+            <a:fld id="{2FBD9FBA-E540-4D8F-97D2-506A094E5AAE}" type="slidenum">
+              <a:rPr lang="en-US" smtClean="0"/>
+              <a:pPr/>
+              <a:t>4</a:t>
+            </a:fld>
+            <a:endParaRPr lang="en-US"/>
+          </a:p>
+        </p:txBody>
+      </p:sp>
+      <p:sp>
+        <p:nvSpPr>
+          <p:cNvPr id="8" name="Footer Placeholder 7"/>
+          <p:cNvSpPr>
+            <a:spLocks noGrp="1"/>
+          </p:cNvSpPr>
+          <p:nvPr>
+            <p:ph type="ftr" sz="quarter" idx="11"/>
+          </p:nvPr>
+        </p:nvSpPr>
+        <p:spPr/>
+        <p:txBody>
+          <a:bodyPr/>
+          <a:lstStyle/>
+          <a:p>
+            <a:r>
+              <a:rPr lang="en-US" smtClean="0"/>
+              <a:t>Joshua Pan</a:t>
+            </a:r>
+            <a:endParaRPr lang="en-US"/>
+          </a:p>
+        </p:txBody>
+      </p:sp>
     </p:spTree>
   </p:cSld>
   <p:clrMapOvr>
@@ -6451,6 +7439,53 @@
           </a:p>
         </p:txBody>
       </p:sp>
+      <p:sp>
+        <p:nvSpPr>
+          <p:cNvPr id="7" name="Slide Number Placeholder 6"/>
+          <p:cNvSpPr>
+            <a:spLocks noGrp="1"/>
+          </p:cNvSpPr>
+          <p:nvPr>
+            <p:ph type="sldNum" sz="quarter" idx="12"/>
+          </p:nvPr>
+        </p:nvSpPr>
+        <p:spPr/>
+        <p:txBody>
+          <a:bodyPr/>
+          <a:lstStyle/>
+          <a:p>
+            <a:fld id="{2FBD9FBA-E540-4D8F-97D2-506A094E5AAE}" type="slidenum">
+              <a:rPr lang="en-US" smtClean="0"/>
+              <a:pPr/>
+              <a:t>5</a:t>
+            </a:fld>
+            <a:endParaRPr lang="en-US"/>
+          </a:p>
+        </p:txBody>
+      </p:sp>
+      <p:sp>
+        <p:nvSpPr>
+          <p:cNvPr id="8" name="Footer Placeholder 7"/>
+          <p:cNvSpPr>
+            <a:spLocks noGrp="1"/>
+          </p:cNvSpPr>
+          <p:nvPr>
+            <p:ph type="ftr" sz="quarter" idx="11"/>
+          </p:nvPr>
+        </p:nvSpPr>
+        <p:spPr/>
+        <p:txBody>
+          <a:bodyPr/>
+          <a:lstStyle/>
+          <a:p>
+            <a:r>
+              <a:rPr lang="en-US" smtClean="0"/>
+              <a:t>Joshua Pan</a:t>
+            </a:r>
+            <a:endParaRPr lang="en-US"/>
+          </a:p>
+        </p:txBody>
+      </p:sp>
     </p:spTree>
   </p:cSld>
   <p:clrMapOvr>
@@ -6806,6 +7841,53 @@
           </a:p>
         </p:txBody>
       </p:sp>
+      <p:sp>
+        <p:nvSpPr>
+          <p:cNvPr id="8" name="Slide Number Placeholder 7"/>
+          <p:cNvSpPr>
+            <a:spLocks noGrp="1"/>
+          </p:cNvSpPr>
+          <p:nvPr>
+            <p:ph type="sldNum" sz="quarter" idx="12"/>
+          </p:nvPr>
+        </p:nvSpPr>
+        <p:spPr/>
+        <p:txBody>
+          <a:bodyPr/>
+          <a:lstStyle/>
+          <a:p>
+            <a:fld id="{2FBD9FBA-E540-4D8F-97D2-506A094E5AAE}" type="slidenum">
+              <a:rPr lang="en-US" smtClean="0"/>
+              <a:pPr/>
+              <a:t>6</a:t>
+            </a:fld>
+            <a:endParaRPr lang="en-US"/>
+          </a:p>
+        </p:txBody>
+      </p:sp>
+      <p:sp>
+        <p:nvSpPr>
+          <p:cNvPr id="9" name="Footer Placeholder 8"/>
+          <p:cNvSpPr>
+            <a:spLocks noGrp="1"/>
+          </p:cNvSpPr>
+          <p:nvPr>
+            <p:ph type="ftr" sz="quarter" idx="11"/>
+          </p:nvPr>
+        </p:nvSpPr>
+        <p:spPr/>
+        <p:txBody>
+          <a:bodyPr/>
+          <a:lstStyle/>
+          <a:p>
+            <a:r>
+              <a:rPr lang="en-US" smtClean="0"/>
+              <a:t>Joshua Pan</a:t>
+            </a:r>
+            <a:endParaRPr lang="en-US"/>
+          </a:p>
+        </p:txBody>
+      </p:sp>
     </p:spTree>
   </p:cSld>
   <p:clrMapOvr>
@@ -7223,7 +8305,7 @@
             </a:r>
             <a:r>
               <a:rPr lang="en-US" dirty="0" smtClean="0"/>
-              <a:t> dependence of fields to </a:t>
+              <a:t> dependence of forcing fields to </a:t>
             </a:r>
             <a:r>
               <a:rPr lang="en-US" dirty="0" err="1" smtClean="0"/>
@@ -7302,6 +8384,53 @@
           <a:noFill/>
         </p:spPr>
       </p:pic>
+      <p:sp>
+        <p:nvSpPr>
+          <p:cNvPr id="8" name="Slide Number Placeholder 7"/>
+          <p:cNvSpPr>
+            <a:spLocks noGrp="1"/>
+          </p:cNvSpPr>
+          <p:nvPr>
+            <p:ph type="sldNum" sz="quarter" idx="12"/>
+          </p:nvPr>
+        </p:nvSpPr>
+        <p:spPr/>
+        <p:txBody>
+          <a:bodyPr/>
+          <a:lstStyle/>
+          <a:p>
+            <a:fld id="{2FBD9FBA-E540-4D8F-97D2-506A094E5AAE}" type="slidenum">
+              <a:rPr lang="en-US" smtClean="0"/>
+              <a:pPr/>
+              <a:t>7</a:t>
+            </a:fld>
+            <a:endParaRPr lang="en-US"/>
+          </a:p>
+        </p:txBody>
+      </p:sp>
+      <p:sp>
+        <p:nvSpPr>
+          <p:cNvPr id="9" name="Footer Placeholder 8"/>
+          <p:cNvSpPr>
+            <a:spLocks noGrp="1"/>
+          </p:cNvSpPr>
+          <p:nvPr>
+            <p:ph type="ftr" sz="quarter" idx="11"/>
+          </p:nvPr>
+        </p:nvSpPr>
+        <p:spPr/>
+        <p:txBody>
+          <a:bodyPr/>
+          <a:lstStyle/>
+          <a:p>
+            <a:r>
+              <a:rPr lang="en-US" smtClean="0"/>
+              <a:t>Joshua Pan</a:t>
+            </a:r>
+            <a:endParaRPr lang="en-US"/>
+          </a:p>
+        </p:txBody>
+      </p:sp>
     </p:spTree>
   </p:cSld>
   <p:clrMapOvr>
@@ -7901,6 +9030,53 @@
           </a:p>
         </p:txBody>
       </p:sp>
+      <p:sp>
+        <p:nvSpPr>
+          <p:cNvPr id="14" name="Slide Number Placeholder 13"/>
+          <p:cNvSpPr>
+            <a:spLocks noGrp="1"/>
+          </p:cNvSpPr>
+          <p:nvPr>
+            <p:ph type="sldNum" sz="quarter" idx="12"/>
+          </p:nvPr>
+        </p:nvSpPr>
+        <p:spPr/>
+        <p:txBody>
+          <a:bodyPr/>
+          <a:lstStyle/>
+          <a:p>
+            <a:fld id="{2FBD9FBA-E540-4D8F-97D2-506A094E5AAE}" type="slidenum">
+              <a:rPr lang="en-US" smtClean="0"/>
+              <a:pPr/>
+              <a:t>8</a:t>
+            </a:fld>
+            <a:endParaRPr lang="en-US"/>
+          </a:p>
+        </p:txBody>
+      </p:sp>
+      <p:sp>
+        <p:nvSpPr>
+          <p:cNvPr id="15" name="Footer Placeholder 14"/>
+          <p:cNvSpPr>
+            <a:spLocks noGrp="1"/>
+          </p:cNvSpPr>
+          <p:nvPr>
+            <p:ph type="ftr" sz="quarter" idx="11"/>
+          </p:nvPr>
+        </p:nvSpPr>
+        <p:spPr/>
+        <p:txBody>
+          <a:bodyPr/>
+          <a:lstStyle/>
+          <a:p>
+            <a:r>
+              <a:rPr lang="en-US" smtClean="0"/>
+              <a:t>Joshua Pan</a:t>
+            </a:r>
+            <a:endParaRPr lang="en-US"/>
+          </a:p>
+        </p:txBody>
+      </p:sp>
     </p:spTree>
   </p:cSld>
   <p:clrMapOvr>
@@ -8554,6 +9730,53 @@
           <a:effectLst/>
         </p:spPr>
       </p:pic>
+      <p:sp>
+        <p:nvSpPr>
+          <p:cNvPr id="8" name="Slide Number Placeholder 7"/>
+          <p:cNvSpPr>
+            <a:spLocks noGrp="1"/>
+          </p:cNvSpPr>
+          <p:nvPr>
+            <p:ph type="sldNum" sz="quarter" idx="12"/>
+          </p:nvPr>
+        </p:nvSpPr>
+        <p:spPr/>
+        <p:txBody>
+          <a:bodyPr/>
+          <a:lstStyle/>
+          <a:p>
+            <a:fld id="{2FBD9FBA-E540-4D8F-97D2-506A094E5AAE}" type="slidenum">
+              <a:rPr lang="en-US" smtClean="0"/>
+              <a:pPr/>
+              <a:t>9</a:t>
+            </a:fld>
+            <a:endParaRPr lang="en-US"/>
+          </a:p>
+        </p:txBody>
+      </p:sp>
+      <p:sp>
+        <p:nvSpPr>
+          <p:cNvPr id="9" name="Footer Placeholder 8"/>
+          <p:cNvSpPr>
+            <a:spLocks noGrp="1"/>
+          </p:cNvSpPr>
+          <p:nvPr>
+            <p:ph type="ftr" sz="quarter" idx="11"/>
+          </p:nvPr>
+        </p:nvSpPr>
+        <p:spPr/>
+        <p:txBody>
+          <a:bodyPr/>
+          <a:lstStyle/>
+          <a:p>
+            <a:r>
+              <a:rPr lang="en-US" smtClean="0"/>
+              <a:t>Joshua Pan</a:t>
+            </a:r>
+            <a:endParaRPr lang="en-US"/>
+          </a:p>
+        </p:txBody>
+      </p:sp>
     </p:spTree>
   </p:cSld>
   <p:clrMapOvr>
@@ -8850,4 +10073,287 @@
   <a:objectDefaults/>
   <a:extraClrSchemeLst/>
 </a:theme>
+</file>
+
+<file path=ppt/theme/theme2.xml><?xml version="1.0" encoding="utf-8"?>
+<a:theme xmlns:a="http://schemas.openxmlformats.org/drawingml/2006/main" name="Office Theme">
+  <a:themeElements>
+    <a:clrScheme name="Office">
+      <a:dk1>
+        <a:sysClr val="windowText" lastClr="000000"/>
+      </a:dk1>
+      <a:lt1>
+        <a:sysClr val="window" lastClr="FFFFFF"/>
+      </a:lt1>
+      <a:dk2>
+        <a:srgbClr val="1F497D"/>
+      </a:dk2>
+      <a:lt2>
+        <a:srgbClr val="EEECE1"/>
+      </a:lt2>
+      <a:accent1>
+        <a:srgbClr val="4F81BD"/>
+      </a:accent1>
+      <a:accent2>
+        <a:srgbClr val="C0504D"/>
+      </a:accent2>
+      <a:accent3>
+        <a:srgbClr val="9BBB59"/>
+      </a:accent3>
+      <a:accent4>
+        <a:srgbClr val="8064A2"/>
+      </a:accent4>
+      <a:accent5>
+        <a:srgbClr val="4BACC6"/>
+      </a:accent5>
+      <a:accent6>
+        <a:srgbClr val="F79646"/>
+      </a:accent6>
+      <a:hlink>
+        <a:srgbClr val="0000FF"/>
+      </a:hlink>
+      <a:folHlink>
+        <a:srgbClr val="800080"/>
+      </a:folHlink>
+    </a:clrScheme>
+    <a:fontScheme name="Office">
+      <a:majorFont>
+        <a:latin typeface="Calibri"/>
+        <a:ea typeface=""/>
+        <a:cs typeface=""/>
+        <a:font script="Jpan" typeface="ＭＳ Ｐゴシック"/>
+        <a:font script="Hang" typeface="맑은 고딕"/>
+        <a:font script="Hans" typeface="宋体"/>
+        <a:font script="Hant" typeface="新細明體"/>
+        <a:font script="Arab" typeface="Times New Roman"/>
+        <a:font script="Hebr" typeface="Times New Roman"/>
+        <a:font script="Thai" typeface="Angsana New"/>
+        <a:font script="Ethi" typeface="Nyala"/>
+        <a:font script="Beng" typeface="Vrinda"/>
+        <a:font script="Gujr" typeface="Shruti"/>
+        <a:font script="Khmr" typeface="MoolBoran"/>
+        <a:font script="Knda" typeface="Tunga"/>
+        <a:font script="Guru" typeface="Raavi"/>
+        <a:font script="Cans" typeface="Euphemia"/>
+        <a:font script="Cher" typeface="Plantagenet Cherokee"/>
+        <a:font script="Yiii" typeface="Microsoft Yi Baiti"/>
+        <a:font script="Tibt" typeface="Microsoft Himalaya"/>
+        <a:font script="Thaa" typeface="MV Boli"/>
+        <a:font script="Deva" typeface="Mangal"/>
+        <a:font script="Telu" typeface="Gautami"/>
+        <a:font script="Taml" typeface="Latha"/>
+        <a:font script="Syrc" typeface="Estrangelo Edessa"/>
+        <a:font script="Orya" typeface="Kalinga"/>
+        <a:font script="Mlym" typeface="Kartika"/>
+        <a:font script="Laoo" typeface="DokChampa"/>
+        <a:font script="Sinh" typeface="Iskoola Pota"/>
+        <a:font script="Mong" typeface="Mongolian Baiti"/>
+        <a:font script="Viet" typeface="Times New Roman"/>
+        <a:font script="Uigh" typeface="Microsoft Uighur"/>
+      </a:majorFont>
+      <a:minorFont>
+        <a:latin typeface="Calibri"/>
+        <a:ea typeface=""/>
+        <a:cs typeface=""/>
+        <a:font script="Jpan" typeface="ＭＳ Ｐゴシック"/>
+        <a:font script="Hang" typeface="맑은 고딕"/>
+        <a:font script="Hans" typeface="宋体"/>
+        <a:font script="Hant" typeface="新細明體"/>
+        <a:font script="Arab" typeface="Arial"/>
+        <a:font script="Hebr" typeface="Arial"/>
+        <a:font script="Thai" typeface="Cordia New"/>
+        <a:font script="Ethi" typeface="Nyala"/>
+        <a:font script="Beng" typeface="Vrinda"/>
+        <a:font script="Gujr" typeface="Shruti"/>
+        <a:font script="Khmr" typeface="DaunPenh"/>
+        <a:font script="Knda" typeface="Tunga"/>
+        <a:font script="Guru" typeface="Raavi"/>
+        <a:font script="Cans" typeface="Euphemia"/>
+        <a:font script="Cher" typeface="Plantagenet Cherokee"/>
+        <a:font script="Yiii" typeface="Microsoft Yi Baiti"/>
+        <a:font script="Tibt" typeface="Microsoft Himalaya"/>
+        <a:font script="Thaa" typeface="MV Boli"/>
+        <a:font script="Deva" typeface="Mangal"/>
+        <a:font script="Telu" typeface="Gautami"/>
+        <a:font script="Taml" typeface="Latha"/>
+        <a:font script="Syrc" typeface="Estrangelo Edessa"/>
+        <a:font script="Orya" typeface="Kalinga"/>
+        <a:font script="Mlym" typeface="Kartika"/>
+        <a:font script="Laoo" typeface="DokChampa"/>
+        <a:font script="Sinh" typeface="Iskoola Pota"/>
+        <a:font script="Mong" typeface="Mongolian Baiti"/>
+        <a:font script="Viet" typeface="Arial"/>
+        <a:font script="Uigh" typeface="Microsoft Uighur"/>
+      </a:minorFont>
+    </a:fontScheme>
+    <a:fmtScheme name="Office">
+      <a:fillStyleLst>
+        <a:solidFill>
+          <a:schemeClr val="phClr"/>
+        </a:solidFill>
+        <a:gradFill rotWithShape="1">
+          <a:gsLst>
+            <a:gs pos="0">
+              <a:schemeClr val="phClr">
+                <a:tint val="50000"/>
+                <a:satMod val="300000"/>
+              </a:schemeClr>
+            </a:gs>
+            <a:gs pos="35000">
+              <a:schemeClr val="phClr">
+                <a:tint val="37000"/>
+                <a:satMod val="300000"/>
+              </a:schemeClr>
+            </a:gs>
+            <a:gs pos="100000">
+              <a:schemeClr val="phClr">
+                <a:tint val="15000"/>
+                <a:satMod val="350000"/>
+              </a:schemeClr>
+            </a:gs>
+          </a:gsLst>
+          <a:lin ang="16200000" scaled="1"/>
+        </a:gradFill>
+        <a:gradFill rotWithShape="1">
+          <a:gsLst>
+            <a:gs pos="0">
+              <a:schemeClr val="phClr">
+                <a:shade val="51000"/>
+                <a:satMod val="130000"/>
+              </a:schemeClr>
+            </a:gs>
+            <a:gs pos="80000">
+              <a:schemeClr val="phClr">
+                <a:shade val="93000"/>
+                <a:satMod val="130000"/>
+              </a:schemeClr>
+            </a:gs>
+            <a:gs pos="100000">
+              <a:schemeClr val="phClr">
+                <a:shade val="94000"/>
+                <a:satMod val="135000"/>
+              </a:schemeClr>
+            </a:gs>
+          </a:gsLst>
+          <a:lin ang="16200000" scaled="0"/>
+        </a:gradFill>
+      </a:fillStyleLst>
+      <a:lnStyleLst>
+        <a:ln w="9525" cap="flat" cmpd="sng" algn="ctr">
+          <a:solidFill>
+            <a:schemeClr val="phClr">
+              <a:shade val="95000"/>
+              <a:satMod val="105000"/>
+            </a:schemeClr>
+          </a:solidFill>
+          <a:prstDash val="solid"/>
+        </a:ln>
+        <a:ln w="25400" cap="flat" cmpd="sng" algn="ctr">
+          <a:solidFill>
+            <a:schemeClr val="phClr"/>
+          </a:solidFill>
+          <a:prstDash val="solid"/>
+        </a:ln>
+        <a:ln w="38100" cap="flat" cmpd="sng" algn="ctr">
+          <a:solidFill>
+            <a:schemeClr val="phClr"/>
+          </a:solidFill>
+          <a:prstDash val="solid"/>
+        </a:ln>
+      </a:lnStyleLst>
+      <a:effectStyleLst>
+        <a:effectStyle>
+          <a:effectLst>
+            <a:outerShdw blurRad="40000" dist="20000" dir="5400000" rotWithShape="0">
+              <a:srgbClr val="000000">
+                <a:alpha val="38000"/>
+              </a:srgbClr>
+            </a:outerShdw>
+          </a:effectLst>
+        </a:effectStyle>
+        <a:effectStyle>
+          <a:effectLst>
+            <a:outerShdw blurRad="40000" dist="23000" dir="5400000" rotWithShape="0">
+              <a:srgbClr val="000000">
+                <a:alpha val="35000"/>
+              </a:srgbClr>
+            </a:outerShdw>
+          </a:effectLst>
+        </a:effectStyle>
+        <a:effectStyle>
+          <a:effectLst>
+            <a:outerShdw blurRad="40000" dist="23000" dir="5400000" rotWithShape="0">
+              <a:srgbClr val="000000">
+                <a:alpha val="35000"/>
+              </a:srgbClr>
+            </a:outerShdw>
+          </a:effectLst>
+          <a:scene3d>
+            <a:camera prst="orthographicFront">
+              <a:rot lat="0" lon="0" rev="0"/>
+            </a:camera>
+            <a:lightRig rig="threePt" dir="t">
+              <a:rot lat="0" lon="0" rev="1200000"/>
+            </a:lightRig>
+          </a:scene3d>
+          <a:sp3d>
+            <a:bevelT w="63500" h="25400"/>
+          </a:sp3d>
+        </a:effectStyle>
+      </a:effectStyleLst>
+      <a:bgFillStyleLst>
+        <a:solidFill>
+          <a:schemeClr val="phClr"/>
+        </a:solidFill>
+        <a:gradFill rotWithShape="1">
+          <a:gsLst>
+            <a:gs pos="0">
+              <a:schemeClr val="phClr">
+                <a:tint val="40000"/>
+                <a:satMod val="350000"/>
+              </a:schemeClr>
+            </a:gs>
+            <a:gs pos="40000">
+              <a:schemeClr val="phClr">
+                <a:tint val="45000"/>
+                <a:shade val="99000"/>
+                <a:satMod val="350000"/>
+              </a:schemeClr>
+            </a:gs>
+            <a:gs pos="100000">
+              <a:schemeClr val="phClr">
+                <a:shade val="20000"/>
+                <a:satMod val="255000"/>
+              </a:schemeClr>
+            </a:gs>
+          </a:gsLst>
+          <a:path path="circle">
+            <a:fillToRect l="50000" t="-80000" r="50000" b="180000"/>
+          </a:path>
+        </a:gradFill>
+        <a:gradFill rotWithShape="1">
+          <a:gsLst>
+            <a:gs pos="0">
+              <a:schemeClr val="phClr">
+                <a:tint val="80000"/>
+                <a:satMod val="300000"/>
+              </a:schemeClr>
+            </a:gs>
+            <a:gs pos="100000">
+              <a:schemeClr val="phClr">
+                <a:shade val="30000"/>
+                <a:satMod val="200000"/>
+              </a:schemeClr>
+            </a:gs>
+          </a:gsLst>
+          <a:path path="circle">
+            <a:fillToRect l="50000" t="50000" r="50000" b="50000"/>
+          </a:path>
+        </a:gradFill>
+      </a:bgFillStyleLst>
+    </a:fmtScheme>
+  </a:themeElements>
+  <a:objectDefaults/>
+  <a:extraClrSchemeLst/>
+</a:theme>
 </file>
</xml_diff>